<commit_message>
Quasi finalisation du diapo, plus que quelque détails
</commit_message>
<xml_diff>
--- a/Revue de projet/Diapo revue de projet.pptx
+++ b/Revue de projet/Diapo revue de projet.pptx
@@ -5,10 +5,10 @@
     <p:sldMasterId id="2147483659" r:id="rId4"/>
   </p:sldMasterIdLst>
   <p:notesMasterIdLst>
-    <p:notesMasterId r:id="rId21"/>
+    <p:notesMasterId r:id="rId23"/>
   </p:notesMasterIdLst>
   <p:handoutMasterIdLst>
-    <p:handoutMasterId r:id="rId22"/>
+    <p:handoutMasterId r:id="rId24"/>
   </p:handoutMasterIdLst>
   <p:sldIdLst>
     <p:sldId id="256" r:id="rId5"/>
@@ -19,36 +19,38 @@
     <p:sldId id="323" r:id="rId10"/>
     <p:sldId id="322" r:id="rId11"/>
     <p:sldId id="326" r:id="rId12"/>
-    <p:sldId id="324" r:id="rId13"/>
-    <p:sldId id="321" r:id="rId14"/>
-    <p:sldId id="316" r:id="rId15"/>
-    <p:sldId id="317" r:id="rId16"/>
-    <p:sldId id="318" r:id="rId17"/>
-    <p:sldId id="319" r:id="rId18"/>
-    <p:sldId id="308" r:id="rId19"/>
-    <p:sldId id="313" r:id="rId20"/>
+    <p:sldId id="328" r:id="rId13"/>
+    <p:sldId id="316" r:id="rId14"/>
+    <p:sldId id="317" r:id="rId15"/>
+    <p:sldId id="330" r:id="rId16"/>
+    <p:sldId id="329" r:id="rId17"/>
+    <p:sldId id="318" r:id="rId18"/>
+    <p:sldId id="332" r:id="rId19"/>
+    <p:sldId id="310" r:id="rId20"/>
+    <p:sldId id="308" r:id="rId21"/>
+    <p:sldId id="313" r:id="rId22"/>
   </p:sldIdLst>
   <p:sldSz cx="9144000" cy="5143500" type="screen16x9"/>
   <p:notesSz cx="6858000" cy="9144000"/>
   <p:embeddedFontLst>
     <p:embeddedFont>
       <p:font typeface="Maven Pro" panose="020B0604020202020204" charset="0"/>
-      <p:regular r:id="rId23"/>
-      <p:bold r:id="rId24"/>
+      <p:regular r:id="rId25"/>
+      <p:bold r:id="rId26"/>
     </p:embeddedFont>
     <p:embeddedFont>
       <p:font typeface="Nunito Light" pitchFamily="2" charset="0"/>
-      <p:regular r:id="rId25"/>
-      <p:italic r:id="rId26"/>
-    </p:embeddedFont>
-    <p:embeddedFont>
-      <p:font typeface="Roboto Condensed Light" panose="02000000000000000000" pitchFamily="2" charset="0"/>
       <p:regular r:id="rId27"/>
       <p:italic r:id="rId28"/>
     </p:embeddedFont>
     <p:embeddedFont>
+      <p:font typeface="Roboto Condensed Light" panose="02000000000000000000" pitchFamily="2" charset="0"/>
+      <p:regular r:id="rId29"/>
+      <p:italic r:id="rId30"/>
+    </p:embeddedFont>
+    <p:embeddedFont>
       <p:font typeface="Share Tech" panose="020B0604020202020204" charset="0"/>
-      <p:regular r:id="rId29"/>
+      <p:regular r:id="rId31"/>
     </p:embeddedFont>
   </p:embeddedFontLst>
   <p:defaultTextStyle>
@@ -299,6 +301,1000 @@
     <p1510:client id="{E179B1B3-6BD9-457C-B024-86EDBF593F0A}" v="13" vWet="15" dt="2023-03-23T09:48:51.354"/>
   </p1510:revLst>
 </p1510:revInfo>
+</file>
+
+<file path=ppt/charts/chart1.xml><?xml version="1.0" encoding="utf-8"?>
+<c:chartSpace xmlns:c="http://schemas.openxmlformats.org/drawingml/2006/chart" xmlns:a="http://schemas.openxmlformats.org/drawingml/2006/main" xmlns:r="http://schemas.openxmlformats.org/officeDocument/2006/relationships" xmlns:c16r2="http://schemas.microsoft.com/office/drawing/2015/06/chart">
+  <c:date1904 val="0"/>
+  <c:lang val="fr-FR"/>
+  <c:roundedCorners val="0"/>
+  <mc:AlternateContent xmlns:mc="http://schemas.openxmlformats.org/markup-compatibility/2006">
+    <mc:Choice xmlns:c14="http://schemas.microsoft.com/office/drawing/2007/8/2/chart" Requires="c14">
+      <c14:style val="102"/>
+    </mc:Choice>
+    <mc:Fallback>
+      <c:style val="2"/>
+    </mc:Fallback>
+  </mc:AlternateContent>
+  <c:chart>
+    <c:autoTitleDeleted val="1"/>
+    <c:plotArea>
+      <c:layout>
+        <c:manualLayout>
+          <c:layoutTarget val="inner"/>
+          <c:xMode val="edge"/>
+          <c:yMode val="edge"/>
+          <c:x val="2.0219816272965948E-3"/>
+          <c:y val="3.1250000000000002E-3"/>
+          <c:w val="0.67083333333333328"/>
+          <c:h val="0.99687499999999996"/>
+        </c:manualLayout>
+      </c:layout>
+      <c:doughnutChart>
+        <c:varyColors val="1"/>
+        <c:ser>
+          <c:idx val="0"/>
+          <c:order val="0"/>
+          <c:tx>
+            <c:strRef>
+              <c:f>Feuil1!$B$1</c:f>
+              <c:strCache>
+                <c:ptCount val="1"/>
+                <c:pt idx="0">
+                  <c:v>Commul des heures en fonction de chaque tâches</c:v>
+                </c:pt>
+              </c:strCache>
+            </c:strRef>
+          </c:tx>
+          <c:dPt>
+            <c:idx val="0"/>
+            <c:bubble3D val="0"/>
+            <c:spPr>
+              <a:solidFill>
+                <a:schemeClr val="accent1"/>
+              </a:solidFill>
+              <a:ln w="19050">
+                <a:solidFill>
+                  <a:schemeClr val="lt1"/>
+                </a:solidFill>
+              </a:ln>
+              <a:effectLst/>
+            </c:spPr>
+          </c:dPt>
+          <c:dPt>
+            <c:idx val="1"/>
+            <c:bubble3D val="0"/>
+            <c:spPr>
+              <a:solidFill>
+                <a:schemeClr val="accent2"/>
+              </a:solidFill>
+              <a:ln w="19050">
+                <a:solidFill>
+                  <a:schemeClr val="lt1"/>
+                </a:solidFill>
+              </a:ln>
+              <a:effectLst/>
+            </c:spPr>
+          </c:dPt>
+          <c:dPt>
+            <c:idx val="2"/>
+            <c:bubble3D val="0"/>
+            <c:spPr>
+              <a:solidFill>
+                <a:schemeClr val="accent3"/>
+              </a:solidFill>
+              <a:ln w="19050">
+                <a:solidFill>
+                  <a:schemeClr val="lt1"/>
+                </a:solidFill>
+              </a:ln>
+              <a:effectLst/>
+            </c:spPr>
+            <c:extLst>
+              <c:ext xmlns:c16="http://schemas.microsoft.com/office/drawing/2014/chart" uri="{C3380CC4-5D6E-409C-BE32-E72D297353CC}">
+                <c16:uniqueId val="{00000002-9BC0-4A2A-B420-A87C4526A351}"/>
+              </c:ext>
+            </c:extLst>
+          </c:dPt>
+          <c:dPt>
+            <c:idx val="3"/>
+            <c:bubble3D val="0"/>
+            <c:spPr>
+              <a:solidFill>
+                <a:schemeClr val="accent4"/>
+              </a:solidFill>
+              <a:ln w="19050">
+                <a:solidFill>
+                  <a:schemeClr val="lt1"/>
+                </a:solidFill>
+              </a:ln>
+              <a:effectLst/>
+            </c:spPr>
+          </c:dPt>
+          <c:dPt>
+            <c:idx val="4"/>
+            <c:bubble3D val="0"/>
+            <c:spPr>
+              <a:solidFill>
+                <a:schemeClr val="accent5"/>
+              </a:solidFill>
+              <a:ln w="19050">
+                <a:solidFill>
+                  <a:schemeClr val="lt1"/>
+                </a:solidFill>
+              </a:ln>
+              <a:effectLst/>
+            </c:spPr>
+            <c:extLst>
+              <c:ext xmlns:c16="http://schemas.microsoft.com/office/drawing/2014/chart" uri="{C3380CC4-5D6E-409C-BE32-E72D297353CC}">
+                <c16:uniqueId val="{00000003-9BC0-4A2A-B420-A87C4526A351}"/>
+              </c:ext>
+            </c:extLst>
+          </c:dPt>
+          <c:dPt>
+            <c:idx val="5"/>
+            <c:bubble3D val="0"/>
+            <c:spPr>
+              <a:solidFill>
+                <a:schemeClr val="accent6"/>
+              </a:solidFill>
+              <a:ln w="19050">
+                <a:solidFill>
+                  <a:schemeClr val="lt1"/>
+                </a:solidFill>
+              </a:ln>
+              <a:effectLst/>
+            </c:spPr>
+          </c:dPt>
+          <c:dPt>
+            <c:idx val="6"/>
+            <c:bubble3D val="0"/>
+            <c:spPr>
+              <a:solidFill>
+                <a:schemeClr val="accent1">
+                  <a:lumMod val="60000"/>
+                </a:schemeClr>
+              </a:solidFill>
+              <a:ln w="19050">
+                <a:solidFill>
+                  <a:schemeClr val="lt1"/>
+                </a:solidFill>
+              </a:ln>
+              <a:effectLst/>
+            </c:spPr>
+          </c:dPt>
+          <c:dPt>
+            <c:idx val="7"/>
+            <c:bubble3D val="0"/>
+            <c:spPr>
+              <a:solidFill>
+                <a:schemeClr val="accent2">
+                  <a:lumMod val="60000"/>
+                </a:schemeClr>
+              </a:solidFill>
+              <a:ln w="19050">
+                <a:solidFill>
+                  <a:schemeClr val="lt1"/>
+                </a:solidFill>
+              </a:ln>
+              <a:effectLst/>
+            </c:spPr>
+          </c:dPt>
+          <c:dLbls>
+            <c:dLbl>
+              <c:idx val="4"/>
+              <c:spPr>
+                <a:noFill/>
+                <a:ln>
+                  <a:noFill/>
+                </a:ln>
+                <a:effectLst/>
+              </c:spPr>
+              <c:txPr>
+                <a:bodyPr rot="0" spcFirstLastPara="1" vertOverflow="ellipsis" vert="horz" wrap="square" lIns="38100" tIns="19050" rIns="38100" bIns="19050" anchor="ctr" anchorCtr="1">
+                  <a:spAutoFit/>
+                </a:bodyPr>
+                <a:lstStyle/>
+                <a:p>
+                  <a:pPr>
+                    <a:defRPr sz="1050" b="0" i="0" u="none" strike="noStrike" kern="1200" baseline="0">
+                      <a:solidFill>
+                        <a:srgbClr val="000000"/>
+                      </a:solidFill>
+                      <a:latin typeface="+mn-lt"/>
+                      <a:ea typeface="+mn-ea"/>
+                      <a:cs typeface="+mn-cs"/>
+                    </a:defRPr>
+                  </a:pPr>
+                  <a:endParaRPr lang="fr-FR"/>
+                </a:p>
+              </c:txPr>
+              <c:showLegendKey val="0"/>
+              <c:showVal val="1"/>
+              <c:showCatName val="0"/>
+              <c:showSerName val="0"/>
+              <c:showPercent val="0"/>
+              <c:showBubbleSize val="0"/>
+              <c:extLst>
+                <c:ext xmlns:c16="http://schemas.microsoft.com/office/drawing/2014/chart" uri="{C3380CC4-5D6E-409C-BE32-E72D297353CC}">
+                  <c16:uniqueId val="{00000003-9BC0-4A2A-B420-A87C4526A351}"/>
+                </c:ext>
+              </c:extLst>
+            </c:dLbl>
+            <c:spPr>
+              <a:noFill/>
+              <a:ln>
+                <a:noFill/>
+              </a:ln>
+              <a:effectLst/>
+            </c:spPr>
+            <c:txPr>
+              <a:bodyPr rot="0" spcFirstLastPara="1" vertOverflow="ellipsis" vert="horz" wrap="square" lIns="38100" tIns="19050" rIns="38100" bIns="19050" anchor="ctr" anchorCtr="1">
+                <a:spAutoFit/>
+              </a:bodyPr>
+              <a:lstStyle/>
+              <a:p>
+                <a:pPr>
+                  <a:defRPr sz="1050" b="0" i="0" u="none" strike="noStrike" kern="1200" baseline="0">
+                    <a:solidFill>
+                      <a:schemeClr val="tx1"/>
+                    </a:solidFill>
+                    <a:latin typeface="+mn-lt"/>
+                    <a:ea typeface="+mn-ea"/>
+                    <a:cs typeface="+mn-cs"/>
+                  </a:defRPr>
+                </a:pPr>
+                <a:endParaRPr lang="fr-FR"/>
+              </a:p>
+            </c:txPr>
+            <c:showLegendKey val="0"/>
+            <c:showVal val="1"/>
+            <c:showCatName val="0"/>
+            <c:showSerName val="0"/>
+            <c:showPercent val="0"/>
+            <c:showBubbleSize val="0"/>
+            <c:showLeaderLines val="1"/>
+            <c:leaderLines>
+              <c:spPr>
+                <a:ln w="9525" cap="flat" cmpd="sng" algn="ctr">
+                  <a:solidFill>
+                    <a:schemeClr val="tx1">
+                      <a:lumMod val="35000"/>
+                      <a:lumOff val="65000"/>
+                    </a:schemeClr>
+                  </a:solidFill>
+                  <a:round/>
+                </a:ln>
+                <a:effectLst/>
+              </c:spPr>
+            </c:leaderLines>
+            <c:extLst>
+              <c:ext xmlns:c15="http://schemas.microsoft.com/office/drawing/2012/chart" uri="{CE6537A1-D6FC-4f65-9D91-7224C49458BB}"/>
+            </c:extLst>
+          </c:dLbls>
+          <c:cat>
+            <c:strRef>
+              <c:f>Feuil1!$A$2:$A$9</c:f>
+              <c:strCache>
+                <c:ptCount val="8"/>
+                <c:pt idx="0">
+                  <c:v>Initialisation du projet</c:v>
+                </c:pt>
+                <c:pt idx="1">
+                  <c:v>Documents de suivis de projet</c:v>
+                </c:pt>
+                <c:pt idx="2">
+                  <c:v>Base de données</c:v>
+                </c:pt>
+                <c:pt idx="3">
+                  <c:v>Développement de l'API</c:v>
+                </c:pt>
+                <c:pt idx="4">
+                  <c:v>Développement de l'application web</c:v>
+                </c:pt>
+                <c:pt idx="5">
+                  <c:v>CI/CD</c:v>
+                </c:pt>
+                <c:pt idx="6">
+                  <c:v>Veille numérique</c:v>
+                </c:pt>
+                <c:pt idx="7">
+                  <c:v>Revue de projet</c:v>
+                </c:pt>
+              </c:strCache>
+            </c:strRef>
+          </c:cat>
+          <c:val>
+            <c:numRef>
+              <c:f>Feuil1!$B$2:$B$9</c:f>
+              <c:numCache>
+                <c:formatCode>General</c:formatCode>
+                <c:ptCount val="8"/>
+                <c:pt idx="0">
+                  <c:v>2.5</c:v>
+                </c:pt>
+                <c:pt idx="1">
+                  <c:v>6</c:v>
+                </c:pt>
+                <c:pt idx="2">
+                  <c:v>1.5</c:v>
+                </c:pt>
+                <c:pt idx="3">
+                  <c:v>25.25</c:v>
+                </c:pt>
+                <c:pt idx="4">
+                  <c:v>71</c:v>
+                </c:pt>
+                <c:pt idx="5">
+                  <c:v>21</c:v>
+                </c:pt>
+                <c:pt idx="6">
+                  <c:v>7</c:v>
+                </c:pt>
+                <c:pt idx="7">
+                  <c:v>20.5</c:v>
+                </c:pt>
+              </c:numCache>
+            </c:numRef>
+          </c:val>
+          <c:extLst>
+            <c:ext xmlns:c16="http://schemas.microsoft.com/office/drawing/2014/chart" uri="{C3380CC4-5D6E-409C-BE32-E72D297353CC}">
+              <c16:uniqueId val="{00000000-9BC0-4A2A-B420-A87C4526A351}"/>
+            </c:ext>
+          </c:extLst>
+        </c:ser>
+        <c:dLbls>
+          <c:showLegendKey val="0"/>
+          <c:showVal val="1"/>
+          <c:showCatName val="0"/>
+          <c:showSerName val="0"/>
+          <c:showPercent val="0"/>
+          <c:showBubbleSize val="0"/>
+          <c:showLeaderLines val="1"/>
+        </c:dLbls>
+        <c:firstSliceAng val="0"/>
+        <c:holeSize val="75"/>
+      </c:doughnutChart>
+      <c:spPr>
+        <a:noFill/>
+        <a:ln>
+          <a:noFill/>
+        </a:ln>
+        <a:effectLst/>
+      </c:spPr>
+    </c:plotArea>
+    <c:legend>
+      <c:legendPos val="r"/>
+      <c:layout>
+        <c:manualLayout>
+          <c:xMode val="edge"/>
+          <c:yMode val="edge"/>
+          <c:x val="0.71237746062992124"/>
+          <c:y val="6.5905511811023667E-3"/>
+          <c:w val="0.27512253937007874"/>
+          <c:h val="0.98681889763779529"/>
+        </c:manualLayout>
+      </c:layout>
+      <c:overlay val="0"/>
+      <c:spPr>
+        <a:noFill/>
+        <a:ln>
+          <a:noFill/>
+        </a:ln>
+        <a:effectLst/>
+      </c:spPr>
+      <c:txPr>
+        <a:bodyPr rot="0" spcFirstLastPara="1" vertOverflow="ellipsis" vert="horz" wrap="square" anchor="ctr" anchorCtr="1"/>
+        <a:lstStyle/>
+        <a:p>
+          <a:pPr>
+            <a:defRPr sz="1197" b="0" i="0" u="none" strike="noStrike" kern="1200" baseline="0">
+              <a:solidFill>
+                <a:schemeClr val="tx1">
+                  <a:lumMod val="65000"/>
+                  <a:lumOff val="35000"/>
+                </a:schemeClr>
+              </a:solidFill>
+              <a:latin typeface="+mn-lt"/>
+              <a:ea typeface="+mn-ea"/>
+              <a:cs typeface="+mn-cs"/>
+            </a:defRPr>
+          </a:pPr>
+          <a:endParaRPr lang="fr-FR"/>
+        </a:p>
+      </c:txPr>
+    </c:legend>
+    <c:plotVisOnly val="1"/>
+    <c:dispBlanksAs val="gap"/>
+    <c:extLst>
+      <c:ext xmlns:c16r3="http://schemas.microsoft.com/office/drawing/2017/03/chart" uri="{56B9EC1D-385E-4148-901F-78D8002777C0}">
+        <c16r3:dataDisplayOptions16>
+          <c16r3:dispNaAsBlank val="1"/>
+        </c16r3:dataDisplayOptions16>
+      </c:ext>
+    </c:extLst>
+    <c:showDLblsOverMax val="0"/>
+  </c:chart>
+  <c:spPr>
+    <a:noFill/>
+    <a:ln>
+      <a:noFill/>
+    </a:ln>
+    <a:effectLst/>
+  </c:spPr>
+  <c:txPr>
+    <a:bodyPr/>
+    <a:lstStyle/>
+    <a:p>
+      <a:pPr>
+        <a:defRPr/>
+      </a:pPr>
+      <a:endParaRPr lang="fr-FR"/>
+    </a:p>
+  </c:txPr>
+  <c:externalData r:id="rId3">
+    <c:autoUpdate val="0"/>
+  </c:externalData>
+</c:chartSpace>
+</file>
+
+<file path=ppt/charts/colors1.xml><?xml version="1.0" encoding="utf-8"?>
+<cs:colorStyle xmlns:cs="http://schemas.microsoft.com/office/drawing/2012/chartStyle" xmlns:a="http://schemas.openxmlformats.org/drawingml/2006/main" meth="cycle" id="10">
+  <a:schemeClr val="accent1"/>
+  <a:schemeClr val="accent2"/>
+  <a:schemeClr val="accent3"/>
+  <a:schemeClr val="accent4"/>
+  <a:schemeClr val="accent5"/>
+  <a:schemeClr val="accent6"/>
+  <cs:variation/>
+  <cs:variation>
+    <a:lumMod val="60000"/>
+  </cs:variation>
+  <cs:variation>
+    <a:lumMod val="80000"/>
+    <a:lumOff val="20000"/>
+  </cs:variation>
+  <cs:variation>
+    <a:lumMod val="80000"/>
+  </cs:variation>
+  <cs:variation>
+    <a:lumMod val="60000"/>
+    <a:lumOff val="40000"/>
+  </cs:variation>
+  <cs:variation>
+    <a:lumMod val="50000"/>
+  </cs:variation>
+  <cs:variation>
+    <a:lumMod val="70000"/>
+    <a:lumOff val="30000"/>
+  </cs:variation>
+  <cs:variation>
+    <a:lumMod val="70000"/>
+  </cs:variation>
+  <cs:variation>
+    <a:lumMod val="50000"/>
+    <a:lumOff val="50000"/>
+  </cs:variation>
+</cs:colorStyle>
+</file>
+
+<file path=ppt/charts/style1.xml><?xml version="1.0" encoding="utf-8"?>
+<cs:chartStyle xmlns:cs="http://schemas.microsoft.com/office/drawing/2012/chartStyle" xmlns:a="http://schemas.openxmlformats.org/drawingml/2006/main" id="251">
+  <cs:axisTitle>
+    <cs:lnRef idx="0"/>
+    <cs:fillRef idx="0"/>
+    <cs:effectRef idx="0"/>
+    <cs:fontRef idx="minor">
+      <a:schemeClr val="tx1">
+        <a:lumMod val="65000"/>
+        <a:lumOff val="35000"/>
+      </a:schemeClr>
+    </cs:fontRef>
+    <cs:defRPr sz="1330" kern="1200"/>
+  </cs:axisTitle>
+  <cs:categoryAxis>
+    <cs:lnRef idx="0"/>
+    <cs:fillRef idx="0"/>
+    <cs:effectRef idx="0"/>
+    <cs:fontRef idx="minor">
+      <a:schemeClr val="tx1">
+        <a:lumMod val="65000"/>
+        <a:lumOff val="35000"/>
+      </a:schemeClr>
+    </cs:fontRef>
+    <cs:spPr>
+      <a:ln w="9525" cap="flat" cmpd="sng" algn="ctr">
+        <a:solidFill>
+          <a:schemeClr val="tx1">
+            <a:lumMod val="15000"/>
+            <a:lumOff val="85000"/>
+          </a:schemeClr>
+        </a:solidFill>
+        <a:round/>
+      </a:ln>
+    </cs:spPr>
+    <cs:defRPr sz="1197" kern="1200"/>
+  </cs:categoryAxis>
+  <cs:chartArea mods="allowNoFillOverride allowNoLineOverride">
+    <cs:lnRef idx="0"/>
+    <cs:fillRef idx="0"/>
+    <cs:effectRef idx="0"/>
+    <cs:fontRef idx="minor">
+      <a:schemeClr val="tx1"/>
+    </cs:fontRef>
+    <cs:spPr>
+      <a:solidFill>
+        <a:schemeClr val="bg1"/>
+      </a:solidFill>
+      <a:ln w="9525" cap="flat" cmpd="sng" algn="ctr">
+        <a:solidFill>
+          <a:schemeClr val="tx1">
+            <a:lumMod val="15000"/>
+            <a:lumOff val="85000"/>
+          </a:schemeClr>
+        </a:solidFill>
+        <a:round/>
+      </a:ln>
+    </cs:spPr>
+    <cs:defRPr sz="1197" kern="1200"/>
+  </cs:chartArea>
+  <cs:dataLabel>
+    <cs:lnRef idx="0"/>
+    <cs:fillRef idx="0"/>
+    <cs:effectRef idx="0"/>
+    <cs:fontRef idx="minor">
+      <a:schemeClr val="tx1">
+        <a:lumMod val="75000"/>
+        <a:lumOff val="25000"/>
+      </a:schemeClr>
+    </cs:fontRef>
+    <cs:defRPr sz="1197" kern="1200"/>
+  </cs:dataLabel>
+  <cs:dataLabelCallout>
+    <cs:lnRef idx="0"/>
+    <cs:fillRef idx="0"/>
+    <cs:effectRef idx="0"/>
+    <cs:fontRef idx="minor">
+      <a:schemeClr val="dk1">
+        <a:lumMod val="65000"/>
+        <a:lumOff val="35000"/>
+      </a:schemeClr>
+    </cs:fontRef>
+    <cs:spPr>
+      <a:solidFill>
+        <a:schemeClr val="lt1"/>
+      </a:solidFill>
+      <a:ln>
+        <a:solidFill>
+          <a:schemeClr val="dk1">
+            <a:lumMod val="25000"/>
+            <a:lumOff val="75000"/>
+          </a:schemeClr>
+        </a:solidFill>
+      </a:ln>
+    </cs:spPr>
+    <cs:defRPr sz="1197" kern="1200"/>
+    <cs:bodyPr rot="0" spcFirstLastPara="1" vertOverflow="clip" horzOverflow="clip" vert="horz" wrap="square" lIns="36576" tIns="18288" rIns="36576" bIns="18288" anchor="ctr" anchorCtr="1">
+      <a:spAutoFit/>
+    </cs:bodyPr>
+  </cs:dataLabelCallout>
+  <cs:dataPoint>
+    <cs:lnRef idx="0"/>
+    <cs:fillRef idx="1">
+      <cs:styleClr val="auto"/>
+    </cs:fillRef>
+    <cs:effectRef idx="0"/>
+    <cs:fontRef idx="minor">
+      <a:schemeClr val="tx1"/>
+    </cs:fontRef>
+    <cs:spPr>
+      <a:ln w="19050">
+        <a:solidFill>
+          <a:schemeClr val="lt1"/>
+        </a:solidFill>
+      </a:ln>
+    </cs:spPr>
+  </cs:dataPoint>
+  <cs:dataPoint3D>
+    <cs:lnRef idx="0"/>
+    <cs:fillRef idx="1">
+      <cs:styleClr val="auto"/>
+    </cs:fillRef>
+    <cs:effectRef idx="0"/>
+    <cs:fontRef idx="minor">
+      <a:schemeClr val="tx1"/>
+    </cs:fontRef>
+    <cs:spPr>
+      <a:ln w="25400">
+        <a:solidFill>
+          <a:schemeClr val="lt1"/>
+        </a:solidFill>
+      </a:ln>
+    </cs:spPr>
+  </cs:dataPoint3D>
+  <cs:dataPointLine>
+    <cs:lnRef idx="0">
+      <cs:styleClr val="auto"/>
+    </cs:lnRef>
+    <cs:fillRef idx="0"/>
+    <cs:effectRef idx="0"/>
+    <cs:fontRef idx="minor">
+      <a:schemeClr val="tx1"/>
+    </cs:fontRef>
+    <cs:spPr>
+      <a:ln w="28575" cap="rnd">
+        <a:solidFill>
+          <a:schemeClr val="phClr"/>
+        </a:solidFill>
+        <a:round/>
+      </a:ln>
+    </cs:spPr>
+  </cs:dataPointLine>
+  <cs:dataPointMarker>
+    <cs:lnRef idx="0">
+      <cs:styleClr val="auto"/>
+    </cs:lnRef>
+    <cs:fillRef idx="1">
+      <cs:styleClr val="auto"/>
+    </cs:fillRef>
+    <cs:effectRef idx="0"/>
+    <cs:fontRef idx="minor">
+      <a:schemeClr val="tx1"/>
+    </cs:fontRef>
+    <cs:spPr>
+      <a:ln w="9525">
+        <a:solidFill>
+          <a:schemeClr val="phClr"/>
+        </a:solidFill>
+      </a:ln>
+    </cs:spPr>
+  </cs:dataPointMarker>
+  <cs:dataPointMarkerLayout symbol="circle" size="5"/>
+  <cs:dataPointWireframe>
+    <cs:lnRef idx="0">
+      <cs:styleClr val="auto"/>
+    </cs:lnRef>
+    <cs:fillRef idx="0"/>
+    <cs:effectRef idx="0"/>
+    <cs:fontRef idx="minor">
+      <a:schemeClr val="tx1"/>
+    </cs:fontRef>
+    <cs:spPr>
+      <a:ln w="9525" cap="rnd">
+        <a:solidFill>
+          <a:schemeClr val="phClr"/>
+        </a:solidFill>
+        <a:round/>
+      </a:ln>
+    </cs:spPr>
+  </cs:dataPointWireframe>
+  <cs:dataTable>
+    <cs:lnRef idx="0"/>
+    <cs:fillRef idx="0"/>
+    <cs:effectRef idx="0"/>
+    <cs:fontRef idx="minor">
+      <a:schemeClr val="tx1">
+        <a:lumMod val="65000"/>
+        <a:lumOff val="35000"/>
+      </a:schemeClr>
+    </cs:fontRef>
+    <cs:spPr>
+      <a:noFill/>
+      <a:ln w="9525" cap="flat" cmpd="sng" algn="ctr">
+        <a:solidFill>
+          <a:schemeClr val="tx1">
+            <a:lumMod val="15000"/>
+            <a:lumOff val="85000"/>
+          </a:schemeClr>
+        </a:solidFill>
+        <a:round/>
+      </a:ln>
+    </cs:spPr>
+    <cs:defRPr sz="1197" kern="1200"/>
+  </cs:dataTable>
+  <cs:downBar>
+    <cs:lnRef idx="0"/>
+    <cs:fillRef idx="0"/>
+    <cs:effectRef idx="0"/>
+    <cs:fontRef idx="minor">
+      <a:schemeClr val="tx1"/>
+    </cs:fontRef>
+    <cs:spPr>
+      <a:solidFill>
+        <a:schemeClr val="dk1">
+          <a:lumMod val="75000"/>
+          <a:lumOff val="25000"/>
+        </a:schemeClr>
+      </a:solidFill>
+      <a:ln w="9525" cap="flat" cmpd="sng" algn="ctr">
+        <a:solidFill>
+          <a:schemeClr val="tx1">
+            <a:lumMod val="65000"/>
+            <a:lumOff val="35000"/>
+          </a:schemeClr>
+        </a:solidFill>
+        <a:round/>
+      </a:ln>
+    </cs:spPr>
+  </cs:downBar>
+  <cs:dropLine>
+    <cs:lnRef idx="0"/>
+    <cs:fillRef idx="0"/>
+    <cs:effectRef idx="0"/>
+    <cs:fontRef idx="minor">
+      <a:schemeClr val="tx1"/>
+    </cs:fontRef>
+    <cs:spPr>
+      <a:ln w="9525" cap="flat" cmpd="sng" algn="ctr">
+        <a:solidFill>
+          <a:schemeClr val="tx1">
+            <a:lumMod val="35000"/>
+            <a:lumOff val="65000"/>
+          </a:schemeClr>
+        </a:solidFill>
+        <a:round/>
+      </a:ln>
+    </cs:spPr>
+  </cs:dropLine>
+  <cs:errorBar>
+    <cs:lnRef idx="0"/>
+    <cs:fillRef idx="0"/>
+    <cs:effectRef idx="0"/>
+    <cs:fontRef idx="minor">
+      <a:schemeClr val="tx1"/>
+    </cs:fontRef>
+    <cs:spPr>
+      <a:ln w="9525" cap="flat" cmpd="sng" algn="ctr">
+        <a:solidFill>
+          <a:schemeClr val="tx1">
+            <a:lumMod val="65000"/>
+            <a:lumOff val="35000"/>
+          </a:schemeClr>
+        </a:solidFill>
+        <a:round/>
+      </a:ln>
+    </cs:spPr>
+  </cs:errorBar>
+  <cs:floor>
+    <cs:lnRef idx="0"/>
+    <cs:fillRef idx="0"/>
+    <cs:effectRef idx="0"/>
+    <cs:fontRef idx="minor">
+      <a:schemeClr val="tx1"/>
+    </cs:fontRef>
+    <cs:spPr>
+      <a:noFill/>
+      <a:ln>
+        <a:noFill/>
+      </a:ln>
+    </cs:spPr>
+  </cs:floor>
+  <cs:gridlineMajor>
+    <cs:lnRef idx="0"/>
+    <cs:fillRef idx="0"/>
+    <cs:effectRef idx="0"/>
+    <cs:fontRef idx="minor">
+      <a:schemeClr val="tx1"/>
+    </cs:fontRef>
+    <cs:spPr>
+      <a:ln w="9525" cap="flat" cmpd="sng" algn="ctr">
+        <a:solidFill>
+          <a:schemeClr val="tx1">
+            <a:lumMod val="15000"/>
+            <a:lumOff val="85000"/>
+          </a:schemeClr>
+        </a:solidFill>
+        <a:round/>
+      </a:ln>
+    </cs:spPr>
+  </cs:gridlineMajor>
+  <cs:gridlineMinor>
+    <cs:lnRef idx="0"/>
+    <cs:fillRef idx="0"/>
+    <cs:effectRef idx="0"/>
+    <cs:fontRef idx="minor">
+      <a:schemeClr val="tx1"/>
+    </cs:fontRef>
+    <cs:spPr>
+      <a:ln w="9525" cap="flat" cmpd="sng" algn="ctr">
+        <a:solidFill>
+          <a:schemeClr val="tx1">
+            <a:lumMod val="5000"/>
+            <a:lumOff val="95000"/>
+          </a:schemeClr>
+        </a:solidFill>
+        <a:round/>
+      </a:ln>
+    </cs:spPr>
+  </cs:gridlineMinor>
+  <cs:hiLoLine>
+    <cs:lnRef idx="0"/>
+    <cs:fillRef idx="0"/>
+    <cs:effectRef idx="0"/>
+    <cs:fontRef idx="minor">
+      <a:schemeClr val="tx1"/>
+    </cs:fontRef>
+    <cs:spPr>
+      <a:ln w="9525" cap="flat" cmpd="sng" algn="ctr">
+        <a:solidFill>
+          <a:schemeClr val="tx1">
+            <a:lumMod val="50000"/>
+            <a:lumOff val="50000"/>
+          </a:schemeClr>
+        </a:solidFill>
+        <a:round/>
+      </a:ln>
+    </cs:spPr>
+  </cs:hiLoLine>
+  <cs:leaderLine>
+    <cs:lnRef idx="0"/>
+    <cs:fillRef idx="0"/>
+    <cs:effectRef idx="0"/>
+    <cs:fontRef idx="minor">
+      <a:schemeClr val="tx1"/>
+    </cs:fontRef>
+    <cs:spPr>
+      <a:ln w="9525" cap="flat" cmpd="sng" algn="ctr">
+        <a:solidFill>
+          <a:schemeClr val="tx1">
+            <a:lumMod val="35000"/>
+            <a:lumOff val="65000"/>
+          </a:schemeClr>
+        </a:solidFill>
+        <a:round/>
+      </a:ln>
+    </cs:spPr>
+  </cs:leaderLine>
+  <cs:legend>
+    <cs:lnRef idx="0"/>
+    <cs:fillRef idx="0"/>
+    <cs:effectRef idx="0"/>
+    <cs:fontRef idx="minor">
+      <a:schemeClr val="tx1">
+        <a:lumMod val="65000"/>
+        <a:lumOff val="35000"/>
+      </a:schemeClr>
+    </cs:fontRef>
+    <cs:defRPr sz="1197" kern="1200"/>
+  </cs:legend>
+  <cs:plotArea mods="allowNoFillOverride allowNoLineOverride">
+    <cs:lnRef idx="0"/>
+    <cs:fillRef idx="0"/>
+    <cs:effectRef idx="0"/>
+    <cs:fontRef idx="minor">
+      <a:schemeClr val="tx1"/>
+    </cs:fontRef>
+  </cs:plotArea>
+  <cs:plotArea3D mods="allowNoFillOverride allowNoLineOverride">
+    <cs:lnRef idx="0"/>
+    <cs:fillRef idx="0"/>
+    <cs:effectRef idx="0"/>
+    <cs:fontRef idx="minor">
+      <a:schemeClr val="tx1"/>
+    </cs:fontRef>
+  </cs:plotArea3D>
+  <cs:seriesAxis>
+    <cs:lnRef idx="0"/>
+    <cs:fillRef idx="0"/>
+    <cs:effectRef idx="0"/>
+    <cs:fontRef idx="minor">
+      <a:schemeClr val="tx1">
+        <a:lumMod val="65000"/>
+        <a:lumOff val="35000"/>
+      </a:schemeClr>
+    </cs:fontRef>
+    <cs:defRPr sz="1197" kern="1200"/>
+  </cs:seriesAxis>
+  <cs:seriesLine>
+    <cs:lnRef idx="0"/>
+    <cs:fillRef idx="0"/>
+    <cs:effectRef idx="0"/>
+    <cs:fontRef idx="minor">
+      <a:schemeClr val="tx1"/>
+    </cs:fontRef>
+    <cs:spPr>
+      <a:ln w="9525" cap="flat" cmpd="sng" algn="ctr">
+        <a:solidFill>
+          <a:schemeClr val="tx1">
+            <a:lumMod val="35000"/>
+            <a:lumOff val="65000"/>
+          </a:schemeClr>
+        </a:solidFill>
+        <a:round/>
+      </a:ln>
+    </cs:spPr>
+  </cs:seriesLine>
+  <cs:title>
+    <cs:lnRef idx="0"/>
+    <cs:fillRef idx="0"/>
+    <cs:effectRef idx="0"/>
+    <cs:fontRef idx="minor">
+      <a:schemeClr val="tx1">
+        <a:lumMod val="65000"/>
+        <a:lumOff val="35000"/>
+      </a:schemeClr>
+    </cs:fontRef>
+    <cs:defRPr sz="1862" b="0" kern="1200" spc="0" baseline="0"/>
+  </cs:title>
+  <cs:trendline>
+    <cs:lnRef idx="0">
+      <cs:styleClr val="auto"/>
+    </cs:lnRef>
+    <cs:fillRef idx="0"/>
+    <cs:effectRef idx="0"/>
+    <cs:fontRef idx="minor">
+      <a:schemeClr val="tx1"/>
+    </cs:fontRef>
+    <cs:spPr>
+      <a:ln w="19050" cap="rnd">
+        <a:solidFill>
+          <a:schemeClr val="phClr"/>
+        </a:solidFill>
+        <a:prstDash val="sysDot"/>
+      </a:ln>
+    </cs:spPr>
+  </cs:trendline>
+  <cs:trendlineLabel>
+    <cs:lnRef idx="0"/>
+    <cs:fillRef idx="0"/>
+    <cs:effectRef idx="0"/>
+    <cs:fontRef idx="minor">
+      <a:schemeClr val="tx1">
+        <a:lumMod val="65000"/>
+        <a:lumOff val="35000"/>
+      </a:schemeClr>
+    </cs:fontRef>
+    <cs:defRPr sz="1197" kern="1200"/>
+  </cs:trendlineLabel>
+  <cs:upBar>
+    <cs:lnRef idx="0"/>
+    <cs:fillRef idx="0"/>
+    <cs:effectRef idx="0"/>
+    <cs:fontRef idx="minor">
+      <a:schemeClr val="tx1"/>
+    </cs:fontRef>
+    <cs:spPr>
+      <a:solidFill>
+        <a:schemeClr val="lt1"/>
+      </a:solidFill>
+      <a:ln w="9525" cap="flat" cmpd="sng" algn="ctr">
+        <a:solidFill>
+          <a:schemeClr val="tx1">
+            <a:lumMod val="65000"/>
+            <a:lumOff val="35000"/>
+          </a:schemeClr>
+        </a:solidFill>
+        <a:round/>
+      </a:ln>
+    </cs:spPr>
+  </cs:upBar>
+  <cs:valueAxis>
+    <cs:lnRef idx="0"/>
+    <cs:fillRef idx="0"/>
+    <cs:effectRef idx="0"/>
+    <cs:fontRef idx="minor">
+      <a:schemeClr val="tx1">
+        <a:lumMod val="65000"/>
+        <a:lumOff val="35000"/>
+      </a:schemeClr>
+    </cs:fontRef>
+    <cs:defRPr sz="1197" kern="1200"/>
+  </cs:valueAxis>
+  <cs:wall>
+    <cs:lnRef idx="0"/>
+    <cs:fillRef idx="0"/>
+    <cs:effectRef idx="0"/>
+    <cs:fontRef idx="minor">
+      <a:schemeClr val="tx1"/>
+    </cs:fontRef>
+    <cs:spPr>
+      <a:noFill/>
+      <a:ln>
+        <a:noFill/>
+      </a:ln>
+    </cs:spPr>
+  </cs:wall>
+</cs:chartStyle>
 </file>
 
 <file path=ppt/handoutMasters/handoutMaster1.xml><?xml version="1.0" encoding="utf-8"?>
@@ -1258,6 +2254,115 @@
   <p:cSld>
     <p:spTree>
       <p:nvGrpSpPr>
+        <p:cNvPr id="1" name="Shape 203"/>
+        <p:cNvGrpSpPr/>
+        <p:nvPr/>
+      </p:nvGrpSpPr>
+      <p:grpSpPr>
+        <a:xfrm>
+          <a:off x="0" y="0"/>
+          <a:ext cx="0" cy="0"/>
+          <a:chOff x="0" y="0"/>
+          <a:chExt cx="0" cy="0"/>
+        </a:xfrm>
+      </p:grpSpPr>
+      <p:sp>
+        <p:nvSpPr>
+          <p:cNvPr id="204" name="Google Shape;204;g1b16c18d105_0_107:notes"/>
+          <p:cNvSpPr>
+            <a:spLocks noGrp="1" noRot="1" noChangeAspect="1"/>
+          </p:cNvSpPr>
+          <p:nvPr>
+            <p:ph type="sldImg" idx="2"/>
+          </p:nvPr>
+        </p:nvSpPr>
+        <p:spPr>
+          <a:xfrm>
+            <a:off x="381000" y="685800"/>
+            <a:ext cx="6096000" cy="3429000"/>
+          </a:xfrm>
+          <a:custGeom>
+            <a:avLst/>
+            <a:gdLst/>
+            <a:ahLst/>
+            <a:cxnLst/>
+            <a:rect l="l" t="t" r="r" b="b"/>
+            <a:pathLst>
+              <a:path w="120000" h="120000" extrusionOk="0">
+                <a:moveTo>
+                  <a:pt x="0" y="0"/>
+                </a:moveTo>
+                <a:lnTo>
+                  <a:pt x="120000" y="0"/>
+                </a:lnTo>
+                <a:lnTo>
+                  <a:pt x="120000" y="120000"/>
+                </a:lnTo>
+                <a:lnTo>
+                  <a:pt x="0" y="120000"/>
+                </a:lnTo>
+                <a:close/>
+              </a:path>
+            </a:pathLst>
+          </a:custGeom>
+        </p:spPr>
+      </p:sp>
+      <p:sp>
+        <p:nvSpPr>
+          <p:cNvPr id="205" name="Google Shape;205;g1b16c18d105_0_107:notes"/>
+          <p:cNvSpPr txBox="1">
+            <a:spLocks noGrp="1"/>
+          </p:cNvSpPr>
+          <p:nvPr>
+            <p:ph type="body" idx="1"/>
+          </p:nvPr>
+        </p:nvSpPr>
+        <p:spPr>
+          <a:xfrm>
+            <a:off x="685800" y="4343400"/>
+            <a:ext cx="5486400" cy="4114800"/>
+          </a:xfrm>
+          <a:prstGeom prst="rect">
+            <a:avLst/>
+          </a:prstGeom>
+        </p:spPr>
+        <p:txBody>
+          <a:bodyPr spcFirstLastPara="1" wrap="square" lIns="91425" tIns="91425" rIns="91425" bIns="91425" anchor="t" anchorCtr="0">
+            <a:noAutofit/>
+          </a:bodyPr>
+          <a:lstStyle/>
+          <a:p>
+            <a:pPr marL="0" lvl="0" indent="0" algn="l" rtl="0">
+              <a:spcBef>
+                <a:spcPts val="0"/>
+              </a:spcBef>
+              <a:spcAft>
+                <a:spcPts val="0"/>
+              </a:spcAft>
+              <a:buNone/>
+            </a:pPr>
+            <a:endParaRPr/>
+          </a:p>
+        </p:txBody>
+      </p:sp>
+    </p:spTree>
+    <p:extLst>
+      <p:ext uri="{BB962C8B-B14F-4D97-AF65-F5344CB8AC3E}">
+        <p14:creationId xmlns:p14="http://schemas.microsoft.com/office/powerpoint/2010/main" val="1032861148"/>
+      </p:ext>
+    </p:extLst>
+  </p:cSld>
+  <p:clrMapOvr>
+    <a:masterClrMapping/>
+  </p:clrMapOvr>
+</p:notes>
+</file>
+
+<file path=ppt/notesSlides/notesSlide5.xml><?xml version="1.0" encoding="utf-8"?>
+<p:notes xmlns:a="http://schemas.openxmlformats.org/drawingml/2006/main" xmlns:r="http://schemas.openxmlformats.org/officeDocument/2006/relationships" xmlns:p="http://schemas.openxmlformats.org/presentationml/2006/main" showMasterSp="0" showMasterPhAnim="0">
+  <p:cSld>
+    <p:spTree>
+      <p:nvGrpSpPr>
         <p:cNvPr id="1" name="Shape 462"/>
         <p:cNvGrpSpPr/>
         <p:nvPr/>
@@ -1362,7 +2467,7 @@
 </p:notes>
 </file>
 
-<file path=ppt/notesSlides/notesSlide5.xml><?xml version="1.0" encoding="utf-8"?>
+<file path=ppt/notesSlides/notesSlide6.xml><?xml version="1.0" encoding="utf-8"?>
 <p:notes xmlns:a="http://schemas.openxmlformats.org/drawingml/2006/main" xmlns:r="http://schemas.openxmlformats.org/officeDocument/2006/relationships" xmlns:p="http://schemas.openxmlformats.org/presentationml/2006/main" showMasterSp="0" showMasterPhAnim="0">
   <p:cSld>
     <p:spTree>
@@ -13960,104 +15065,6 @@
         <p:cNvPr id="1" name="">
           <a:extLst>
             <a:ext uri="{FF2B5EF4-FFF2-40B4-BE49-F238E27FC236}">
-              <a16:creationId xmlns:a16="http://schemas.microsoft.com/office/drawing/2014/main" id="{08F0F22B-A3A1-19BB-5E8F-5C7C801D5BFF}"/>
-            </a:ext>
-          </a:extLst>
-        </p:cNvPr>
-        <p:cNvGrpSpPr/>
-        <p:nvPr/>
-      </p:nvGrpSpPr>
-      <p:grpSpPr>
-        <a:xfrm>
-          <a:off x="0" y="0"/>
-          <a:ext cx="0" cy="0"/>
-          <a:chOff x="0" y="0"/>
-          <a:chExt cx="0" cy="0"/>
-        </a:xfrm>
-      </p:grpSpPr>
-      <p:sp>
-        <p:nvSpPr>
-          <p:cNvPr id="2" name="Titre 1">
-            <a:extLst>
-              <a:ext uri="{FF2B5EF4-FFF2-40B4-BE49-F238E27FC236}">
-                <a16:creationId xmlns:a16="http://schemas.microsoft.com/office/drawing/2014/main" id="{3019F34C-F1AF-D5E2-90D5-74955419DE4F}"/>
-              </a:ext>
-            </a:extLst>
-          </p:cNvPr>
-          <p:cNvSpPr>
-            <a:spLocks noGrp="1"/>
-          </p:cNvSpPr>
-          <p:nvPr>
-            <p:ph type="title"/>
-          </p:nvPr>
-        </p:nvSpPr>
-        <p:spPr/>
-        <p:txBody>
-          <a:bodyPr/>
-          <a:lstStyle/>
-          <a:p>
-            <a:r>
-              <a:rPr lang="fr-FR" dirty="0"/>
-              <a:t>Application web</a:t>
-            </a:r>
-            <a:br>
-              <a:rPr lang="fr-FR" dirty="0"/>
-            </a:br>
-            <a:endParaRPr lang="fr-FR" dirty="0"/>
-          </a:p>
-        </p:txBody>
-      </p:sp>
-      <p:pic>
-        <p:nvPicPr>
-          <p:cNvPr id="4" name="Image 3">
-            <a:extLst>
-              <a:ext uri="{FF2B5EF4-FFF2-40B4-BE49-F238E27FC236}">
-                <a16:creationId xmlns:a16="http://schemas.microsoft.com/office/drawing/2014/main" id="{291A9DAF-95C3-011B-C877-D72D4C1B9C73}"/>
-              </a:ext>
-            </a:extLst>
-          </p:cNvPr>
-          <p:cNvPicPr>
-            <a:picLocks noChangeAspect="1"/>
-          </p:cNvPicPr>
-          <p:nvPr/>
-        </p:nvPicPr>
-        <p:blipFill>
-          <a:blip r:embed="rId2"/>
-          <a:stretch>
-            <a:fillRect/>
-          </a:stretch>
-        </p:blipFill>
-        <p:spPr>
-          <a:xfrm>
-            <a:off x="3320298" y="1214324"/>
-            <a:ext cx="2503404" cy="3356475"/>
-          </a:xfrm>
-          <a:prstGeom prst="rect">
-            <a:avLst/>
-          </a:prstGeom>
-        </p:spPr>
-      </p:pic>
-    </p:spTree>
-    <p:extLst>
-      <p:ext uri="{BB962C8B-B14F-4D97-AF65-F5344CB8AC3E}">
-        <p14:creationId xmlns:p14="http://schemas.microsoft.com/office/powerpoint/2010/main" val="1265896715"/>
-      </p:ext>
-    </p:extLst>
-  </p:cSld>
-  <p:clrMapOvr>
-    <a:masterClrMapping/>
-  </p:clrMapOvr>
-</p:sld>
-</file>
-
-<file path=ppt/slides/slide11.xml><?xml version="1.0" encoding="utf-8"?>
-<p:sld xmlns:a="http://schemas.openxmlformats.org/drawingml/2006/main" xmlns:r="http://schemas.openxmlformats.org/officeDocument/2006/relationships" xmlns:p="http://schemas.openxmlformats.org/presentationml/2006/main">
-  <p:cSld>
-    <p:spTree>
-      <p:nvGrpSpPr>
-        <p:cNvPr id="1" name="">
-          <a:extLst>
-            <a:ext uri="{FF2B5EF4-FFF2-40B4-BE49-F238E27FC236}">
               <a16:creationId xmlns:a16="http://schemas.microsoft.com/office/drawing/2014/main" id="{FE6E1A45-E070-1E29-0921-DF82A8DBB38C}"/>
             </a:ext>
           </a:extLst>
@@ -14119,13 +15126,99 @@
         </p:nvSpPr>
         <p:spPr>
           <a:xfrm>
-            <a:off x="720000" y="1653350"/>
-            <a:ext cx="3601924" cy="2298300"/>
+            <a:off x="719999" y="1653350"/>
+            <a:ext cx="4237255" cy="2298300"/>
           </a:xfrm>
         </p:spPr>
         <p:txBody>
           <a:bodyPr/>
           <a:lstStyle/>
+          <a:p>
+            <a:r>
+              <a:rPr lang="fr-FR" dirty="0">
+                <a:solidFill>
+                  <a:srgbClr val="F8F8F8"/>
+                </a:solidFill>
+              </a:rPr>
+              <a:t>API first</a:t>
+            </a:r>
+          </a:p>
+          <a:p>
+            <a:r>
+              <a:rPr lang="fr-FR" dirty="0">
+                <a:solidFill>
+                  <a:srgbClr val="F8F8F8"/>
+                </a:solidFill>
+              </a:rPr>
+              <a:t>API RESTful</a:t>
+            </a:r>
+          </a:p>
+          <a:p>
+            <a:r>
+              <a:rPr lang="fr-FR" dirty="0">
+                <a:solidFill>
+                  <a:srgbClr val="F8F8F8"/>
+                </a:solidFill>
+              </a:rPr>
+              <a:t>Test de l’API</a:t>
+            </a:r>
+          </a:p>
+          <a:p>
+            <a:r>
+              <a:rPr lang="fr-FR" dirty="0">
+                <a:solidFill>
+                  <a:srgbClr val="F8F8F8"/>
+                </a:solidFill>
+              </a:rPr>
+              <a:t>Test de l’interface de l’application web</a:t>
+            </a:r>
+          </a:p>
+          <a:p>
+            <a:r>
+              <a:rPr lang="fr-FR" dirty="0">
+                <a:solidFill>
+                  <a:srgbClr val="F8F8F8"/>
+                </a:solidFill>
+              </a:rPr>
+              <a:t>JWT</a:t>
+            </a:r>
+          </a:p>
+          <a:p>
+            <a:r>
+              <a:rPr lang="fr-FR" dirty="0">
+                <a:solidFill>
+                  <a:srgbClr val="F8F8F8"/>
+                </a:solidFill>
+              </a:rPr>
+              <a:t>Token/</a:t>
+            </a:r>
+            <a:r>
+              <a:rPr lang="fr-FR" dirty="0" err="1">
+                <a:solidFill>
+                  <a:srgbClr val="F8F8F8"/>
+                </a:solidFill>
+              </a:rPr>
+              <a:t>Refresh</a:t>
+            </a:r>
+            <a:r>
+              <a:rPr lang="fr-FR" dirty="0">
+                <a:solidFill>
+                  <a:srgbClr val="F8F8F8"/>
+                </a:solidFill>
+              </a:rPr>
+              <a:t> Token</a:t>
+            </a:r>
+          </a:p>
+          <a:p>
+            <a:r>
+              <a:rPr lang="fr-FR" dirty="0">
+                <a:solidFill>
+                  <a:srgbClr val="F8F8F8"/>
+                </a:solidFill>
+              </a:rPr>
+              <a:t>CI/CD</a:t>
+            </a:r>
+          </a:p>
           <a:p>
             <a:endParaRPr lang="fr-FR" dirty="0">
               <a:solidFill>
@@ -14148,7 +15241,7 @@
 </p:sld>
 </file>
 
-<file path=ppt/slides/slide12.xml><?xml version="1.0" encoding="utf-8"?>
+<file path=ppt/slides/slide11.xml><?xml version="1.0" encoding="utf-8"?>
 <p:sld xmlns:a="http://schemas.openxmlformats.org/drawingml/2006/main" xmlns:r="http://schemas.openxmlformats.org/officeDocument/2006/relationships" xmlns:p="http://schemas.openxmlformats.org/presentationml/2006/main">
   <p:cSld>
     <p:spTree>
@@ -14217,17 +15310,85 @@
         </p:nvSpPr>
         <p:spPr>
           <a:xfrm>
-            <a:off x="720000" y="1653350"/>
-            <a:ext cx="3601924" cy="2298300"/>
+            <a:off x="719999" y="1653350"/>
+            <a:ext cx="7769531" cy="2298300"/>
           </a:xfrm>
         </p:spPr>
         <p:txBody>
           <a:bodyPr/>
           <a:lstStyle/>
           <a:p>
-            <a:endParaRPr lang="fr-FR" dirty="0">
+            <a:pPr algn="l"/>
+            <a:endParaRPr lang="fr-FR" sz="2000" b="1" i="0" dirty="0">
               <a:solidFill>
-                <a:srgbClr val="F8F8F8"/>
+                <a:schemeClr val="tx1"/>
+              </a:solidFill>
+              <a:effectLst/>
+              <a:latin typeface="-apple-system"/>
+            </a:endParaRPr>
+          </a:p>
+          <a:p>
+            <a:pPr algn="l"/>
+            <a:r>
+              <a:rPr lang="fr-FR" sz="2000" b="1" i="0" dirty="0">
+                <a:solidFill>
+                  <a:schemeClr val="tx1"/>
+                </a:solidFill>
+                <a:effectLst/>
+                <a:latin typeface="-apple-system"/>
+              </a:rPr>
+              <a:t>C1 - Adapter des applications sur un ensemble de supports</a:t>
+            </a:r>
+          </a:p>
+          <a:p>
+            <a:pPr lvl="1" algn="l">
+              <a:buFont typeface="Arial" panose="020B0604020202020204" pitchFamily="34" charset="0"/>
+              <a:buChar char="•"/>
+            </a:pPr>
+            <a:r>
+              <a:rPr lang="fr-FR" sz="1800" b="0" i="0" dirty="0">
+                <a:solidFill>
+                  <a:schemeClr val="tx1"/>
+                </a:solidFill>
+                <a:effectLst/>
+                <a:latin typeface="-apple-system"/>
+              </a:rPr>
+              <a:t>AC 1 Choisir et implémenter les architectures adaptées</a:t>
+            </a:r>
+          </a:p>
+          <a:p>
+            <a:pPr lvl="1" algn="l">
+              <a:buFont typeface="Arial" panose="020B0604020202020204" pitchFamily="34" charset="0"/>
+              <a:buChar char="•"/>
+            </a:pPr>
+            <a:r>
+              <a:rPr lang="fr-FR" sz="1800" b="0" i="0" dirty="0">
+                <a:solidFill>
+                  <a:schemeClr val="tx1"/>
+                </a:solidFill>
+                <a:effectLst/>
+                <a:latin typeface="-apple-system"/>
+              </a:rPr>
+              <a:t>AC 3 Intégrer des solutions dans un environnement de production</a:t>
+            </a:r>
+          </a:p>
+          <a:p>
+            <a:pPr lvl="1" algn="l">
+              <a:buFont typeface="Arial" panose="020B0604020202020204" pitchFamily="34" charset="0"/>
+              <a:buChar char="•"/>
+            </a:pPr>
+            <a:endParaRPr lang="fr-FR" b="0" i="0" dirty="0">
+              <a:solidFill>
+                <a:schemeClr val="tx1"/>
+              </a:solidFill>
+              <a:effectLst/>
+              <a:latin typeface="-apple-system"/>
+            </a:endParaRPr>
+          </a:p>
+          <a:p>
+            <a:endParaRPr lang="fr-FR" sz="1400" dirty="0">
+              <a:solidFill>
+                <a:schemeClr val="tx1"/>
               </a:solidFill>
             </a:endParaRPr>
           </a:p>
@@ -14246,7 +15407,308 @@
 </p:sld>
 </file>
 
+<file path=ppt/slides/slide12.xml><?xml version="1.0" encoding="utf-8"?>
+<p:sld xmlns:a="http://schemas.openxmlformats.org/drawingml/2006/main" xmlns:r="http://schemas.openxmlformats.org/officeDocument/2006/relationships" xmlns:p="http://schemas.openxmlformats.org/presentationml/2006/main">
+  <p:cSld>
+    <p:spTree>
+      <p:nvGrpSpPr>
+        <p:cNvPr id="1" name="">
+          <a:extLst>
+            <a:ext uri="{FF2B5EF4-FFF2-40B4-BE49-F238E27FC236}">
+              <a16:creationId xmlns:a16="http://schemas.microsoft.com/office/drawing/2014/main" id="{F28AFCE7-BDCF-C032-55B1-DB103D2D437A}"/>
+            </a:ext>
+          </a:extLst>
+        </p:cNvPr>
+        <p:cNvGrpSpPr/>
+        <p:nvPr/>
+      </p:nvGrpSpPr>
+      <p:grpSpPr>
+        <a:xfrm>
+          <a:off x="0" y="0"/>
+          <a:ext cx="0" cy="0"/>
+          <a:chOff x="0" y="0"/>
+          <a:chExt cx="0" cy="0"/>
+        </a:xfrm>
+      </p:grpSpPr>
+      <p:sp>
+        <p:nvSpPr>
+          <p:cNvPr id="2" name="Titre 1">
+            <a:extLst>
+              <a:ext uri="{FF2B5EF4-FFF2-40B4-BE49-F238E27FC236}">
+                <a16:creationId xmlns:a16="http://schemas.microsoft.com/office/drawing/2014/main" id="{843929CA-5C76-56E4-A497-CE9048CABDF7}"/>
+              </a:ext>
+            </a:extLst>
+          </p:cNvPr>
+          <p:cNvSpPr>
+            <a:spLocks noGrp="1"/>
+          </p:cNvSpPr>
+          <p:nvPr>
+            <p:ph type="title"/>
+          </p:nvPr>
+        </p:nvSpPr>
+        <p:spPr/>
+        <p:txBody>
+          <a:bodyPr/>
+          <a:lstStyle/>
+          <a:p>
+            <a:r>
+              <a:rPr lang="fr-FR" dirty="0"/>
+              <a:t>Compétences mises en œuvre </a:t>
+            </a:r>
+          </a:p>
+        </p:txBody>
+      </p:sp>
+      <p:sp>
+        <p:nvSpPr>
+          <p:cNvPr id="3" name="Sous-titre 2">
+            <a:extLst>
+              <a:ext uri="{FF2B5EF4-FFF2-40B4-BE49-F238E27FC236}">
+                <a16:creationId xmlns:a16="http://schemas.microsoft.com/office/drawing/2014/main" id="{ADA6B896-E226-27E9-2738-B04FF9E4747C}"/>
+              </a:ext>
+            </a:extLst>
+          </p:cNvPr>
+          <p:cNvSpPr>
+            <a:spLocks noGrp="1"/>
+          </p:cNvSpPr>
+          <p:nvPr>
+            <p:ph type="subTitle" idx="1"/>
+          </p:nvPr>
+        </p:nvSpPr>
+        <p:spPr>
+          <a:xfrm>
+            <a:off x="719999" y="1653350"/>
+            <a:ext cx="7769531" cy="2298300"/>
+          </a:xfrm>
+        </p:spPr>
+        <p:txBody>
+          <a:bodyPr/>
+          <a:lstStyle/>
+          <a:p>
+            <a:pPr lvl="1" algn="l">
+              <a:buFont typeface="Arial" panose="020B0604020202020204" pitchFamily="34" charset="0"/>
+              <a:buChar char="•"/>
+            </a:pPr>
+            <a:endParaRPr lang="fr-FR" sz="1200" b="0" i="0" dirty="0">
+              <a:solidFill>
+                <a:schemeClr val="tx1"/>
+              </a:solidFill>
+              <a:effectLst/>
+              <a:latin typeface="-apple-system"/>
+            </a:endParaRPr>
+          </a:p>
+          <a:p>
+            <a:pPr algn="l"/>
+            <a:r>
+              <a:rPr lang="fr-FR" sz="2000" b="1" i="0" dirty="0">
+                <a:solidFill>
+                  <a:schemeClr val="tx1"/>
+                </a:solidFill>
+                <a:effectLst/>
+                <a:latin typeface="-apple-system"/>
+              </a:rPr>
+              <a:t>C2 - Analyser et optimiser des applications</a:t>
+            </a:r>
+          </a:p>
+          <a:p>
+            <a:pPr lvl="1" algn="l">
+              <a:buFont typeface="Arial" panose="020B0604020202020204" pitchFamily="34" charset="0"/>
+              <a:buChar char="•"/>
+            </a:pPr>
+            <a:r>
+              <a:rPr lang="fr-FR" sz="1800" b="0" i="0" dirty="0">
+                <a:solidFill>
+                  <a:schemeClr val="tx1"/>
+                </a:solidFill>
+                <a:effectLst/>
+                <a:latin typeface="-apple-system"/>
+              </a:rPr>
+              <a:t>AC 1 Anticiper les résultats de diverses métriques (temps d’exécution, occupation mémoire…)</a:t>
+            </a:r>
+          </a:p>
+          <a:p>
+            <a:pPr lvl="1" algn="l">
+              <a:buFont typeface="Arial" panose="020B0604020202020204" pitchFamily="34" charset="0"/>
+              <a:buChar char="•"/>
+            </a:pPr>
+            <a:r>
+              <a:rPr lang="fr-FR" sz="1800" b="0" i="0" dirty="0">
+                <a:solidFill>
+                  <a:schemeClr val="tx1"/>
+                </a:solidFill>
+                <a:effectLst/>
+                <a:latin typeface="-apple-system"/>
+              </a:rPr>
+              <a:t>AC 3 Choisir et utiliser des bibliothèques et méthodes dédiées au domaine d’application (imagerie, immersion, intelligence artificielle, jeux vidéos, parallélisme, calcul formel…)</a:t>
+            </a:r>
+          </a:p>
+          <a:p>
+            <a:pPr lvl="1" algn="l">
+              <a:buFont typeface="Arial" panose="020B0604020202020204" pitchFamily="34" charset="0"/>
+              <a:buChar char="•"/>
+            </a:pPr>
+            <a:endParaRPr lang="fr-FR" sz="1200" b="0" i="0" dirty="0">
+              <a:solidFill>
+                <a:schemeClr val="tx1"/>
+              </a:solidFill>
+              <a:effectLst/>
+              <a:latin typeface="-apple-system"/>
+            </a:endParaRPr>
+          </a:p>
+        </p:txBody>
+      </p:sp>
+    </p:spTree>
+    <p:extLst>
+      <p:ext uri="{BB962C8B-B14F-4D97-AF65-F5344CB8AC3E}">
+        <p14:creationId xmlns:p14="http://schemas.microsoft.com/office/powerpoint/2010/main" val="3454067810"/>
+      </p:ext>
+    </p:extLst>
+  </p:cSld>
+  <p:clrMapOvr>
+    <a:masterClrMapping/>
+  </p:clrMapOvr>
+</p:sld>
+</file>
+
 <file path=ppt/slides/slide13.xml><?xml version="1.0" encoding="utf-8"?>
+<p:sld xmlns:a="http://schemas.openxmlformats.org/drawingml/2006/main" xmlns:r="http://schemas.openxmlformats.org/officeDocument/2006/relationships" xmlns:p="http://schemas.openxmlformats.org/presentationml/2006/main">
+  <p:cSld>
+    <p:spTree>
+      <p:nvGrpSpPr>
+        <p:cNvPr id="1" name="">
+          <a:extLst>
+            <a:ext uri="{FF2B5EF4-FFF2-40B4-BE49-F238E27FC236}">
+              <a16:creationId xmlns:a16="http://schemas.microsoft.com/office/drawing/2014/main" id="{DD86BB25-491A-A4A2-42A5-1AC2FC3C8938}"/>
+            </a:ext>
+          </a:extLst>
+        </p:cNvPr>
+        <p:cNvGrpSpPr/>
+        <p:nvPr/>
+      </p:nvGrpSpPr>
+      <p:grpSpPr>
+        <a:xfrm>
+          <a:off x="0" y="0"/>
+          <a:ext cx="0" cy="0"/>
+          <a:chOff x="0" y="0"/>
+          <a:chExt cx="0" cy="0"/>
+        </a:xfrm>
+      </p:grpSpPr>
+      <p:sp>
+        <p:nvSpPr>
+          <p:cNvPr id="2" name="Titre 1">
+            <a:extLst>
+              <a:ext uri="{FF2B5EF4-FFF2-40B4-BE49-F238E27FC236}">
+                <a16:creationId xmlns:a16="http://schemas.microsoft.com/office/drawing/2014/main" id="{5A3DFF06-EA44-8007-C002-57C1737D3BB1}"/>
+              </a:ext>
+            </a:extLst>
+          </p:cNvPr>
+          <p:cNvSpPr>
+            <a:spLocks noGrp="1"/>
+          </p:cNvSpPr>
+          <p:nvPr>
+            <p:ph type="title"/>
+          </p:nvPr>
+        </p:nvSpPr>
+        <p:spPr/>
+        <p:txBody>
+          <a:bodyPr/>
+          <a:lstStyle/>
+          <a:p>
+            <a:r>
+              <a:rPr lang="fr-FR" dirty="0"/>
+              <a:t>Compétences mises en œuvre </a:t>
+            </a:r>
+          </a:p>
+        </p:txBody>
+      </p:sp>
+      <p:sp>
+        <p:nvSpPr>
+          <p:cNvPr id="3" name="Sous-titre 2">
+            <a:extLst>
+              <a:ext uri="{FF2B5EF4-FFF2-40B4-BE49-F238E27FC236}">
+                <a16:creationId xmlns:a16="http://schemas.microsoft.com/office/drawing/2014/main" id="{75DAEE4F-67A3-B596-96F1-BDFABE37C2E2}"/>
+              </a:ext>
+            </a:extLst>
+          </p:cNvPr>
+          <p:cNvSpPr>
+            <a:spLocks noGrp="1"/>
+          </p:cNvSpPr>
+          <p:nvPr>
+            <p:ph type="subTitle" idx="1"/>
+          </p:nvPr>
+        </p:nvSpPr>
+        <p:spPr>
+          <a:xfrm>
+            <a:off x="719999" y="1653350"/>
+            <a:ext cx="7769531" cy="2298300"/>
+          </a:xfrm>
+        </p:spPr>
+        <p:txBody>
+          <a:bodyPr/>
+          <a:lstStyle/>
+          <a:p>
+            <a:pPr marL="596900" lvl="1" indent="0" algn="l">
+              <a:buNone/>
+            </a:pPr>
+            <a:endParaRPr lang="fr-FR" b="0" i="0" dirty="0">
+              <a:solidFill>
+                <a:schemeClr val="tx1"/>
+              </a:solidFill>
+              <a:effectLst/>
+              <a:latin typeface="-apple-system"/>
+            </a:endParaRPr>
+          </a:p>
+          <a:p>
+            <a:pPr algn="l"/>
+            <a:r>
+              <a:rPr lang="fr-FR" sz="2000" b="1" i="0" dirty="0">
+                <a:solidFill>
+                  <a:schemeClr val="tx1"/>
+                </a:solidFill>
+                <a:effectLst/>
+                <a:latin typeface="-apple-system"/>
+              </a:rPr>
+              <a:t>C6 - Manager une équipe informatique</a:t>
+            </a:r>
+          </a:p>
+          <a:p>
+            <a:pPr lvl="1" algn="l">
+              <a:buFont typeface="Arial" panose="020B0604020202020204" pitchFamily="34" charset="0"/>
+              <a:buChar char="•"/>
+            </a:pPr>
+            <a:r>
+              <a:rPr lang="fr-FR" sz="1800" b="0" i="0" dirty="0">
+                <a:solidFill>
+                  <a:schemeClr val="tx1"/>
+                </a:solidFill>
+                <a:effectLst/>
+                <a:latin typeface="-apple-system"/>
+              </a:rPr>
+              <a:t>AC 1 Organiser et partager une veille numérique</a:t>
+            </a:r>
+          </a:p>
+          <a:p>
+            <a:endParaRPr lang="fr-FR" sz="1400" dirty="0">
+              <a:solidFill>
+                <a:schemeClr val="tx1"/>
+              </a:solidFill>
+            </a:endParaRPr>
+          </a:p>
+        </p:txBody>
+      </p:sp>
+    </p:spTree>
+    <p:extLst>
+      <p:ext uri="{BB962C8B-B14F-4D97-AF65-F5344CB8AC3E}">
+        <p14:creationId xmlns:p14="http://schemas.microsoft.com/office/powerpoint/2010/main" val="1297909407"/>
+      </p:ext>
+    </p:extLst>
+  </p:cSld>
+  <p:clrMapOvr>
+    <a:masterClrMapping/>
+  </p:clrMapOvr>
+</p:sld>
+</file>
+
+<file path=ppt/slides/slide14.xml><?xml version="1.0" encoding="utf-8"?>
 <p:sld xmlns:a="http://schemas.openxmlformats.org/drawingml/2006/main" xmlns:r="http://schemas.openxmlformats.org/officeDocument/2006/relationships" xmlns:p="http://schemas.openxmlformats.org/presentationml/2006/main">
   <p:cSld>
     <p:spTree>
@@ -14297,40 +15759,36 @@
           </a:p>
         </p:txBody>
       </p:sp>
-      <p:sp>
-        <p:nvSpPr>
-          <p:cNvPr id="3" name="Sous-titre 2">
+      <p:pic>
+        <p:nvPicPr>
+          <p:cNvPr id="4" name="Image 3">
             <a:extLst>
               <a:ext uri="{FF2B5EF4-FFF2-40B4-BE49-F238E27FC236}">
-                <a16:creationId xmlns:a16="http://schemas.microsoft.com/office/drawing/2014/main" id="{3E3F8F7E-52A8-FB37-1917-23C8015991A1}"/>
+                <a16:creationId xmlns:a16="http://schemas.microsoft.com/office/drawing/2014/main" id="{319A860F-97EA-30A1-7BC0-2F69A800F01A}"/>
               </a:ext>
             </a:extLst>
           </p:cNvPr>
-          <p:cNvSpPr>
-            <a:spLocks noGrp="1"/>
-          </p:cNvSpPr>
-          <p:nvPr>
-            <p:ph type="subTitle" idx="1"/>
-          </p:nvPr>
-        </p:nvSpPr>
+          <p:cNvPicPr>
+            <a:picLocks noChangeAspect="1"/>
+          </p:cNvPicPr>
+          <p:nvPr/>
+        </p:nvPicPr>
+        <p:blipFill>
+          <a:blip r:embed="rId2"/>
+          <a:stretch>
+            <a:fillRect/>
+          </a:stretch>
+        </p:blipFill>
         <p:spPr>
           <a:xfrm>
-            <a:off x="720000" y="1653350"/>
-            <a:ext cx="3601924" cy="2298300"/>
+            <a:off x="1991001" y="1354959"/>
+            <a:ext cx="5161997" cy="3249041"/>
           </a:xfrm>
+          <a:prstGeom prst="rect">
+            <a:avLst/>
+          </a:prstGeom>
         </p:spPr>
-        <p:txBody>
-          <a:bodyPr/>
-          <a:lstStyle/>
-          <a:p>
-            <a:endParaRPr lang="fr-FR" dirty="0">
-              <a:solidFill>
-                <a:srgbClr val="F8F8F8"/>
-              </a:solidFill>
-            </a:endParaRPr>
-          </a:p>
-        </p:txBody>
-      </p:sp>
+      </p:pic>
     </p:spTree>
     <p:extLst>
       <p:ext uri="{BB962C8B-B14F-4D97-AF65-F5344CB8AC3E}">
@@ -14344,7 +15802,7 @@
 </p:sld>
 </file>
 
-<file path=ppt/slides/slide14.xml><?xml version="1.0" encoding="utf-8"?>
+<file path=ppt/slides/slide15.xml><?xml version="1.0" encoding="utf-8"?>
 <p:sld xmlns:a="http://schemas.openxmlformats.org/drawingml/2006/main" xmlns:r="http://schemas.openxmlformats.org/officeDocument/2006/relationships" xmlns:p="http://schemas.openxmlformats.org/presentationml/2006/main">
   <p:cSld>
     <p:spTree>
@@ -14352,7 +15810,7 @@
         <p:cNvPr id="1" name="">
           <a:extLst>
             <a:ext uri="{FF2B5EF4-FFF2-40B4-BE49-F238E27FC236}">
-              <a16:creationId xmlns:a16="http://schemas.microsoft.com/office/drawing/2014/main" id="{FFFFBD26-2972-3D9A-5CFD-AE14352BBC05}"/>
+              <a16:creationId xmlns:a16="http://schemas.microsoft.com/office/drawing/2014/main" id="{34EA85B8-17F2-E167-94D2-221EFD88D665}"/>
             </a:ext>
           </a:extLst>
         </p:cNvPr>
@@ -14372,7 +15830,7 @@
           <p:cNvPr id="2" name="Titre 1">
             <a:extLst>
               <a:ext uri="{FF2B5EF4-FFF2-40B4-BE49-F238E27FC236}">
-                <a16:creationId xmlns:a16="http://schemas.microsoft.com/office/drawing/2014/main" id="{2AAB5437-1166-71A8-2358-F0FCA006931C}"/>
+                <a16:creationId xmlns:a16="http://schemas.microsoft.com/office/drawing/2014/main" id="{00EFA617-3EDC-4FD3-7CA9-6ADCBC967738}"/>
               </a:ext>
             </a:extLst>
           </p:cNvPr>
@@ -14383,56 +15841,55 @@
             <p:ph type="title"/>
           </p:nvPr>
         </p:nvSpPr>
-        <p:spPr/>
+        <p:spPr>
+          <a:xfrm>
+            <a:off x="716550" y="53117"/>
+            <a:ext cx="7710900" cy="572700"/>
+          </a:xfrm>
+        </p:spPr>
         <p:txBody>
           <a:bodyPr/>
           <a:lstStyle/>
           <a:p>
             <a:r>
               <a:rPr lang="fr-FR" dirty="0"/>
-              <a:t>Conclusion</a:t>
+              <a:t>Temps passé sur le projet</a:t>
             </a:r>
           </a:p>
         </p:txBody>
       </p:sp>
-      <p:sp>
-        <p:nvSpPr>
-          <p:cNvPr id="3" name="Sous-titre 2">
+      <p:graphicFrame>
+        <p:nvGraphicFramePr>
+          <p:cNvPr id="17" name="Graphique 16">
             <a:extLst>
               <a:ext uri="{FF2B5EF4-FFF2-40B4-BE49-F238E27FC236}">
-                <a16:creationId xmlns:a16="http://schemas.microsoft.com/office/drawing/2014/main" id="{E56B1DC2-9F74-4675-D488-84F4DC9C64D4}"/>
+                <a16:creationId xmlns:a16="http://schemas.microsoft.com/office/drawing/2014/main" id="{89031376-62D4-3831-9763-8CF74443BD20}"/>
               </a:ext>
             </a:extLst>
           </p:cNvPr>
-          <p:cNvSpPr>
-            <a:spLocks noGrp="1"/>
-          </p:cNvSpPr>
+          <p:cNvGraphicFramePr/>
           <p:nvPr>
-            <p:ph type="subTitle" idx="1"/>
+            <p:extLst>
+              <p:ext uri="{D42A27DB-BD31-4B8C-83A1-F6EECF244321}">
+                <p14:modId xmlns:p14="http://schemas.microsoft.com/office/powerpoint/2010/main" val="3673706830"/>
+              </p:ext>
+            </p:extLst>
           </p:nvPr>
-        </p:nvSpPr>
-        <p:spPr>
-          <a:xfrm>
-            <a:off x="720000" y="1653350"/>
-            <a:ext cx="3601924" cy="2298300"/>
-          </a:xfrm>
-        </p:spPr>
-        <p:txBody>
-          <a:bodyPr/>
-          <a:lstStyle/>
-          <a:p>
-            <a:endParaRPr lang="fr-FR" dirty="0">
-              <a:solidFill>
-                <a:srgbClr val="F8F8F8"/>
-              </a:solidFill>
-            </a:endParaRPr>
-          </a:p>
-        </p:txBody>
-      </p:sp>
+        </p:nvGraphicFramePr>
+        <p:xfrm>
+          <a:off x="1378084" y="859281"/>
+          <a:ext cx="6943929" cy="4064000"/>
+        </p:xfrm>
+        <a:graphic>
+          <a:graphicData uri="http://schemas.openxmlformats.org/drawingml/2006/chart">
+            <c:chart xmlns:c="http://schemas.openxmlformats.org/drawingml/2006/chart" xmlns:r="http://schemas.openxmlformats.org/officeDocument/2006/relationships" r:id="rId2"/>
+          </a:graphicData>
+        </a:graphic>
+      </p:graphicFrame>
     </p:spTree>
     <p:extLst>
       <p:ext uri="{BB962C8B-B14F-4D97-AF65-F5344CB8AC3E}">
-        <p14:creationId xmlns:p14="http://schemas.microsoft.com/office/powerpoint/2010/main" val="3276771029"/>
+        <p14:creationId xmlns:p14="http://schemas.microsoft.com/office/powerpoint/2010/main" val="2166022073"/>
       </p:ext>
     </p:extLst>
   </p:cSld>
@@ -14442,7 +15899,1166 @@
 </p:sld>
 </file>
 
-<file path=ppt/slides/slide15.xml><?xml version="1.0" encoding="utf-8"?>
+<file path=ppt/slides/slide16.xml><?xml version="1.0" encoding="utf-8"?>
+<p:sld xmlns:a="http://schemas.openxmlformats.org/drawingml/2006/main" xmlns:r="http://schemas.openxmlformats.org/officeDocument/2006/relationships" xmlns:p="http://schemas.openxmlformats.org/presentationml/2006/main">
+  <p:cSld>
+    <p:spTree>
+      <p:nvGrpSpPr>
+        <p:cNvPr id="1" name="Shape 206"/>
+        <p:cNvGrpSpPr/>
+        <p:nvPr/>
+      </p:nvGrpSpPr>
+      <p:grpSpPr>
+        <a:xfrm>
+          <a:off x="0" y="0"/>
+          <a:ext cx="0" cy="0"/>
+          <a:chOff x="0" y="0"/>
+          <a:chExt cx="0" cy="0"/>
+        </a:xfrm>
+      </p:grpSpPr>
+      <p:sp>
+        <p:nvSpPr>
+          <p:cNvPr id="207" name="Google Shape;207;p16"/>
+          <p:cNvSpPr txBox="1">
+            <a:spLocks noGrp="1"/>
+          </p:cNvSpPr>
+          <p:nvPr>
+            <p:ph type="title"/>
+          </p:nvPr>
+        </p:nvSpPr>
+        <p:spPr>
+          <a:xfrm>
+            <a:off x="720000" y="539500"/>
+            <a:ext cx="7704000" cy="572700"/>
+          </a:xfrm>
+          <a:prstGeom prst="rect">
+            <a:avLst/>
+          </a:prstGeom>
+        </p:spPr>
+        <p:txBody>
+          <a:bodyPr spcFirstLastPara="1" wrap="square" lIns="91425" tIns="91425" rIns="91425" bIns="91425" anchor="t" anchorCtr="0">
+            <a:noAutofit/>
+          </a:bodyPr>
+          <a:lstStyle/>
+          <a:p>
+            <a:pPr marL="0" lvl="0" indent="0" algn="l" rtl="0">
+              <a:spcBef>
+                <a:spcPts val="0"/>
+              </a:spcBef>
+              <a:spcAft>
+                <a:spcPts val="0"/>
+              </a:spcAft>
+              <a:buNone/>
+            </a:pPr>
+            <a:r>
+              <a:rPr lang="en"/>
+              <a:t>Conclusion</a:t>
+            </a:r>
+            <a:endParaRPr/>
+          </a:p>
+        </p:txBody>
+      </p:sp>
+      <p:sp>
+        <p:nvSpPr>
+          <p:cNvPr id="208" name="Google Shape;208;p16"/>
+          <p:cNvSpPr/>
+          <p:nvPr/>
+        </p:nvSpPr>
+        <p:spPr>
+          <a:xfrm rot="16200000">
+            <a:off x="4062744" y="1702715"/>
+            <a:ext cx="965700" cy="965700"/>
+          </a:xfrm>
+          <a:prstGeom prst="rect">
+            <a:avLst/>
+          </a:prstGeom>
+          <a:solidFill>
+            <a:schemeClr val="accent3"/>
+          </a:solidFill>
+          <a:ln>
+            <a:noFill/>
+          </a:ln>
+        </p:spPr>
+        <p:txBody>
+          <a:bodyPr spcFirstLastPara="1" wrap="square" lIns="91425" tIns="91425" rIns="91425" bIns="91425" anchor="ctr" anchorCtr="0">
+            <a:noAutofit/>
+          </a:bodyPr>
+          <a:lstStyle/>
+          <a:p>
+            <a:pPr marL="0" lvl="0" indent="0" algn="l" rtl="0">
+              <a:spcBef>
+                <a:spcPts val="0"/>
+              </a:spcBef>
+              <a:spcAft>
+                <a:spcPts val="0"/>
+              </a:spcAft>
+              <a:buNone/>
+            </a:pPr>
+            <a:endParaRPr/>
+          </a:p>
+        </p:txBody>
+      </p:sp>
+      <p:grpSp>
+        <p:nvGrpSpPr>
+          <p:cNvPr id="209" name="Google Shape;209;p16"/>
+          <p:cNvGrpSpPr/>
+          <p:nvPr/>
+        </p:nvGrpSpPr>
+        <p:grpSpPr>
+          <a:xfrm>
+            <a:off x="713213" y="3694636"/>
+            <a:ext cx="2040312" cy="786947"/>
+            <a:chOff x="713213" y="3770836"/>
+            <a:chExt cx="2040312" cy="786947"/>
+          </a:xfrm>
+        </p:grpSpPr>
+        <p:sp>
+          <p:nvSpPr>
+            <p:cNvPr id="210" name="Google Shape;210;p16"/>
+            <p:cNvSpPr txBox="1"/>
+            <p:nvPr/>
+          </p:nvSpPr>
+          <p:spPr>
+            <a:xfrm>
+              <a:off x="713225" y="3770836"/>
+              <a:ext cx="2040300" cy="457200"/>
+            </a:xfrm>
+            <a:prstGeom prst="rect">
+              <a:avLst/>
+            </a:prstGeom>
+            <a:noFill/>
+            <a:ln>
+              <a:noFill/>
+            </a:ln>
+          </p:spPr>
+          <p:txBody>
+            <a:bodyPr spcFirstLastPara="1" wrap="square" lIns="91425" tIns="91425" rIns="91425" bIns="91425" anchor="b" anchorCtr="0">
+              <a:noAutofit/>
+            </a:bodyPr>
+            <a:lstStyle/>
+            <a:p>
+              <a:pPr marL="0" lvl="0" indent="0" algn="ctr" rtl="0">
+                <a:spcBef>
+                  <a:spcPts val="0"/>
+                </a:spcBef>
+                <a:spcAft>
+                  <a:spcPts val="0"/>
+                </a:spcAft>
+                <a:buNone/>
+              </a:pPr>
+              <a:r>
+                <a:rPr lang="fr-FR" sz="2000" dirty="0">
+                  <a:solidFill>
+                    <a:schemeClr val="dk1"/>
+                  </a:solidFill>
+                  <a:latin typeface="Share Tech"/>
+                  <a:ea typeface="Share Tech"/>
+                  <a:cs typeface="Share Tech"/>
+                  <a:sym typeface="Share Tech"/>
+                </a:rPr>
+                <a:t>ORGANISATION</a:t>
+              </a:r>
+              <a:endParaRPr sz="2000" dirty="0">
+                <a:solidFill>
+                  <a:schemeClr val="dk1"/>
+                </a:solidFill>
+                <a:latin typeface="Share Tech"/>
+                <a:ea typeface="Share Tech"/>
+                <a:cs typeface="Share Tech"/>
+                <a:sym typeface="Share Tech"/>
+              </a:endParaRPr>
+            </a:p>
+          </p:txBody>
+        </p:sp>
+        <p:sp>
+          <p:nvSpPr>
+            <p:cNvPr id="211" name="Google Shape;211;p16"/>
+            <p:cNvSpPr txBox="1"/>
+            <p:nvPr/>
+          </p:nvSpPr>
+          <p:spPr>
+            <a:xfrm>
+              <a:off x="713213" y="4073283"/>
+              <a:ext cx="2040300" cy="484500"/>
+            </a:xfrm>
+            <a:prstGeom prst="rect">
+              <a:avLst/>
+            </a:prstGeom>
+            <a:noFill/>
+            <a:ln>
+              <a:noFill/>
+            </a:ln>
+          </p:spPr>
+          <p:txBody>
+            <a:bodyPr spcFirstLastPara="1" wrap="square" lIns="91425" tIns="91425" rIns="91425" bIns="91425" anchor="t" anchorCtr="0">
+              <a:noAutofit/>
+            </a:bodyPr>
+            <a:lstStyle/>
+            <a:p>
+              <a:pPr marL="0" lvl="0" indent="0" algn="ctr" rtl="0">
+                <a:spcBef>
+                  <a:spcPts val="0"/>
+                </a:spcBef>
+                <a:spcAft>
+                  <a:spcPts val="0"/>
+                </a:spcAft>
+                <a:buNone/>
+              </a:pPr>
+              <a:r>
+                <a:rPr lang="fr-FR" dirty="0">
+                  <a:solidFill>
+                    <a:schemeClr val="dk1"/>
+                  </a:solidFill>
+                  <a:latin typeface="Maven Pro"/>
+                  <a:ea typeface="Maven Pro"/>
+                  <a:cs typeface="Maven Pro"/>
+                  <a:sym typeface="Maven Pro"/>
+                </a:rPr>
+                <a:t>a permis d’atteindre les objectifs attendus</a:t>
+              </a:r>
+              <a:endParaRPr dirty="0">
+                <a:solidFill>
+                  <a:schemeClr val="dk1"/>
+                </a:solidFill>
+                <a:latin typeface="Maven Pro"/>
+                <a:ea typeface="Maven Pro"/>
+                <a:cs typeface="Maven Pro"/>
+                <a:sym typeface="Maven Pro"/>
+              </a:endParaRPr>
+            </a:p>
+          </p:txBody>
+        </p:sp>
+      </p:grpSp>
+      <p:sp>
+        <p:nvSpPr>
+          <p:cNvPr id="212" name="Google Shape;212;p16"/>
+          <p:cNvSpPr/>
+          <p:nvPr/>
+        </p:nvSpPr>
+        <p:spPr>
+          <a:xfrm rot="10800000">
+            <a:off x="3426573" y="2349908"/>
+            <a:ext cx="2279671" cy="1087679"/>
+          </a:xfrm>
+          <a:custGeom>
+            <a:avLst/>
+            <a:gdLst/>
+            <a:ahLst/>
+            <a:cxnLst/>
+            <a:rect l="l" t="t" r="r" b="b"/>
+            <a:pathLst>
+              <a:path w="66087" h="33020" extrusionOk="0">
+                <a:moveTo>
+                  <a:pt x="33019" y="0"/>
+                </a:moveTo>
+                <a:cubicBezTo>
+                  <a:pt x="14818" y="0"/>
+                  <a:pt x="0" y="14808"/>
+                  <a:pt x="0" y="33019"/>
+                </a:cubicBezTo>
+                <a:lnTo>
+                  <a:pt x="1659" y="33019"/>
+                </a:lnTo>
+                <a:cubicBezTo>
+                  <a:pt x="1659" y="15718"/>
+                  <a:pt x="15718" y="1659"/>
+                  <a:pt x="33019" y="1659"/>
+                </a:cubicBezTo>
+                <a:cubicBezTo>
+                  <a:pt x="50321" y="1659"/>
+                  <a:pt x="64427" y="15718"/>
+                  <a:pt x="64427" y="33019"/>
+                </a:cubicBezTo>
+                <a:lnTo>
+                  <a:pt x="66086" y="33019"/>
+                </a:lnTo>
+                <a:cubicBezTo>
+                  <a:pt x="66086" y="14808"/>
+                  <a:pt x="51269" y="0"/>
+                  <a:pt x="33019" y="0"/>
+                </a:cubicBezTo>
+                <a:close/>
+              </a:path>
+            </a:pathLst>
+          </a:custGeom>
+          <a:solidFill>
+            <a:schemeClr val="accent2"/>
+          </a:solidFill>
+          <a:ln>
+            <a:noFill/>
+          </a:ln>
+        </p:spPr>
+        <p:txBody>
+          <a:bodyPr spcFirstLastPara="1" wrap="square" lIns="91425" tIns="91425" rIns="91425" bIns="91425" anchor="ctr" anchorCtr="0">
+            <a:noAutofit/>
+          </a:bodyPr>
+          <a:lstStyle/>
+          <a:p>
+            <a:pPr marL="0" lvl="0" indent="0" algn="l" rtl="0">
+              <a:spcBef>
+                <a:spcPts val="0"/>
+              </a:spcBef>
+              <a:spcAft>
+                <a:spcPts val="0"/>
+              </a:spcAft>
+              <a:buNone/>
+            </a:pPr>
+            <a:endParaRPr/>
+          </a:p>
+        </p:txBody>
+      </p:sp>
+      <p:sp>
+        <p:nvSpPr>
+          <p:cNvPr id="213" name="Google Shape;213;p16"/>
+          <p:cNvSpPr/>
+          <p:nvPr/>
+        </p:nvSpPr>
+        <p:spPr>
+          <a:xfrm rot="10800000">
+            <a:off x="5064850" y="3216360"/>
+            <a:ext cx="123900" cy="123900"/>
+          </a:xfrm>
+          <a:prstGeom prst="ellipse">
+            <a:avLst/>
+          </a:prstGeom>
+          <a:solidFill>
+            <a:schemeClr val="lt2"/>
+          </a:solidFill>
+          <a:ln>
+            <a:noFill/>
+          </a:ln>
+        </p:spPr>
+        <p:txBody>
+          <a:bodyPr spcFirstLastPara="1" wrap="square" lIns="91425" tIns="91425" rIns="91425" bIns="91425" anchor="ctr" anchorCtr="0">
+            <a:noAutofit/>
+          </a:bodyPr>
+          <a:lstStyle/>
+          <a:p>
+            <a:pPr marL="0" lvl="0" indent="0" algn="l" rtl="0">
+              <a:spcBef>
+                <a:spcPts val="0"/>
+              </a:spcBef>
+              <a:spcAft>
+                <a:spcPts val="0"/>
+              </a:spcAft>
+              <a:buNone/>
+            </a:pPr>
+            <a:endParaRPr/>
+          </a:p>
+        </p:txBody>
+      </p:sp>
+      <p:sp>
+        <p:nvSpPr>
+          <p:cNvPr id="214" name="Google Shape;214;p16"/>
+          <p:cNvSpPr/>
+          <p:nvPr/>
+        </p:nvSpPr>
+        <p:spPr>
+          <a:xfrm rot="10800000">
+            <a:off x="3969131" y="3216360"/>
+            <a:ext cx="123900" cy="123900"/>
+          </a:xfrm>
+          <a:prstGeom prst="ellipse">
+            <a:avLst/>
+          </a:prstGeom>
+          <a:solidFill>
+            <a:schemeClr val="lt2"/>
+          </a:solidFill>
+          <a:ln>
+            <a:noFill/>
+          </a:ln>
+        </p:spPr>
+        <p:txBody>
+          <a:bodyPr spcFirstLastPara="1" wrap="square" lIns="91425" tIns="91425" rIns="91425" bIns="91425" anchor="ctr" anchorCtr="0">
+            <a:noAutofit/>
+          </a:bodyPr>
+          <a:lstStyle/>
+          <a:p>
+            <a:pPr marL="0" lvl="0" indent="0" algn="l" rtl="0">
+              <a:spcBef>
+                <a:spcPts val="0"/>
+              </a:spcBef>
+              <a:spcAft>
+                <a:spcPts val="0"/>
+              </a:spcAft>
+              <a:buNone/>
+            </a:pPr>
+            <a:endParaRPr/>
+          </a:p>
+        </p:txBody>
+      </p:sp>
+      <p:sp>
+        <p:nvSpPr>
+          <p:cNvPr id="216" name="Google Shape;216;p16"/>
+          <p:cNvSpPr/>
+          <p:nvPr/>
+        </p:nvSpPr>
+        <p:spPr>
+          <a:xfrm rot="10800000">
+            <a:off x="5429149" y="2885104"/>
+            <a:ext cx="123900" cy="123900"/>
+          </a:xfrm>
+          <a:prstGeom prst="ellipse">
+            <a:avLst/>
+          </a:prstGeom>
+          <a:solidFill>
+            <a:schemeClr val="lt2"/>
+          </a:solidFill>
+          <a:ln>
+            <a:noFill/>
+          </a:ln>
+        </p:spPr>
+        <p:txBody>
+          <a:bodyPr spcFirstLastPara="1" wrap="square" lIns="91425" tIns="91425" rIns="91425" bIns="91425" anchor="ctr" anchorCtr="0">
+            <a:noAutofit/>
+          </a:bodyPr>
+          <a:lstStyle/>
+          <a:p>
+            <a:pPr marL="0" lvl="0" indent="0" algn="l" rtl="0">
+              <a:spcBef>
+                <a:spcPts val="0"/>
+              </a:spcBef>
+              <a:spcAft>
+                <a:spcPts val="0"/>
+              </a:spcAft>
+              <a:buNone/>
+            </a:pPr>
+            <a:endParaRPr/>
+          </a:p>
+        </p:txBody>
+      </p:sp>
+      <p:sp>
+        <p:nvSpPr>
+          <p:cNvPr id="217" name="Google Shape;217;p16"/>
+          <p:cNvSpPr/>
+          <p:nvPr/>
+        </p:nvSpPr>
+        <p:spPr>
+          <a:xfrm rot="10800000">
+            <a:off x="3589581" y="2885104"/>
+            <a:ext cx="123900" cy="123900"/>
+          </a:xfrm>
+          <a:prstGeom prst="ellipse">
+            <a:avLst/>
+          </a:prstGeom>
+          <a:solidFill>
+            <a:schemeClr val="lt2"/>
+          </a:solidFill>
+          <a:ln>
+            <a:noFill/>
+          </a:ln>
+        </p:spPr>
+        <p:txBody>
+          <a:bodyPr spcFirstLastPara="1" wrap="square" lIns="91425" tIns="91425" rIns="91425" bIns="91425" anchor="ctr" anchorCtr="0">
+            <a:noAutofit/>
+          </a:bodyPr>
+          <a:lstStyle/>
+          <a:p>
+            <a:pPr marL="0" lvl="0" indent="0" algn="l" rtl="0">
+              <a:spcBef>
+                <a:spcPts val="0"/>
+              </a:spcBef>
+              <a:spcAft>
+                <a:spcPts val="0"/>
+              </a:spcAft>
+              <a:buNone/>
+            </a:pPr>
+            <a:endParaRPr/>
+          </a:p>
+        </p:txBody>
+      </p:sp>
+      <p:grpSp>
+        <p:nvGrpSpPr>
+          <p:cNvPr id="221" name="Google Shape;221;p16"/>
+          <p:cNvGrpSpPr/>
+          <p:nvPr/>
+        </p:nvGrpSpPr>
+        <p:grpSpPr>
+          <a:xfrm>
+            <a:off x="6390463" y="3618436"/>
+            <a:ext cx="2040312" cy="786947"/>
+            <a:chOff x="6381263" y="3770836"/>
+            <a:chExt cx="2040312" cy="786947"/>
+          </a:xfrm>
+        </p:grpSpPr>
+        <p:sp>
+          <p:nvSpPr>
+            <p:cNvPr id="222" name="Google Shape;222;p16"/>
+            <p:cNvSpPr txBox="1"/>
+            <p:nvPr/>
+          </p:nvSpPr>
+          <p:spPr>
+            <a:xfrm>
+              <a:off x="6381275" y="3770836"/>
+              <a:ext cx="2040300" cy="457200"/>
+            </a:xfrm>
+            <a:prstGeom prst="rect">
+              <a:avLst/>
+            </a:prstGeom>
+            <a:noFill/>
+            <a:ln>
+              <a:noFill/>
+            </a:ln>
+          </p:spPr>
+          <p:txBody>
+            <a:bodyPr spcFirstLastPara="1" wrap="square" lIns="91425" tIns="91425" rIns="91425" bIns="91425" anchor="b" anchorCtr="0">
+              <a:noAutofit/>
+            </a:bodyPr>
+            <a:lstStyle/>
+            <a:p>
+              <a:pPr marL="0" lvl="0" indent="0" algn="ctr" rtl="0">
+                <a:spcBef>
+                  <a:spcPts val="0"/>
+                </a:spcBef>
+                <a:spcAft>
+                  <a:spcPts val="0"/>
+                </a:spcAft>
+                <a:buNone/>
+              </a:pPr>
+              <a:r>
+                <a:rPr lang="fr-FR" sz="2000" dirty="0">
+                  <a:solidFill>
+                    <a:schemeClr val="dk1"/>
+                  </a:solidFill>
+                  <a:latin typeface="Share Tech"/>
+                  <a:ea typeface="Share Tech"/>
+                  <a:cs typeface="Share Tech"/>
+                  <a:sym typeface="Share Tech"/>
+                </a:rPr>
+                <a:t>Qualité</a:t>
+              </a:r>
+            </a:p>
+          </p:txBody>
+        </p:sp>
+        <p:sp>
+          <p:nvSpPr>
+            <p:cNvPr id="223" name="Google Shape;223;p16"/>
+            <p:cNvSpPr txBox="1"/>
+            <p:nvPr/>
+          </p:nvSpPr>
+          <p:spPr>
+            <a:xfrm>
+              <a:off x="6381263" y="4073283"/>
+              <a:ext cx="2040300" cy="484500"/>
+            </a:xfrm>
+            <a:prstGeom prst="rect">
+              <a:avLst/>
+            </a:prstGeom>
+            <a:noFill/>
+            <a:ln>
+              <a:noFill/>
+            </a:ln>
+          </p:spPr>
+          <p:txBody>
+            <a:bodyPr spcFirstLastPara="1" wrap="square" lIns="91425" tIns="91425" rIns="91425" bIns="91425" anchor="t" anchorCtr="0">
+              <a:noAutofit/>
+            </a:bodyPr>
+            <a:lstStyle/>
+            <a:p>
+              <a:pPr algn="ctr"/>
+              <a:r>
+                <a:rPr lang="fr-FR" dirty="0">
+                  <a:solidFill>
+                    <a:schemeClr val="dk1"/>
+                  </a:solidFill>
+                  <a:latin typeface="Maven Pro"/>
+                  <a:ea typeface="Maven Pro"/>
+                  <a:cs typeface="Maven Pro"/>
+                  <a:sym typeface="Maven Pro"/>
+                </a:rPr>
+                <a:t>de travail est fortement améliorer</a:t>
+              </a:r>
+            </a:p>
+            <a:p>
+              <a:pPr algn="ctr"/>
+              <a:endParaRPr dirty="0">
+                <a:solidFill>
+                  <a:schemeClr val="dk1"/>
+                </a:solidFill>
+                <a:latin typeface="Maven Pro"/>
+                <a:ea typeface="Maven Pro"/>
+                <a:cs typeface="Maven Pro"/>
+                <a:sym typeface="Maven Pro"/>
+              </a:endParaRPr>
+            </a:p>
+          </p:txBody>
+        </p:sp>
+      </p:grpSp>
+      <p:grpSp>
+        <p:nvGrpSpPr>
+          <p:cNvPr id="224" name="Google Shape;224;p16"/>
+          <p:cNvGrpSpPr/>
+          <p:nvPr/>
+        </p:nvGrpSpPr>
+        <p:grpSpPr>
+          <a:xfrm>
+            <a:off x="6357635" y="1845103"/>
+            <a:ext cx="2105955" cy="786947"/>
+            <a:chOff x="6385862" y="2479650"/>
+            <a:chExt cx="2105955" cy="786947"/>
+          </a:xfrm>
+        </p:grpSpPr>
+        <p:sp>
+          <p:nvSpPr>
+            <p:cNvPr id="225" name="Google Shape;225;p16"/>
+            <p:cNvSpPr txBox="1"/>
+            <p:nvPr/>
+          </p:nvSpPr>
+          <p:spPr>
+            <a:xfrm>
+              <a:off x="6385875" y="2479650"/>
+              <a:ext cx="2040300" cy="457200"/>
+            </a:xfrm>
+            <a:prstGeom prst="rect">
+              <a:avLst/>
+            </a:prstGeom>
+            <a:noFill/>
+            <a:ln>
+              <a:noFill/>
+            </a:ln>
+          </p:spPr>
+          <p:txBody>
+            <a:bodyPr spcFirstLastPara="1" wrap="square" lIns="91425" tIns="91425" rIns="91425" bIns="91425" anchor="b" anchorCtr="0">
+              <a:noAutofit/>
+            </a:bodyPr>
+            <a:lstStyle/>
+            <a:p>
+              <a:pPr marL="0" lvl="0" indent="0" algn="ctr" rtl="0">
+                <a:spcBef>
+                  <a:spcPts val="0"/>
+                </a:spcBef>
+                <a:spcAft>
+                  <a:spcPts val="0"/>
+                </a:spcAft>
+                <a:buNone/>
+              </a:pPr>
+              <a:r>
+                <a:rPr lang="fr-FR" sz="2000" dirty="0">
+                  <a:solidFill>
+                    <a:schemeClr val="dk1"/>
+                  </a:solidFill>
+                  <a:latin typeface="Share Tech"/>
+                  <a:ea typeface="Share Tech"/>
+                  <a:cs typeface="Share Tech"/>
+                  <a:sym typeface="Share Tech"/>
+                </a:rPr>
+                <a:t>ALLER PLUS LOIN</a:t>
+              </a:r>
+              <a:endParaRPr sz="2000" dirty="0">
+                <a:solidFill>
+                  <a:schemeClr val="dk1"/>
+                </a:solidFill>
+                <a:latin typeface="Share Tech"/>
+                <a:ea typeface="Share Tech"/>
+                <a:cs typeface="Share Tech"/>
+                <a:sym typeface="Share Tech"/>
+              </a:endParaRPr>
+            </a:p>
+          </p:txBody>
+        </p:sp>
+        <p:sp>
+          <p:nvSpPr>
+            <p:cNvPr id="226" name="Google Shape;226;p16"/>
+            <p:cNvSpPr txBox="1"/>
+            <p:nvPr/>
+          </p:nvSpPr>
+          <p:spPr>
+            <a:xfrm>
+              <a:off x="6385862" y="2782097"/>
+              <a:ext cx="2105955" cy="484500"/>
+            </a:xfrm>
+            <a:prstGeom prst="rect">
+              <a:avLst/>
+            </a:prstGeom>
+            <a:noFill/>
+            <a:ln>
+              <a:noFill/>
+            </a:ln>
+          </p:spPr>
+          <p:txBody>
+            <a:bodyPr spcFirstLastPara="1" wrap="square" lIns="91425" tIns="91425" rIns="91425" bIns="91425" anchor="t" anchorCtr="0">
+              <a:noAutofit/>
+            </a:bodyPr>
+            <a:lstStyle/>
+            <a:p>
+              <a:pPr marL="0" lvl="0" indent="0" algn="ctr" rtl="0">
+                <a:spcBef>
+                  <a:spcPts val="0"/>
+                </a:spcBef>
+                <a:spcAft>
+                  <a:spcPts val="0"/>
+                </a:spcAft>
+                <a:buNone/>
+              </a:pPr>
+              <a:r>
+                <a:rPr lang="fr-FR" dirty="0">
+                  <a:solidFill>
+                    <a:schemeClr val="dk1"/>
+                  </a:solidFill>
+                  <a:latin typeface="Maven Pro"/>
+                  <a:ea typeface="Maven Pro"/>
+                  <a:cs typeface="Maven Pro"/>
+                  <a:sym typeface="Maven Pro"/>
+                </a:rPr>
+                <a:t>dans les fonctionnalités, la sécurité, la gestion du projet et la qualité générale </a:t>
+              </a:r>
+              <a:endParaRPr dirty="0">
+                <a:solidFill>
+                  <a:schemeClr val="dk1"/>
+                </a:solidFill>
+                <a:latin typeface="Maven Pro"/>
+                <a:ea typeface="Maven Pro"/>
+                <a:cs typeface="Maven Pro"/>
+                <a:sym typeface="Maven Pro"/>
+              </a:endParaRPr>
+            </a:p>
+          </p:txBody>
+        </p:sp>
+      </p:grpSp>
+      <p:grpSp>
+        <p:nvGrpSpPr>
+          <p:cNvPr id="227" name="Google Shape;227;p16"/>
+          <p:cNvGrpSpPr/>
+          <p:nvPr/>
+        </p:nvGrpSpPr>
+        <p:grpSpPr>
+          <a:xfrm>
+            <a:off x="713188" y="2403450"/>
+            <a:ext cx="2040312" cy="786947"/>
+            <a:chOff x="713188" y="2479650"/>
+            <a:chExt cx="2040312" cy="786947"/>
+          </a:xfrm>
+        </p:grpSpPr>
+        <p:sp>
+          <p:nvSpPr>
+            <p:cNvPr id="228" name="Google Shape;228;p16"/>
+            <p:cNvSpPr txBox="1"/>
+            <p:nvPr/>
+          </p:nvSpPr>
+          <p:spPr>
+            <a:xfrm>
+              <a:off x="713200" y="2479650"/>
+              <a:ext cx="2040300" cy="457200"/>
+            </a:xfrm>
+            <a:prstGeom prst="rect">
+              <a:avLst/>
+            </a:prstGeom>
+            <a:noFill/>
+            <a:ln>
+              <a:noFill/>
+            </a:ln>
+          </p:spPr>
+          <p:txBody>
+            <a:bodyPr spcFirstLastPara="1" wrap="square" lIns="91425" tIns="91425" rIns="91425" bIns="91425" anchor="b" anchorCtr="0">
+              <a:noAutofit/>
+            </a:bodyPr>
+            <a:lstStyle/>
+            <a:p>
+              <a:pPr marL="0" lvl="0" indent="0" algn="ctr" rtl="0">
+                <a:spcBef>
+                  <a:spcPts val="0"/>
+                </a:spcBef>
+                <a:spcAft>
+                  <a:spcPts val="0"/>
+                </a:spcAft>
+                <a:buNone/>
+              </a:pPr>
+              <a:r>
+                <a:rPr lang="fr-FR" sz="2000" dirty="0">
+                  <a:solidFill>
+                    <a:schemeClr val="dk1"/>
+                  </a:solidFill>
+                  <a:latin typeface="Share Tech"/>
+                  <a:ea typeface="Share Tech"/>
+                  <a:cs typeface="Share Tech"/>
+                  <a:sym typeface="Share Tech"/>
+                </a:rPr>
+                <a:t>SUJET</a:t>
+              </a:r>
+              <a:endParaRPr sz="2000" dirty="0">
+                <a:solidFill>
+                  <a:schemeClr val="dk1"/>
+                </a:solidFill>
+                <a:latin typeface="Share Tech"/>
+                <a:ea typeface="Share Tech"/>
+                <a:cs typeface="Share Tech"/>
+                <a:sym typeface="Share Tech"/>
+              </a:endParaRPr>
+            </a:p>
+          </p:txBody>
+        </p:sp>
+        <p:sp>
+          <p:nvSpPr>
+            <p:cNvPr id="229" name="Google Shape;229;p16"/>
+            <p:cNvSpPr txBox="1"/>
+            <p:nvPr/>
+          </p:nvSpPr>
+          <p:spPr>
+            <a:xfrm>
+              <a:off x="713188" y="2782097"/>
+              <a:ext cx="2040300" cy="484500"/>
+            </a:xfrm>
+            <a:prstGeom prst="rect">
+              <a:avLst/>
+            </a:prstGeom>
+            <a:noFill/>
+            <a:ln>
+              <a:noFill/>
+            </a:ln>
+          </p:spPr>
+          <p:txBody>
+            <a:bodyPr spcFirstLastPara="1" wrap="square" lIns="91425" tIns="91425" rIns="91425" bIns="91425" anchor="t" anchorCtr="0">
+              <a:noAutofit/>
+            </a:bodyPr>
+            <a:lstStyle/>
+            <a:p>
+              <a:pPr marL="0" lvl="0" indent="0" algn="ctr" rtl="0">
+                <a:spcBef>
+                  <a:spcPts val="0"/>
+                </a:spcBef>
+                <a:spcAft>
+                  <a:spcPts val="0"/>
+                </a:spcAft>
+                <a:buNone/>
+              </a:pPr>
+              <a:r>
+                <a:rPr lang="fr-FR" dirty="0">
+                  <a:solidFill>
+                    <a:schemeClr val="dk1"/>
+                  </a:solidFill>
+                  <a:latin typeface="Maven Pro"/>
+                  <a:ea typeface="Maven Pro"/>
+                  <a:cs typeface="Maven Pro"/>
+                  <a:sym typeface="Maven Pro"/>
+                </a:rPr>
+                <a:t>complexe à trouver et d’évaluer sa faisabilité</a:t>
+              </a:r>
+              <a:endParaRPr dirty="0">
+                <a:solidFill>
+                  <a:schemeClr val="dk1"/>
+                </a:solidFill>
+                <a:latin typeface="Maven Pro"/>
+                <a:ea typeface="Maven Pro"/>
+                <a:cs typeface="Maven Pro"/>
+                <a:sym typeface="Maven Pro"/>
+              </a:endParaRPr>
+            </a:p>
+          </p:txBody>
+        </p:sp>
+      </p:grpSp>
+      <p:cxnSp>
+        <p:nvCxnSpPr>
+          <p:cNvPr id="240" name="Google Shape;240;p16"/>
+          <p:cNvCxnSpPr>
+            <a:cxnSpLocks/>
+            <a:stCxn id="228" idx="3"/>
+            <a:endCxn id="217" idx="6"/>
+          </p:cNvCxnSpPr>
+          <p:nvPr/>
+        </p:nvCxnSpPr>
+        <p:spPr>
+          <a:xfrm>
+            <a:off x="2753500" y="2555850"/>
+            <a:ext cx="836081" cy="391204"/>
+          </a:xfrm>
+          <a:prstGeom prst="bentConnector3">
+            <a:avLst>
+              <a:gd name="adj1" fmla="val 50000"/>
+            </a:avLst>
+          </a:prstGeom>
+          <a:noFill/>
+          <a:ln w="19050" cap="flat" cmpd="sng">
+            <a:solidFill>
+              <a:schemeClr val="lt2"/>
+            </a:solidFill>
+            <a:prstDash val="solid"/>
+            <a:round/>
+            <a:headEnd type="none" w="med" len="med"/>
+            <a:tailEnd type="none" w="med" len="med"/>
+          </a:ln>
+        </p:spPr>
+      </p:cxnSp>
+      <p:cxnSp>
+        <p:nvCxnSpPr>
+          <p:cNvPr id="241" name="Google Shape;241;p16"/>
+          <p:cNvCxnSpPr>
+            <a:stCxn id="214" idx="6"/>
+            <a:endCxn id="210" idx="3"/>
+          </p:cNvCxnSpPr>
+          <p:nvPr/>
+        </p:nvCxnSpPr>
+        <p:spPr>
+          <a:xfrm flipH="1">
+            <a:off x="2753531" y="3278310"/>
+            <a:ext cx="1215600" cy="568800"/>
+          </a:xfrm>
+          <a:prstGeom prst="bentConnector3">
+            <a:avLst>
+              <a:gd name="adj1" fmla="val 50000"/>
+            </a:avLst>
+          </a:prstGeom>
+          <a:noFill/>
+          <a:ln w="19050" cap="flat" cmpd="sng">
+            <a:solidFill>
+              <a:schemeClr val="lt2"/>
+            </a:solidFill>
+            <a:prstDash val="solid"/>
+            <a:round/>
+            <a:headEnd type="none" w="med" len="med"/>
+            <a:tailEnd type="none" w="med" len="med"/>
+          </a:ln>
+        </p:spPr>
+      </p:cxnSp>
+      <p:cxnSp>
+        <p:nvCxnSpPr>
+          <p:cNvPr id="242" name="Google Shape;242;p16"/>
+          <p:cNvCxnSpPr>
+            <a:cxnSpLocks/>
+            <a:stCxn id="216" idx="2"/>
+          </p:cNvCxnSpPr>
+          <p:nvPr/>
+        </p:nvCxnSpPr>
+        <p:spPr>
+          <a:xfrm rot="10800000" flipH="1">
+            <a:off x="5553049" y="2555854"/>
+            <a:ext cx="832800" cy="391200"/>
+          </a:xfrm>
+          <a:prstGeom prst="bentConnector3">
+            <a:avLst>
+              <a:gd name="adj1" fmla="val 50000"/>
+            </a:avLst>
+          </a:prstGeom>
+          <a:noFill/>
+          <a:ln w="19050" cap="flat" cmpd="sng">
+            <a:solidFill>
+              <a:schemeClr val="lt2"/>
+            </a:solidFill>
+            <a:prstDash val="solid"/>
+            <a:round/>
+            <a:headEnd type="none" w="med" len="med"/>
+            <a:tailEnd type="none" w="med" len="med"/>
+          </a:ln>
+        </p:spPr>
+      </p:cxnSp>
+      <p:cxnSp>
+        <p:nvCxnSpPr>
+          <p:cNvPr id="243" name="Google Shape;243;p16"/>
+          <p:cNvCxnSpPr>
+            <a:cxnSpLocks/>
+            <a:stCxn id="213" idx="2"/>
+          </p:cNvCxnSpPr>
+          <p:nvPr/>
+        </p:nvCxnSpPr>
+        <p:spPr>
+          <a:xfrm>
+            <a:off x="5188750" y="3278310"/>
+            <a:ext cx="1197000" cy="568800"/>
+          </a:xfrm>
+          <a:prstGeom prst="bentConnector3">
+            <a:avLst>
+              <a:gd name="adj1" fmla="val 50000"/>
+            </a:avLst>
+          </a:prstGeom>
+          <a:noFill/>
+          <a:ln w="19050" cap="flat" cmpd="sng">
+            <a:solidFill>
+              <a:schemeClr val="lt2"/>
+            </a:solidFill>
+            <a:prstDash val="solid"/>
+            <a:round/>
+            <a:headEnd type="none" w="med" len="med"/>
+            <a:tailEnd type="none" w="med" len="med"/>
+          </a:ln>
+        </p:spPr>
+      </p:cxnSp>
+      <p:cxnSp>
+        <p:nvCxnSpPr>
+          <p:cNvPr id="245" name="Google Shape;245;p16"/>
+          <p:cNvCxnSpPr/>
+          <p:nvPr/>
+        </p:nvCxnSpPr>
+        <p:spPr>
+          <a:xfrm>
+            <a:off x="4007025" y="2809525"/>
+            <a:ext cx="1150200" cy="0"/>
+          </a:xfrm>
+          <a:prstGeom prst="straightConnector1">
+            <a:avLst/>
+          </a:prstGeom>
+          <a:noFill/>
+          <a:ln w="38100" cap="flat" cmpd="sng">
+            <a:solidFill>
+              <a:schemeClr val="accent2"/>
+            </a:solidFill>
+            <a:prstDash val="solid"/>
+            <a:round/>
+            <a:headEnd type="none" w="med" len="med"/>
+            <a:tailEnd type="none" w="med" len="med"/>
+          </a:ln>
+        </p:spPr>
+      </p:cxnSp>
+      <p:cxnSp>
+        <p:nvCxnSpPr>
+          <p:cNvPr id="246" name="Google Shape;246;p16"/>
+          <p:cNvCxnSpPr/>
+          <p:nvPr/>
+        </p:nvCxnSpPr>
+        <p:spPr>
+          <a:xfrm>
+            <a:off x="3845275" y="2950636"/>
+            <a:ext cx="1453500" cy="0"/>
+          </a:xfrm>
+          <a:prstGeom prst="straightConnector1">
+            <a:avLst/>
+          </a:prstGeom>
+          <a:noFill/>
+          <a:ln w="38100" cap="flat" cmpd="sng">
+            <a:solidFill>
+              <a:schemeClr val="dk1"/>
+            </a:solidFill>
+            <a:prstDash val="solid"/>
+            <a:round/>
+            <a:headEnd type="none" w="med" len="med"/>
+            <a:tailEnd type="none" w="med" len="med"/>
+          </a:ln>
+        </p:spPr>
+      </p:cxnSp>
+      <p:sp>
+        <p:nvSpPr>
+          <p:cNvPr id="247" name="Google Shape;247;p16"/>
+          <p:cNvSpPr txBox="1"/>
+          <p:nvPr/>
+        </p:nvSpPr>
+        <p:spPr>
+          <a:xfrm>
+            <a:off x="3175350" y="1242275"/>
+            <a:ext cx="2793300" cy="457200"/>
+          </a:xfrm>
+          <a:prstGeom prst="rect">
+            <a:avLst/>
+          </a:prstGeom>
+          <a:noFill/>
+          <a:ln>
+            <a:noFill/>
+          </a:ln>
+        </p:spPr>
+        <p:txBody>
+          <a:bodyPr spcFirstLastPara="1" wrap="square" lIns="91425" tIns="91425" rIns="91425" bIns="91425" anchor="b" anchorCtr="0">
+            <a:noAutofit/>
+          </a:bodyPr>
+          <a:lstStyle/>
+          <a:p>
+            <a:pPr marL="0" lvl="0" indent="0" algn="ctr" rtl="0">
+              <a:spcBef>
+                <a:spcPts val="0"/>
+              </a:spcBef>
+              <a:spcAft>
+                <a:spcPts val="0"/>
+              </a:spcAft>
+              <a:buNone/>
+            </a:pPr>
+            <a:endParaRPr sz="2000" dirty="0">
+              <a:solidFill>
+                <a:schemeClr val="dk1"/>
+              </a:solidFill>
+              <a:latin typeface="Share Tech"/>
+              <a:ea typeface="Share Tech"/>
+              <a:cs typeface="Share Tech"/>
+              <a:sym typeface="Share Tech"/>
+            </a:endParaRPr>
+          </a:p>
+        </p:txBody>
+      </p:sp>
+      <p:sp>
+        <p:nvSpPr>
+          <p:cNvPr id="2" name="ZoneTexte 1">
+            <a:extLst>
+              <a:ext uri="{FF2B5EF4-FFF2-40B4-BE49-F238E27FC236}">
+                <a16:creationId xmlns:a16="http://schemas.microsoft.com/office/drawing/2014/main" id="{FE76D361-C019-E74A-C12D-D95CF2108372}"/>
+              </a:ext>
+            </a:extLst>
+          </p:cNvPr>
+          <p:cNvSpPr txBox="1"/>
+          <p:nvPr/>
+        </p:nvSpPr>
+        <p:spPr>
+          <a:xfrm>
+            <a:off x="8781856" y="4806393"/>
+            <a:ext cx="362144" cy="261610"/>
+          </a:xfrm>
+          <a:prstGeom prst="rect">
+            <a:avLst/>
+          </a:prstGeom>
+          <a:noFill/>
+        </p:spPr>
+        <p:txBody>
+          <a:bodyPr wrap="square" rtlCol="0">
+            <a:spAutoFit/>
+          </a:bodyPr>
+          <a:lstStyle/>
+          <a:p>
+            <a:r>
+              <a:rPr lang="fr-FR" sz="1100">
+                <a:solidFill>
+                  <a:schemeClr val="tx1"/>
+                </a:solidFill>
+                <a:latin typeface="Maven Pro" panose="020B0604020202020204" charset="0"/>
+              </a:rPr>
+              <a:t>18</a:t>
+            </a:r>
+          </a:p>
+        </p:txBody>
+      </p:sp>
+      <p:pic>
+        <p:nvPicPr>
+          <p:cNvPr id="4" name="Graphique 3" descr="Engrenages contour">
+            <a:extLst>
+              <a:ext uri="{FF2B5EF4-FFF2-40B4-BE49-F238E27FC236}">
+                <a16:creationId xmlns:a16="http://schemas.microsoft.com/office/drawing/2014/main" id="{6722751C-54A4-625B-7610-71A4CADD0D67}"/>
+              </a:ext>
+            </a:extLst>
+          </p:cNvPr>
+          <p:cNvPicPr>
+            <a:picLocks noChangeAspect="1"/>
+          </p:cNvPicPr>
+          <p:nvPr/>
+        </p:nvPicPr>
+        <p:blipFill>
+          <a:blip r:embed="rId3">
+            <a:extLst>
+              <a:ext uri="{96DAC541-7B7A-43D3-8B79-37D633B846F1}">
+                <asvg:svgBlip xmlns:asvg="http://schemas.microsoft.com/office/drawing/2016/SVG/main" r:embed="rId4"/>
+              </a:ext>
+            </a:extLst>
+          </a:blip>
+          <a:stretch>
+            <a:fillRect/>
+          </a:stretch>
+        </p:blipFill>
+        <p:spPr>
+          <a:xfrm>
+            <a:off x="4088394" y="1728364"/>
+            <a:ext cx="914400" cy="914400"/>
+          </a:xfrm>
+          <a:prstGeom prst="rect">
+            <a:avLst/>
+          </a:prstGeom>
+        </p:spPr>
+      </p:pic>
+    </p:spTree>
+    <p:extLst>
+      <p:ext uri="{BB962C8B-B14F-4D97-AF65-F5344CB8AC3E}">
+        <p14:creationId xmlns:p14="http://schemas.microsoft.com/office/powerpoint/2010/main" val="561755642"/>
+      </p:ext>
+    </p:extLst>
+  </p:cSld>
+  <p:clrMapOvr>
+    <a:masterClrMapping/>
+  </p:clrMapOvr>
+</p:sld>
+</file>
+
+<file path=ppt/slides/slide17.xml><?xml version="1.0" encoding="utf-8"?>
 <p:sld xmlns:a="http://schemas.openxmlformats.org/drawingml/2006/main" xmlns:r="http://schemas.openxmlformats.org/officeDocument/2006/relationships" xmlns:p="http://schemas.openxmlformats.org/presentationml/2006/main">
   <p:cSld>
     <p:spTree>
@@ -15690,7 +18306,7 @@
 </p:sld>
 </file>
 
-<file path=ppt/slides/slide16.xml><?xml version="1.0" encoding="utf-8"?>
+<file path=ppt/slides/slide18.xml><?xml version="1.0" encoding="utf-8"?>
 <p:sld xmlns:a="http://schemas.openxmlformats.org/drawingml/2006/main" xmlns:r="http://schemas.openxmlformats.org/officeDocument/2006/relationships" xmlns:p="http://schemas.openxmlformats.org/presentationml/2006/main">
   <p:cSld>
     <p:spTree>
@@ -17316,63 +19932,6 @@
               <a:t>Architecture de l’application web</a:t>
             </a:r>
           </a:p>
-          <a:p>
-            <a:pPr marL="323850" indent="-171450">
-              <a:spcAft>
-                <a:spcPts val="600"/>
-              </a:spcAft>
-              <a:buSzPts val="1200"/>
-            </a:pPr>
-            <a:r>
-              <a:rPr lang="fr-FR" dirty="0"/>
-              <a:t>Mise en œuvre techniques</a:t>
-            </a:r>
-          </a:p>
-          <a:p>
-            <a:pPr marL="323850" indent="-171450">
-              <a:spcAft>
-                <a:spcPts val="600"/>
-              </a:spcAft>
-              <a:buSzPts val="1200"/>
-            </a:pPr>
-            <a:r>
-              <a:rPr lang="fr-FR" dirty="0"/>
-              <a:t>Compétences mises en œuvre</a:t>
-            </a:r>
-          </a:p>
-          <a:p>
-            <a:pPr marL="323850" indent="-171450">
-              <a:spcAft>
-                <a:spcPts val="600"/>
-              </a:spcAft>
-              <a:buSzPts val="1200"/>
-            </a:pPr>
-            <a:r>
-              <a:rPr lang="fr-FR" dirty="0"/>
-              <a:t>Temps passé sur le projet</a:t>
-            </a:r>
-          </a:p>
-          <a:p>
-            <a:pPr marL="323850" indent="-171450">
-              <a:spcAft>
-                <a:spcPts val="600"/>
-              </a:spcAft>
-              <a:buSzPts val="1200"/>
-            </a:pPr>
-            <a:r>
-              <a:rPr lang="fr-FR" dirty="0"/>
-              <a:t>Conclusion</a:t>
-            </a:r>
-          </a:p>
-          <a:p>
-            <a:pPr marL="323850" indent="-171450">
-              <a:spcAft>
-                <a:spcPts val="600"/>
-              </a:spcAft>
-              <a:buSzPts val="1200"/>
-            </a:pPr>
-            <a:endParaRPr lang="fr-FR" dirty="0"/>
-          </a:p>
         </p:txBody>
       </p:sp>
       <p:grpSp>
@@ -18251,7 +20810,46 @@
               </a:spcAft>
               <a:buSzPts val="1200"/>
             </a:pPr>
-            <a:endParaRPr lang="fr-FR" dirty="0"/>
+            <a:r>
+              <a:rPr lang="fr-FR" dirty="0"/>
+              <a:t>Mise en œuvre techniques</a:t>
+            </a:r>
+          </a:p>
+          <a:p>
+            <a:pPr marL="323850" indent="-171450">
+              <a:spcAft>
+                <a:spcPts val="600"/>
+              </a:spcAft>
+              <a:buSzPts val="1200"/>
+            </a:pPr>
+            <a:r>
+              <a:rPr lang="fr-FR" dirty="0"/>
+              <a:t>Compétences mises en œuvre</a:t>
+            </a:r>
+          </a:p>
+          <a:p>
+            <a:pPr marL="323850" indent="-171450">
+              <a:spcAft>
+                <a:spcPts val="600"/>
+              </a:spcAft>
+              <a:buSzPts val="1200"/>
+            </a:pPr>
+            <a:r>
+              <a:rPr lang="fr-FR" dirty="0"/>
+              <a:t>Temps passé sur le projet</a:t>
+            </a:r>
+          </a:p>
+          <a:p>
+            <a:pPr marL="323850" indent="-171450">
+              <a:spcAft>
+                <a:spcPts val="600"/>
+              </a:spcAft>
+              <a:buSzPts val="1200"/>
+            </a:pPr>
+            <a:r>
+              <a:rPr lang="fr-FR" dirty="0"/>
+              <a:t>Conclusion</a:t>
+            </a:r>
           </a:p>
         </p:txBody>
       </p:sp>
@@ -21847,7 +24445,7 @@
           <a:p>
             <a:r>
               <a:rPr lang="fr-FR" dirty="0"/>
-              <a:t>Base de données</a:t>
+              <a:t>API REST</a:t>
             </a:r>
             <a:br>
               <a:rPr lang="fr-FR" dirty="0"/>
@@ -22258,13 +24856,13 @@
           <p:nvPr>
             <p:extLst>
               <p:ext uri="{D42A27DB-BD31-4B8C-83A1-F6EECF244321}">
-                <p14:modId xmlns:p14="http://schemas.microsoft.com/office/powerpoint/2010/main" val="1259487804"/>
+                <p14:modId xmlns:p14="http://schemas.microsoft.com/office/powerpoint/2010/main" val="3508573056"/>
               </p:ext>
             </p:extLst>
           </p:nvPr>
         </p:nvGraphicFramePr>
         <p:xfrm>
-          <a:off x="6034771" y="1904511"/>
+          <a:off x="6034771" y="1786132"/>
           <a:ext cx="1192111" cy="1334478"/>
         </p:xfrm>
         <a:graphic>
@@ -22378,13 +24976,13 @@
           <p:nvPr>
             <p:extLst>
               <p:ext uri="{D42A27DB-BD31-4B8C-83A1-F6EECF244321}">
-                <p14:modId xmlns:p14="http://schemas.microsoft.com/office/powerpoint/2010/main" val="3887678906"/>
+                <p14:modId xmlns:p14="http://schemas.microsoft.com/office/powerpoint/2010/main" val="3374732329"/>
               </p:ext>
             </p:extLst>
           </p:nvPr>
         </p:nvGraphicFramePr>
         <p:xfrm>
-          <a:off x="8040877" y="2112978"/>
+          <a:off x="8040877" y="1996940"/>
           <a:ext cx="866901" cy="910870"/>
         </p:xfrm>
         <a:graphic>
@@ -22564,57 +25162,6 @@
       </p:cxnSp>
       <p:cxnSp>
         <p:nvCxnSpPr>
-          <p:cNvPr id="20" name="Google Shape;1170;p39">
-            <a:extLst>
-              <a:ext uri="{FF2B5EF4-FFF2-40B4-BE49-F238E27FC236}">
-                <a16:creationId xmlns:a16="http://schemas.microsoft.com/office/drawing/2014/main" id="{B0A97BF1-3198-3022-9D90-66FD9453A40E}"/>
-              </a:ext>
-            </a:extLst>
-          </p:cNvPr>
-          <p:cNvCxnSpPr>
-            <a:cxnSpLocks/>
-            <a:stCxn id="5" idx="3"/>
-            <a:endCxn id="11" idx="1"/>
-          </p:cNvCxnSpPr>
-          <p:nvPr/>
-        </p:nvCxnSpPr>
-        <p:spPr>
-          <a:xfrm>
-            <a:off x="3344925" y="2458013"/>
-            <a:ext cx="2689846" cy="113737"/>
-          </a:xfrm>
-          <a:prstGeom prst="bentConnector3">
-            <a:avLst>
-              <a:gd name="adj1" fmla="val 50000"/>
-            </a:avLst>
-          </a:prstGeom>
-          <a:ln w="19050" cap="flat" cmpd="sng" algn="ctr">
-            <a:solidFill>
-              <a:srgbClr val="F8F8F8"/>
-            </a:solidFill>
-            <a:prstDash val="dash"/>
-            <a:round/>
-            <a:headEnd type="none" w="lg" len="med"/>
-            <a:tailEnd type="triangle" w="lg" len="lg"/>
-          </a:ln>
-        </p:spPr>
-        <p:style>
-          <a:lnRef idx="0">
-            <a:scrgbClr r="0" g="0" b="0"/>
-          </a:lnRef>
-          <a:fillRef idx="0">
-            <a:scrgbClr r="0" g="0" b="0"/>
-          </a:fillRef>
-          <a:effectRef idx="0">
-            <a:scrgbClr r="0" g="0" b="0"/>
-          </a:effectRef>
-          <a:fontRef idx="minor">
-            <a:schemeClr val="tx1"/>
-          </a:fontRef>
-        </p:style>
-      </p:cxnSp>
-      <p:cxnSp>
-        <p:nvCxnSpPr>
           <p:cNvPr id="23" name="Google Shape;1170;p39">
             <a:extLst>
               <a:ext uri="{FF2B5EF4-FFF2-40B4-BE49-F238E27FC236}">
@@ -22631,8 +25178,8 @@
         </p:nvCxnSpPr>
         <p:spPr>
           <a:xfrm flipV="1">
-            <a:off x="5215802" y="3238989"/>
-            <a:ext cx="1415024" cy="683352"/>
+            <a:off x="5215802" y="3120610"/>
+            <a:ext cx="1415024" cy="801731"/>
           </a:xfrm>
           <a:prstGeom prst="bentConnector2">
             <a:avLst/>
@@ -22680,8 +25227,59 @@
         </p:nvCxnSpPr>
         <p:spPr>
           <a:xfrm flipV="1">
-            <a:off x="7226882" y="2568413"/>
-            <a:ext cx="813995" cy="3337"/>
+            <a:off x="7226882" y="2452375"/>
+            <a:ext cx="813995" cy="996"/>
+          </a:xfrm>
+          <a:prstGeom prst="bentConnector3">
+            <a:avLst>
+              <a:gd name="adj1" fmla="val 50000"/>
+            </a:avLst>
+          </a:prstGeom>
+          <a:ln w="19050" cap="flat" cmpd="sng" algn="ctr">
+            <a:solidFill>
+              <a:srgbClr val="F8F8F8"/>
+            </a:solidFill>
+            <a:prstDash val="dash"/>
+            <a:round/>
+            <a:headEnd type="none" w="lg" len="med"/>
+            <a:tailEnd type="triangle" w="lg" len="lg"/>
+          </a:ln>
+        </p:spPr>
+        <p:style>
+          <a:lnRef idx="0">
+            <a:scrgbClr r="0" g="0" b="0"/>
+          </a:lnRef>
+          <a:fillRef idx="0">
+            <a:scrgbClr r="0" g="0" b="0"/>
+          </a:fillRef>
+          <a:effectRef idx="0">
+            <a:scrgbClr r="0" g="0" b="0"/>
+          </a:effectRef>
+          <a:fontRef idx="minor">
+            <a:schemeClr val="tx1"/>
+          </a:fontRef>
+        </p:style>
+      </p:cxnSp>
+      <p:cxnSp>
+        <p:nvCxnSpPr>
+          <p:cNvPr id="9" name="Google Shape;1170;p39">
+            <a:extLst>
+              <a:ext uri="{FF2B5EF4-FFF2-40B4-BE49-F238E27FC236}">
+                <a16:creationId xmlns:a16="http://schemas.microsoft.com/office/drawing/2014/main" id="{1675A813-C6A9-127D-0AC7-5A907C36D04C}"/>
+              </a:ext>
+            </a:extLst>
+          </p:cNvPr>
+          <p:cNvCxnSpPr>
+            <a:cxnSpLocks/>
+            <a:stCxn id="7" idx="2"/>
+            <a:endCxn id="10" idx="0"/>
+          </p:cNvCxnSpPr>
+          <p:nvPr/>
+        </p:nvCxnSpPr>
+        <p:spPr>
+          <a:xfrm rot="5400000">
+            <a:off x="3631578" y="2571750"/>
+            <a:ext cx="1880845" cy="1"/>
           </a:xfrm>
           <a:prstGeom prst="bentConnector3">
             <a:avLst>
@@ -22734,7 +25332,7 @@
         <p:cNvPr id="1" name="">
           <a:extLst>
             <a:ext uri="{FF2B5EF4-FFF2-40B4-BE49-F238E27FC236}">
-              <a16:creationId xmlns:a16="http://schemas.microsoft.com/office/drawing/2014/main" id="{262CA727-3DF7-C232-7F2E-D44EDEEAE4AB}"/>
+              <a16:creationId xmlns:a16="http://schemas.microsoft.com/office/drawing/2014/main" id="{5C652E94-F292-FF00-6B77-0E332ADAEB2F}"/>
             </a:ext>
           </a:extLst>
         </p:cNvPr>
@@ -22754,7 +25352,7 @@
           <p:cNvPr id="2" name="Titre 1">
             <a:extLst>
               <a:ext uri="{FF2B5EF4-FFF2-40B4-BE49-F238E27FC236}">
-                <a16:creationId xmlns:a16="http://schemas.microsoft.com/office/drawing/2014/main" id="{A93B33C8-8368-11FF-8DD4-72DEC092066B}"/>
+                <a16:creationId xmlns:a16="http://schemas.microsoft.com/office/drawing/2014/main" id="{318EAB41-4C48-7217-4933-7596400D098C}"/>
               </a:ext>
             </a:extLst>
           </p:cNvPr>
@@ -22777,7 +25375,7 @@
           <a:p>
             <a:r>
               <a:rPr lang="fr-FR" dirty="0"/>
-              <a:t>API (Application Programming Interface)</a:t>
+              <a:t>Application web</a:t>
             </a:r>
             <a:br>
               <a:rPr lang="fr-FR" dirty="0"/>
@@ -22786,40 +25384,978 @@
           </a:p>
         </p:txBody>
       </p:sp>
-      <p:pic>
-        <p:nvPicPr>
-          <p:cNvPr id="7" name="Image 6">
+      <p:graphicFrame>
+        <p:nvGraphicFramePr>
+          <p:cNvPr id="4" name="Tableau 3">
             <a:extLst>
               <a:ext uri="{FF2B5EF4-FFF2-40B4-BE49-F238E27FC236}">
-                <a16:creationId xmlns:a16="http://schemas.microsoft.com/office/drawing/2014/main" id="{A04343DA-D5CB-5E96-B105-2F66774274CC}"/>
+                <a16:creationId xmlns:a16="http://schemas.microsoft.com/office/drawing/2014/main" id="{750F4604-7E6F-6581-C30B-FEEE19A832C0}"/>
               </a:ext>
             </a:extLst>
           </p:cNvPr>
-          <p:cNvPicPr>
-            <a:picLocks noChangeAspect="1"/>
-          </p:cNvPicPr>
+          <p:cNvGraphicFramePr>
+            <a:graphicFrameLocks/>
+          </p:cNvGraphicFramePr>
+          <p:nvPr>
+            <p:extLst>
+              <p:ext uri="{D42A27DB-BD31-4B8C-83A1-F6EECF244321}">
+                <p14:modId xmlns:p14="http://schemas.microsoft.com/office/powerpoint/2010/main" val="3289582853"/>
+              </p:ext>
+            </p:extLst>
+          </p:nvPr>
+        </p:nvGraphicFramePr>
+        <p:xfrm>
+          <a:off x="456619" y="2133171"/>
+          <a:ext cx="1286231" cy="877158"/>
+        </p:xfrm>
+        <a:graphic>
+          <a:graphicData uri="http://schemas.openxmlformats.org/drawingml/2006/table">
+            <a:tbl>
+              <a:tblPr firstRow="1" bandRow="1">
+                <a:tableStyleId>{8FD4443E-F989-4FC4-A0C8-D5A2AF1F390B}</a:tableStyleId>
+              </a:tblPr>
+              <a:tblGrid>
+                <a:gridCol w="1286231">
+                  <a:extLst>
+                    <a:ext uri="{9D8B030D-6E8A-4147-A177-3AD203B41FA5}">
+                      <a16:colId xmlns:a16="http://schemas.microsoft.com/office/drawing/2014/main" val="1632321074"/>
+                    </a:ext>
+                  </a:extLst>
+                </a:gridCol>
+              </a:tblGrid>
+              <a:tr h="238551">
+                <a:tc>
+                  <a:txBody>
+                    <a:bodyPr/>
+                    <a:lstStyle/>
+                    <a:p>
+                      <a:pPr algn="ctr"/>
+                      <a:r>
+                        <a:rPr lang="fr-FR" sz="1100" dirty="0"/>
+                        <a:t>Login</a:t>
+                      </a:r>
+                    </a:p>
+                  </a:txBody>
+                  <a:tcPr/>
+                </a:tc>
+                <a:extLst>
+                  <a:ext uri="{0D108BD9-81ED-4DB2-BD59-A6C34878D82A}">
+                    <a16:rowId xmlns:a16="http://schemas.microsoft.com/office/drawing/2014/main" val="3599933484"/>
+                  </a:ext>
+                </a:extLst>
+              </a:tr>
+              <a:tr h="618078">
+                <a:tc>
+                  <a:txBody>
+                    <a:bodyPr/>
+                    <a:lstStyle/>
+                    <a:p>
+                      <a:r>
+                        <a:rPr lang="fr-FR" sz="1100" dirty="0" err="1"/>
+                        <a:t>GetRefreshToken</a:t>
+                      </a:r>
+                      <a:endParaRPr lang="fr-FR" sz="1100" dirty="0"/>
+                    </a:p>
+                    <a:p>
+                      <a:r>
+                        <a:rPr lang="fr-FR" sz="1100" dirty="0"/>
+                        <a:t>Login</a:t>
+                      </a:r>
+                    </a:p>
+                    <a:p>
+                      <a:r>
+                        <a:rPr lang="fr-FR" sz="1100" dirty="0" err="1"/>
+                        <a:t>useLogin</a:t>
+                      </a:r>
+                      <a:endParaRPr lang="fr-FR" sz="1100" dirty="0"/>
+                    </a:p>
+                  </a:txBody>
+                  <a:tcPr/>
+                </a:tc>
+                <a:extLst>
+                  <a:ext uri="{0D108BD9-81ED-4DB2-BD59-A6C34878D82A}">
+                    <a16:rowId xmlns:a16="http://schemas.microsoft.com/office/drawing/2014/main" val="3841387755"/>
+                  </a:ext>
+                </a:extLst>
+              </a:tr>
+            </a:tbl>
+          </a:graphicData>
+        </a:graphic>
+      </p:graphicFrame>
+      <p:graphicFrame>
+        <p:nvGraphicFramePr>
+          <p:cNvPr id="3" name="Tableau 2">
+            <a:extLst>
+              <a:ext uri="{FF2B5EF4-FFF2-40B4-BE49-F238E27FC236}">
+                <a16:creationId xmlns:a16="http://schemas.microsoft.com/office/drawing/2014/main" id="{6B93FA26-7E8D-8BD1-AA5F-6BF55B0C0FC8}"/>
+              </a:ext>
+            </a:extLst>
+          </p:cNvPr>
+          <p:cNvGraphicFramePr>
+            <a:graphicFrameLocks/>
+          </p:cNvGraphicFramePr>
+          <p:nvPr>
+            <p:extLst>
+              <p:ext uri="{D42A27DB-BD31-4B8C-83A1-F6EECF244321}">
+                <p14:modId xmlns:p14="http://schemas.microsoft.com/office/powerpoint/2010/main" val="222801488"/>
+              </p:ext>
+            </p:extLst>
+          </p:nvPr>
+        </p:nvGraphicFramePr>
+        <p:xfrm>
+          <a:off x="3795074" y="1725930"/>
+          <a:ext cx="1375195" cy="1691640"/>
+        </p:xfrm>
+        <a:graphic>
+          <a:graphicData uri="http://schemas.openxmlformats.org/drawingml/2006/table">
+            <a:tbl>
+              <a:tblPr firstRow="1" bandRow="1">
+                <a:tableStyleId>{8FD4443E-F989-4FC4-A0C8-D5A2AF1F390B}</a:tableStyleId>
+              </a:tblPr>
+              <a:tblGrid>
+                <a:gridCol w="1375195">
+                  <a:extLst>
+                    <a:ext uri="{9D8B030D-6E8A-4147-A177-3AD203B41FA5}">
+                      <a16:colId xmlns:a16="http://schemas.microsoft.com/office/drawing/2014/main" val="1632321074"/>
+                    </a:ext>
+                  </a:extLst>
+                </a:gridCol>
+              </a:tblGrid>
+              <a:tr h="230060">
+                <a:tc>
+                  <a:txBody>
+                    <a:bodyPr/>
+                    <a:lstStyle/>
+                    <a:p>
+                      <a:pPr algn="ctr"/>
+                      <a:r>
+                        <a:rPr lang="fr-FR" sz="1100" dirty="0" err="1"/>
+                        <a:t>MainPage</a:t>
+                      </a:r>
+                      <a:endParaRPr lang="fr-FR" sz="1100" dirty="0"/>
+                    </a:p>
+                  </a:txBody>
+                  <a:tcPr/>
+                </a:tc>
+                <a:extLst>
+                  <a:ext uri="{0D108BD9-81ED-4DB2-BD59-A6C34878D82A}">
+                    <a16:rowId xmlns:a16="http://schemas.microsoft.com/office/drawing/2014/main" val="3599933484"/>
+                  </a:ext>
+                </a:extLst>
+              </a:tr>
+              <a:tr h="763126">
+                <a:tc>
+                  <a:txBody>
+                    <a:bodyPr/>
+                    <a:lstStyle/>
+                    <a:p>
+                      <a:r>
+                        <a:rPr lang="fr-FR" sz="1100" dirty="0"/>
+                        <a:t>Carto</a:t>
+                      </a:r>
+                    </a:p>
+                    <a:p>
+                      <a:r>
+                        <a:rPr lang="fr-FR" sz="1100" dirty="0" err="1"/>
+                        <a:t>CustomEditControl</a:t>
+                      </a:r>
+                      <a:endParaRPr lang="fr-FR" sz="1100" dirty="0"/>
+                    </a:p>
+                    <a:p>
+                      <a:r>
+                        <a:rPr lang="fr-FR" sz="1100" dirty="0"/>
+                        <a:t>Help</a:t>
+                      </a:r>
+                    </a:p>
+                    <a:p>
+                      <a:r>
+                        <a:rPr lang="fr-FR" sz="1100" dirty="0"/>
+                        <a:t>Information</a:t>
+                      </a:r>
+                    </a:p>
+                    <a:p>
+                      <a:r>
+                        <a:rPr lang="fr-FR" sz="1100" dirty="0" err="1"/>
+                        <a:t>MainPage</a:t>
+                      </a:r>
+                      <a:endParaRPr lang="fr-FR" sz="1100" dirty="0"/>
+                    </a:p>
+                    <a:p>
+                      <a:r>
+                        <a:rPr lang="fr-FR" sz="1100" dirty="0" err="1"/>
+                        <a:t>MyAccount</a:t>
+                      </a:r>
+                      <a:endParaRPr lang="fr-FR" sz="1100" dirty="0"/>
+                    </a:p>
+                    <a:p>
+                      <a:r>
+                        <a:rPr lang="fr-FR" sz="1100" dirty="0" err="1"/>
+                        <a:t>Parameters</a:t>
+                      </a:r>
+                      <a:endParaRPr lang="fr-FR" sz="1100" dirty="0"/>
+                    </a:p>
+                    <a:p>
+                      <a:r>
+                        <a:rPr lang="fr-FR" sz="1100" dirty="0" err="1"/>
+                        <a:t>SideMenu</a:t>
+                      </a:r>
+                      <a:endParaRPr lang="fr-FR" sz="1100" dirty="0"/>
+                    </a:p>
+                  </a:txBody>
+                  <a:tcPr/>
+                </a:tc>
+                <a:extLst>
+                  <a:ext uri="{0D108BD9-81ED-4DB2-BD59-A6C34878D82A}">
+                    <a16:rowId xmlns:a16="http://schemas.microsoft.com/office/drawing/2014/main" val="3841387755"/>
+                  </a:ext>
+                </a:extLst>
+              </a:tr>
+            </a:tbl>
+          </a:graphicData>
+        </a:graphic>
+      </p:graphicFrame>
+      <p:graphicFrame>
+        <p:nvGraphicFramePr>
+          <p:cNvPr id="6" name="Tableau 5">
+            <a:extLst>
+              <a:ext uri="{FF2B5EF4-FFF2-40B4-BE49-F238E27FC236}">
+                <a16:creationId xmlns:a16="http://schemas.microsoft.com/office/drawing/2014/main" id="{49F66372-FBBE-DC8D-C325-89DC2B945FF0}"/>
+              </a:ext>
+            </a:extLst>
+          </p:cNvPr>
+          <p:cNvGraphicFramePr>
+            <a:graphicFrameLocks/>
+          </p:cNvGraphicFramePr>
+          <p:nvPr>
+            <p:extLst>
+              <p:ext uri="{D42A27DB-BD31-4B8C-83A1-F6EECF244321}">
+                <p14:modId xmlns:p14="http://schemas.microsoft.com/office/powerpoint/2010/main" val="106236542"/>
+              </p:ext>
+            </p:extLst>
+          </p:nvPr>
+        </p:nvGraphicFramePr>
+        <p:xfrm>
+          <a:off x="7150505" y="896393"/>
+          <a:ext cx="1328004" cy="899162"/>
+        </p:xfrm>
+        <a:graphic>
+          <a:graphicData uri="http://schemas.openxmlformats.org/drawingml/2006/table">
+            <a:tbl>
+              <a:tblPr firstRow="1" bandRow="1">
+                <a:tableStyleId>{8FD4443E-F989-4FC4-A0C8-D5A2AF1F390B}</a:tableStyleId>
+              </a:tblPr>
+              <a:tblGrid>
+                <a:gridCol w="1328004">
+                  <a:extLst>
+                    <a:ext uri="{9D8B030D-6E8A-4147-A177-3AD203B41FA5}">
+                      <a16:colId xmlns:a16="http://schemas.microsoft.com/office/drawing/2014/main" val="1632321074"/>
+                    </a:ext>
+                  </a:extLst>
+                </a:gridCol>
+              </a:tblGrid>
+              <a:tr h="217307">
+                <a:tc>
+                  <a:txBody>
+                    <a:bodyPr/>
+                    <a:lstStyle/>
+                    <a:p>
+                      <a:pPr algn="ctr"/>
+                      <a:r>
+                        <a:rPr lang="fr-FR" sz="1100" dirty="0"/>
+                        <a:t>Modal</a:t>
+                      </a:r>
+                    </a:p>
+                  </a:txBody>
+                  <a:tcPr/>
+                </a:tc>
+                <a:extLst>
+                  <a:ext uri="{0D108BD9-81ED-4DB2-BD59-A6C34878D82A}">
+                    <a16:rowId xmlns:a16="http://schemas.microsoft.com/office/drawing/2014/main" val="3599933484"/>
+                  </a:ext>
+                </a:extLst>
+              </a:tr>
+              <a:tr h="640082">
+                <a:tc>
+                  <a:txBody>
+                    <a:bodyPr/>
+                    <a:lstStyle/>
+                    <a:p>
+                      <a:r>
+                        <a:rPr lang="fr-FR" sz="1100" dirty="0" err="1"/>
+                        <a:t>CreateZoneModal</a:t>
+                      </a:r>
+                      <a:endParaRPr lang="fr-FR" sz="1100" dirty="0"/>
+                    </a:p>
+                    <a:p>
+                      <a:r>
+                        <a:rPr lang="fr-FR" sz="1100" dirty="0" err="1"/>
+                        <a:t>DeleteZoneModal</a:t>
+                      </a:r>
+                      <a:endParaRPr lang="fr-FR" sz="1100" dirty="0"/>
+                    </a:p>
+                    <a:p>
+                      <a:r>
+                        <a:rPr lang="fr-FR" sz="1100" dirty="0" err="1"/>
+                        <a:t>EditZoneModal</a:t>
+                      </a:r>
+                      <a:endParaRPr lang="fr-FR" sz="1100" dirty="0"/>
+                    </a:p>
+                  </a:txBody>
+                  <a:tcPr/>
+                </a:tc>
+                <a:extLst>
+                  <a:ext uri="{0D108BD9-81ED-4DB2-BD59-A6C34878D82A}">
+                    <a16:rowId xmlns:a16="http://schemas.microsoft.com/office/drawing/2014/main" val="3841387755"/>
+                  </a:ext>
+                </a:extLst>
+              </a:tr>
+            </a:tbl>
+          </a:graphicData>
+        </a:graphic>
+      </p:graphicFrame>
+      <p:graphicFrame>
+        <p:nvGraphicFramePr>
+          <p:cNvPr id="8" name="Tableau 7">
+            <a:extLst>
+              <a:ext uri="{FF2B5EF4-FFF2-40B4-BE49-F238E27FC236}">
+                <a16:creationId xmlns:a16="http://schemas.microsoft.com/office/drawing/2014/main" id="{8910EF51-3692-6B5E-E77F-2FDC73ED3E0C}"/>
+              </a:ext>
+            </a:extLst>
+          </p:cNvPr>
+          <p:cNvGraphicFramePr>
+            <a:graphicFrameLocks/>
+          </p:cNvGraphicFramePr>
+          <p:nvPr>
+            <p:extLst>
+              <p:ext uri="{D42A27DB-BD31-4B8C-83A1-F6EECF244321}">
+                <p14:modId xmlns:p14="http://schemas.microsoft.com/office/powerpoint/2010/main" val="2270138369"/>
+              </p:ext>
+            </p:extLst>
+          </p:nvPr>
+        </p:nvGraphicFramePr>
+        <p:xfrm>
+          <a:off x="7099446" y="3125884"/>
+          <a:ext cx="1430120" cy="1691640"/>
+        </p:xfrm>
+        <a:graphic>
+          <a:graphicData uri="http://schemas.openxmlformats.org/drawingml/2006/table">
+            <a:tbl>
+              <a:tblPr firstRow="1" bandRow="1">
+                <a:tableStyleId>{8FD4443E-F989-4FC4-A0C8-D5A2AF1F390B}</a:tableStyleId>
+              </a:tblPr>
+              <a:tblGrid>
+                <a:gridCol w="1430120">
+                  <a:extLst>
+                    <a:ext uri="{9D8B030D-6E8A-4147-A177-3AD203B41FA5}">
+                      <a16:colId xmlns:a16="http://schemas.microsoft.com/office/drawing/2014/main" val="1632321074"/>
+                    </a:ext>
+                  </a:extLst>
+                </a:gridCol>
+              </a:tblGrid>
+              <a:tr h="230060">
+                <a:tc>
+                  <a:txBody>
+                    <a:bodyPr/>
+                    <a:lstStyle/>
+                    <a:p>
+                      <a:pPr algn="ctr"/>
+                      <a:r>
+                        <a:rPr lang="fr-FR" sz="1100" dirty="0"/>
+                        <a:t>Style</a:t>
+                      </a:r>
+                    </a:p>
+                  </a:txBody>
+                  <a:tcPr/>
+                </a:tc>
+                <a:extLst>
+                  <a:ext uri="{0D108BD9-81ED-4DB2-BD59-A6C34878D82A}">
+                    <a16:rowId xmlns:a16="http://schemas.microsoft.com/office/drawing/2014/main" val="3599933484"/>
+                  </a:ext>
+                </a:extLst>
+              </a:tr>
+              <a:tr h="763126">
+                <a:tc>
+                  <a:txBody>
+                    <a:bodyPr/>
+                    <a:lstStyle/>
+                    <a:p>
+                      <a:r>
+                        <a:rPr lang="fr-FR" sz="1100" dirty="0" err="1"/>
+                        <a:t>Account.module</a:t>
+                      </a:r>
+                      <a:endParaRPr lang="fr-FR" sz="1100" dirty="0"/>
+                    </a:p>
+                    <a:p>
+                      <a:r>
+                        <a:rPr lang="fr-FR" sz="1100" dirty="0" err="1"/>
+                        <a:t>Carto.module</a:t>
+                      </a:r>
+                      <a:endParaRPr lang="fr-FR" sz="1100" dirty="0"/>
+                    </a:p>
+                    <a:p>
+                      <a:r>
+                        <a:rPr lang="fr-FR" sz="1100" dirty="0" err="1"/>
+                        <a:t>Help.module</a:t>
+                      </a:r>
+                      <a:endParaRPr lang="fr-FR" sz="1100" dirty="0"/>
+                    </a:p>
+                    <a:p>
+                      <a:r>
+                        <a:rPr lang="fr-FR" sz="1100" dirty="0" err="1"/>
+                        <a:t>Information.module</a:t>
+                      </a:r>
+                      <a:endParaRPr lang="fr-FR" sz="1100" dirty="0"/>
+                    </a:p>
+                    <a:p>
+                      <a:r>
+                        <a:rPr lang="fr-FR" sz="1100" dirty="0" err="1"/>
+                        <a:t>Login.module</a:t>
+                      </a:r>
+                      <a:endParaRPr lang="fr-FR" sz="1100" dirty="0"/>
+                    </a:p>
+                    <a:p>
+                      <a:r>
+                        <a:rPr lang="fr-FR" sz="1100" dirty="0" err="1"/>
+                        <a:t>Parameters.module</a:t>
+                      </a:r>
+                      <a:endParaRPr lang="fr-FR" sz="1100" dirty="0"/>
+                    </a:p>
+                    <a:p>
+                      <a:r>
+                        <a:rPr lang="fr-FR" sz="1100" dirty="0" err="1"/>
+                        <a:t>SideMenu.module</a:t>
+                      </a:r>
+                      <a:endParaRPr lang="fr-FR" sz="1100" dirty="0"/>
+                    </a:p>
+                    <a:p>
+                      <a:r>
+                        <a:rPr lang="fr-FR" sz="1100" dirty="0" err="1"/>
+                        <a:t>ZoneModal.module</a:t>
+                      </a:r>
+                      <a:endParaRPr lang="fr-FR" sz="1100" dirty="0"/>
+                    </a:p>
+                  </a:txBody>
+                  <a:tcPr/>
+                </a:tc>
+                <a:extLst>
+                  <a:ext uri="{0D108BD9-81ED-4DB2-BD59-A6C34878D82A}">
+                    <a16:rowId xmlns:a16="http://schemas.microsoft.com/office/drawing/2014/main" val="3841387755"/>
+                  </a:ext>
+                </a:extLst>
+              </a:tr>
+            </a:tbl>
+          </a:graphicData>
+        </a:graphic>
+      </p:graphicFrame>
+      <p:cxnSp>
+        <p:nvCxnSpPr>
+          <p:cNvPr id="14" name="Google Shape;1170;p39">
+            <a:extLst>
+              <a:ext uri="{FF2B5EF4-FFF2-40B4-BE49-F238E27FC236}">
+                <a16:creationId xmlns:a16="http://schemas.microsoft.com/office/drawing/2014/main" id="{5AD5D788-EB5F-1249-80D6-2C254A5DED80}"/>
+              </a:ext>
+            </a:extLst>
+          </p:cNvPr>
+          <p:cNvCxnSpPr>
+            <a:cxnSpLocks/>
+            <a:stCxn id="4" idx="3"/>
+            <a:endCxn id="3" idx="1"/>
+          </p:cNvCxnSpPr>
           <p:nvPr/>
-        </p:nvPicPr>
-        <p:blipFill>
-          <a:blip r:embed="rId2"/>
-          <a:stretch>
-            <a:fillRect/>
-          </a:stretch>
-        </p:blipFill>
+        </p:nvCxnSpPr>
         <p:spPr>
           <a:xfrm>
-            <a:off x="3220060" y="724767"/>
-            <a:ext cx="1100066" cy="4227022"/>
+            <a:off x="1742850" y="2571750"/>
+            <a:ext cx="2052224" cy="12700"/>
+          </a:xfrm>
+          <a:prstGeom prst="bentConnector3">
+            <a:avLst>
+              <a:gd name="adj1" fmla="val 50000"/>
+            </a:avLst>
+          </a:prstGeom>
+          <a:ln w="19050" cap="flat" cmpd="sng" algn="ctr">
+            <a:solidFill>
+              <a:srgbClr val="F8F8F8"/>
+            </a:solidFill>
+            <a:prstDash val="dash"/>
+            <a:round/>
+            <a:headEnd type="arrow" w="med" len="med"/>
+            <a:tailEnd type="arrow" w="med" len="med"/>
+          </a:ln>
+        </p:spPr>
+        <p:style>
+          <a:lnRef idx="0">
+            <a:scrgbClr r="0" g="0" b="0"/>
+          </a:lnRef>
+          <a:fillRef idx="0">
+            <a:scrgbClr r="0" g="0" b="0"/>
+          </a:fillRef>
+          <a:effectRef idx="0">
+            <a:scrgbClr r="0" g="0" b="0"/>
+          </a:effectRef>
+          <a:fontRef idx="minor">
+            <a:schemeClr val="tx1"/>
+          </a:fontRef>
+        </p:style>
+      </p:cxnSp>
+      <p:sp>
+        <p:nvSpPr>
+          <p:cNvPr id="18" name="Google Shape;1159;p39">
+            <a:extLst>
+              <a:ext uri="{FF2B5EF4-FFF2-40B4-BE49-F238E27FC236}">
+                <a16:creationId xmlns:a16="http://schemas.microsoft.com/office/drawing/2014/main" id="{3E44C611-C036-3377-C629-063D5C57C52B}"/>
+              </a:ext>
+            </a:extLst>
+          </p:cNvPr>
+          <p:cNvSpPr txBox="1"/>
+          <p:nvPr/>
+        </p:nvSpPr>
+        <p:spPr>
+          <a:xfrm>
+            <a:off x="2047188" y="2263234"/>
+            <a:ext cx="1443548" cy="308516"/>
           </a:xfrm>
           <a:prstGeom prst="rect">
             <a:avLst/>
           </a:prstGeom>
+          <a:noFill/>
+          <a:ln>
+            <a:noFill/>
+          </a:ln>
         </p:spPr>
-      </p:pic>
+        <p:txBody>
+          <a:bodyPr spcFirstLastPara="1" wrap="square" lIns="91425" tIns="91425" rIns="91425" bIns="91425" anchor="b" anchorCtr="0">
+            <a:noAutofit/>
+          </a:bodyPr>
+          <a:lstStyle/>
+          <a:p>
+            <a:pPr marL="0" lvl="0" indent="0" algn="ctr" rtl="0">
+              <a:spcBef>
+                <a:spcPts val="0"/>
+              </a:spcBef>
+              <a:spcAft>
+                <a:spcPts val="0"/>
+              </a:spcAft>
+              <a:buNone/>
+            </a:pPr>
+            <a:r>
+              <a:rPr lang="fr-FR" sz="1050" dirty="0">
+                <a:solidFill>
+                  <a:schemeClr val="dk1"/>
+                </a:solidFill>
+                <a:latin typeface="Share Tech"/>
+                <a:ea typeface="Share Tech"/>
+                <a:cs typeface="Share Tech"/>
+                <a:sym typeface="Share Tech"/>
+              </a:rPr>
+              <a:t>Connexion/Déconnexion</a:t>
+            </a:r>
+            <a:endParaRPr sz="1050" dirty="0">
+              <a:solidFill>
+                <a:schemeClr val="dk1"/>
+              </a:solidFill>
+              <a:latin typeface="Share Tech"/>
+              <a:ea typeface="Share Tech"/>
+              <a:cs typeface="Share Tech"/>
+              <a:sym typeface="Share Tech"/>
+            </a:endParaRPr>
+          </a:p>
+        </p:txBody>
+      </p:sp>
+      <p:cxnSp>
+        <p:nvCxnSpPr>
+          <p:cNvPr id="24" name="Google Shape;1170;p39">
+            <a:extLst>
+              <a:ext uri="{FF2B5EF4-FFF2-40B4-BE49-F238E27FC236}">
+                <a16:creationId xmlns:a16="http://schemas.microsoft.com/office/drawing/2014/main" id="{CC8D5033-B309-6342-B9A6-66EBAF692902}"/>
+              </a:ext>
+            </a:extLst>
+          </p:cNvPr>
+          <p:cNvCxnSpPr>
+            <a:cxnSpLocks/>
+            <a:stCxn id="8" idx="1"/>
+            <a:endCxn id="4" idx="2"/>
+          </p:cNvCxnSpPr>
+          <p:nvPr/>
+        </p:nvCxnSpPr>
+        <p:spPr>
+          <a:xfrm rot="10800000">
+            <a:off x="1099734" y="3010330"/>
+            <a:ext cx="5999712" cy="961375"/>
+          </a:xfrm>
+          <a:prstGeom prst="bentConnector2">
+            <a:avLst/>
+          </a:prstGeom>
+          <a:ln w="19050" cap="flat" cmpd="sng" algn="ctr">
+            <a:solidFill>
+              <a:srgbClr val="F8F8F8"/>
+            </a:solidFill>
+            <a:prstDash val="solid"/>
+            <a:round/>
+            <a:headEnd type="oval" w="med" len="med"/>
+            <a:tailEnd type="triangle" w="med" len="med"/>
+          </a:ln>
+        </p:spPr>
+        <p:style>
+          <a:lnRef idx="0">
+            <a:scrgbClr r="0" g="0" b="0"/>
+          </a:lnRef>
+          <a:fillRef idx="0">
+            <a:scrgbClr r="0" g="0" b="0"/>
+          </a:fillRef>
+          <a:effectRef idx="0">
+            <a:scrgbClr r="0" g="0" b="0"/>
+          </a:effectRef>
+          <a:fontRef idx="minor">
+            <a:schemeClr val="tx1"/>
+          </a:fontRef>
+        </p:style>
+      </p:cxnSp>
+      <p:cxnSp>
+        <p:nvCxnSpPr>
+          <p:cNvPr id="31" name="Google Shape;1170;p39">
+            <a:extLst>
+              <a:ext uri="{FF2B5EF4-FFF2-40B4-BE49-F238E27FC236}">
+                <a16:creationId xmlns:a16="http://schemas.microsoft.com/office/drawing/2014/main" id="{F58F9789-CFDE-C2FA-026F-040CA4B66312}"/>
+              </a:ext>
+            </a:extLst>
+          </p:cNvPr>
+          <p:cNvCxnSpPr>
+            <a:cxnSpLocks/>
+            <a:stCxn id="8" idx="0"/>
+            <a:endCxn id="6" idx="2"/>
+          </p:cNvCxnSpPr>
+          <p:nvPr/>
+        </p:nvCxnSpPr>
+        <p:spPr>
+          <a:xfrm rot="5400000" flipH="1" flipV="1">
+            <a:off x="7149342" y="2460720"/>
+            <a:ext cx="1330329" cy="1"/>
+          </a:xfrm>
+          <a:prstGeom prst="bentConnector3">
+            <a:avLst>
+              <a:gd name="adj1" fmla="val 50000"/>
+            </a:avLst>
+          </a:prstGeom>
+          <a:ln w="19050" cap="flat" cmpd="sng" algn="ctr">
+            <a:solidFill>
+              <a:srgbClr val="F8F8F8"/>
+            </a:solidFill>
+            <a:prstDash val="solid"/>
+            <a:round/>
+            <a:headEnd type="oval" w="med" len="med"/>
+            <a:tailEnd type="triangle" w="med" len="med"/>
+          </a:ln>
+        </p:spPr>
+        <p:style>
+          <a:lnRef idx="0">
+            <a:scrgbClr r="0" g="0" b="0"/>
+          </a:lnRef>
+          <a:fillRef idx="0">
+            <a:scrgbClr r="0" g="0" b="0"/>
+          </a:fillRef>
+          <a:effectRef idx="0">
+            <a:scrgbClr r="0" g="0" b="0"/>
+          </a:effectRef>
+          <a:fontRef idx="minor">
+            <a:schemeClr val="tx1"/>
+          </a:fontRef>
+        </p:style>
+      </p:cxnSp>
+      <p:cxnSp>
+        <p:nvCxnSpPr>
+          <p:cNvPr id="34" name="Google Shape;1170;p39">
+            <a:extLst>
+              <a:ext uri="{FF2B5EF4-FFF2-40B4-BE49-F238E27FC236}">
+                <a16:creationId xmlns:a16="http://schemas.microsoft.com/office/drawing/2014/main" id="{378E1602-98AF-D8CA-F6BE-1EE8A78036C6}"/>
+              </a:ext>
+            </a:extLst>
+          </p:cNvPr>
+          <p:cNvCxnSpPr>
+            <a:cxnSpLocks/>
+            <a:stCxn id="8" idx="0"/>
+            <a:endCxn id="3" idx="3"/>
+          </p:cNvCxnSpPr>
+          <p:nvPr/>
+        </p:nvCxnSpPr>
+        <p:spPr>
+          <a:xfrm rot="16200000" flipV="1">
+            <a:off x="6215321" y="1526698"/>
+            <a:ext cx="554134" cy="2644237"/>
+          </a:xfrm>
+          <a:prstGeom prst="bentConnector2">
+            <a:avLst/>
+          </a:prstGeom>
+          <a:ln w="19050" cap="flat" cmpd="sng" algn="ctr">
+            <a:solidFill>
+              <a:srgbClr val="F8F8F8"/>
+            </a:solidFill>
+            <a:prstDash val="solid"/>
+            <a:round/>
+            <a:headEnd type="oval" w="med" len="med"/>
+            <a:tailEnd type="triangle" w="med" len="med"/>
+          </a:ln>
+        </p:spPr>
+        <p:style>
+          <a:lnRef idx="0">
+            <a:scrgbClr r="0" g="0" b="0"/>
+          </a:lnRef>
+          <a:fillRef idx="0">
+            <a:scrgbClr r="0" g="0" b="0"/>
+          </a:fillRef>
+          <a:effectRef idx="0">
+            <a:scrgbClr r="0" g="0" b="0"/>
+          </a:effectRef>
+          <a:fontRef idx="minor">
+            <a:schemeClr val="tx1"/>
+          </a:fontRef>
+        </p:style>
+      </p:cxnSp>
+      <p:sp>
+        <p:nvSpPr>
+          <p:cNvPr id="37" name="Google Shape;1159;p39">
+            <a:extLst>
+              <a:ext uri="{FF2B5EF4-FFF2-40B4-BE49-F238E27FC236}">
+                <a16:creationId xmlns:a16="http://schemas.microsoft.com/office/drawing/2014/main" id="{1CE60F15-F7A5-7B96-70AE-4D3073CA6785}"/>
+              </a:ext>
+            </a:extLst>
+          </p:cNvPr>
+          <p:cNvSpPr txBox="1"/>
+          <p:nvPr/>
+        </p:nvSpPr>
+        <p:spPr>
+          <a:xfrm>
+            <a:off x="3377815" y="3981630"/>
+            <a:ext cx="1443548" cy="308516"/>
+          </a:xfrm>
+          <a:prstGeom prst="rect">
+            <a:avLst/>
+          </a:prstGeom>
+          <a:noFill/>
+          <a:ln>
+            <a:noFill/>
+          </a:ln>
+        </p:spPr>
+        <p:txBody>
+          <a:bodyPr spcFirstLastPara="1" wrap="square" lIns="91425" tIns="91425" rIns="91425" bIns="91425" anchor="b" anchorCtr="0">
+            <a:noAutofit/>
+          </a:bodyPr>
+          <a:lstStyle/>
+          <a:p>
+            <a:pPr marL="0" lvl="0" indent="0" algn="ctr" rtl="0">
+              <a:spcBef>
+                <a:spcPts val="0"/>
+              </a:spcBef>
+              <a:spcAft>
+                <a:spcPts val="0"/>
+              </a:spcAft>
+              <a:buNone/>
+            </a:pPr>
+            <a:r>
+              <a:rPr lang="fr-FR" sz="1050" dirty="0">
+                <a:solidFill>
+                  <a:schemeClr val="dk1"/>
+                </a:solidFill>
+                <a:latin typeface="Share Tech"/>
+                <a:ea typeface="Share Tech"/>
+                <a:cs typeface="Share Tech"/>
+                <a:sym typeface="Share Tech"/>
+              </a:rPr>
+              <a:t>Utilisation du style</a:t>
+            </a:r>
+            <a:endParaRPr sz="1050" dirty="0">
+              <a:solidFill>
+                <a:schemeClr val="dk1"/>
+              </a:solidFill>
+              <a:latin typeface="Share Tech"/>
+              <a:ea typeface="Share Tech"/>
+              <a:cs typeface="Share Tech"/>
+              <a:sym typeface="Share Tech"/>
+            </a:endParaRPr>
+          </a:p>
+        </p:txBody>
+      </p:sp>
+      <p:sp>
+        <p:nvSpPr>
+          <p:cNvPr id="38" name="Google Shape;1159;p39">
+            <a:extLst>
+              <a:ext uri="{FF2B5EF4-FFF2-40B4-BE49-F238E27FC236}">
+                <a16:creationId xmlns:a16="http://schemas.microsoft.com/office/drawing/2014/main" id="{6900FBE4-98C1-3BB9-7CA3-BA05A9F506B4}"/>
+              </a:ext>
+            </a:extLst>
+          </p:cNvPr>
+          <p:cNvSpPr txBox="1"/>
+          <p:nvPr/>
+        </p:nvSpPr>
+        <p:spPr>
+          <a:xfrm>
+            <a:off x="6500719" y="2306462"/>
+            <a:ext cx="1443548" cy="308516"/>
+          </a:xfrm>
+          <a:prstGeom prst="rect">
+            <a:avLst/>
+          </a:prstGeom>
+          <a:noFill/>
+          <a:ln>
+            <a:noFill/>
+          </a:ln>
+        </p:spPr>
+        <p:txBody>
+          <a:bodyPr spcFirstLastPara="1" wrap="square" lIns="91425" tIns="91425" rIns="91425" bIns="91425" anchor="b" anchorCtr="0">
+            <a:noAutofit/>
+          </a:bodyPr>
+          <a:lstStyle/>
+          <a:p>
+            <a:pPr marL="0" lvl="0" indent="0" algn="ctr" rtl="0">
+              <a:spcBef>
+                <a:spcPts val="0"/>
+              </a:spcBef>
+              <a:spcAft>
+                <a:spcPts val="0"/>
+              </a:spcAft>
+              <a:buNone/>
+            </a:pPr>
+            <a:r>
+              <a:rPr lang="fr-FR" sz="1050" dirty="0">
+                <a:solidFill>
+                  <a:schemeClr val="dk1"/>
+                </a:solidFill>
+                <a:latin typeface="Share Tech"/>
+                <a:ea typeface="Share Tech"/>
+                <a:cs typeface="Share Tech"/>
+                <a:sym typeface="Share Tech"/>
+              </a:rPr>
+              <a:t>Utilisation du style</a:t>
+            </a:r>
+            <a:endParaRPr sz="1050" dirty="0">
+              <a:solidFill>
+                <a:schemeClr val="dk1"/>
+              </a:solidFill>
+              <a:latin typeface="Share Tech"/>
+              <a:ea typeface="Share Tech"/>
+              <a:cs typeface="Share Tech"/>
+              <a:sym typeface="Share Tech"/>
+            </a:endParaRPr>
+          </a:p>
+        </p:txBody>
+      </p:sp>
+      <p:cxnSp>
+        <p:nvCxnSpPr>
+          <p:cNvPr id="39" name="Google Shape;1170;p39">
+            <a:extLst>
+              <a:ext uri="{FF2B5EF4-FFF2-40B4-BE49-F238E27FC236}">
+                <a16:creationId xmlns:a16="http://schemas.microsoft.com/office/drawing/2014/main" id="{B62247BE-CCD2-0CD2-5AEB-D6719C598B0F}"/>
+              </a:ext>
+            </a:extLst>
+          </p:cNvPr>
+          <p:cNvCxnSpPr>
+            <a:cxnSpLocks/>
+            <a:stCxn id="3" idx="0"/>
+            <a:endCxn id="6" idx="1"/>
+          </p:cNvCxnSpPr>
+          <p:nvPr/>
+        </p:nvCxnSpPr>
+        <p:spPr>
+          <a:xfrm rot="5400000" flipH="1" flipV="1">
+            <a:off x="5626610" y="202035"/>
+            <a:ext cx="379956" cy="2667834"/>
+          </a:xfrm>
+          <a:prstGeom prst="bentConnector2">
+            <a:avLst/>
+          </a:prstGeom>
+          <a:ln w="19050" cap="flat" cmpd="sng" algn="ctr">
+            <a:solidFill>
+              <a:srgbClr val="F8F8F8"/>
+            </a:solidFill>
+            <a:prstDash val="dash"/>
+            <a:round/>
+            <a:headEnd type="triangle" w="med" len="med"/>
+            <a:tailEnd type="none" w="med" len="med"/>
+          </a:ln>
+        </p:spPr>
+        <p:style>
+          <a:lnRef idx="0">
+            <a:scrgbClr r="0" g="0" b="0"/>
+          </a:lnRef>
+          <a:fillRef idx="0">
+            <a:scrgbClr r="0" g="0" b="0"/>
+          </a:fillRef>
+          <a:effectRef idx="0">
+            <a:scrgbClr r="0" g="0" b="0"/>
+          </a:effectRef>
+          <a:fontRef idx="minor">
+            <a:schemeClr val="tx1"/>
+          </a:fontRef>
+        </p:style>
+      </p:cxnSp>
+      <p:sp>
+        <p:nvSpPr>
+          <p:cNvPr id="42" name="Google Shape;1159;p39">
+            <a:extLst>
+              <a:ext uri="{FF2B5EF4-FFF2-40B4-BE49-F238E27FC236}">
+                <a16:creationId xmlns:a16="http://schemas.microsoft.com/office/drawing/2014/main" id="{04B9BAC2-694C-6A5A-FD35-E1AFB1B0AEEA}"/>
+              </a:ext>
+            </a:extLst>
+          </p:cNvPr>
+          <p:cNvSpPr txBox="1"/>
+          <p:nvPr/>
+        </p:nvSpPr>
+        <p:spPr>
+          <a:xfrm>
+            <a:off x="5094814" y="1050216"/>
+            <a:ext cx="1443548" cy="308516"/>
+          </a:xfrm>
+          <a:prstGeom prst="rect">
+            <a:avLst/>
+          </a:prstGeom>
+          <a:noFill/>
+          <a:ln>
+            <a:noFill/>
+          </a:ln>
+        </p:spPr>
+        <p:txBody>
+          <a:bodyPr spcFirstLastPara="1" wrap="square" lIns="91425" tIns="91425" rIns="91425" bIns="91425" anchor="b" anchorCtr="0">
+            <a:noAutofit/>
+          </a:bodyPr>
+          <a:lstStyle/>
+          <a:p>
+            <a:pPr marL="0" lvl="0" indent="0" algn="ctr" rtl="0">
+              <a:spcBef>
+                <a:spcPts val="0"/>
+              </a:spcBef>
+              <a:spcAft>
+                <a:spcPts val="0"/>
+              </a:spcAft>
+              <a:buNone/>
+            </a:pPr>
+            <a:r>
+              <a:rPr lang="fr-FR" sz="1050" dirty="0">
+                <a:solidFill>
+                  <a:schemeClr val="dk1"/>
+                </a:solidFill>
+                <a:latin typeface="Share Tech"/>
+                <a:ea typeface="Share Tech"/>
+                <a:cs typeface="Share Tech"/>
+                <a:sym typeface="Share Tech"/>
+              </a:rPr>
+              <a:t>Affichage des modales</a:t>
+            </a:r>
+            <a:endParaRPr sz="1050" dirty="0">
+              <a:solidFill>
+                <a:schemeClr val="dk1"/>
+              </a:solidFill>
+              <a:latin typeface="Share Tech"/>
+              <a:ea typeface="Share Tech"/>
+              <a:cs typeface="Share Tech"/>
+              <a:sym typeface="Share Tech"/>
+            </a:endParaRPr>
+          </a:p>
+        </p:txBody>
+      </p:sp>
     </p:spTree>
     <p:extLst>
       <p:ext uri="{BB962C8B-B14F-4D97-AF65-F5344CB8AC3E}">
-        <p14:creationId xmlns:p14="http://schemas.microsoft.com/office/powerpoint/2010/main" val="2099190938"/>
+        <p14:creationId xmlns:p14="http://schemas.microsoft.com/office/powerpoint/2010/main" val="254455194"/>
       </p:ext>
     </p:extLst>
   </p:cSld>
@@ -23687,21 +27223,6 @@
 </file>
 
 <file path=customXml/item1.xml><?xml version="1.0" encoding="utf-8"?>
-<?mso-contentType ?>
-<FormTemplates xmlns="http://schemas.microsoft.com/sharepoint/v3/contenttype/forms">
-  <Display>DocumentLibraryForm</Display>
-  <Edit>DocumentLibraryForm</Edit>
-  <New>DocumentLibraryForm</New>
-</FormTemplates>
-</file>
-
-<file path=customXml/item2.xml><?xml version="1.0" encoding="utf-8"?>
-<p:properties xmlns:p="http://schemas.microsoft.com/office/2006/metadata/properties" xmlns:xsi="http://www.w3.org/2001/XMLSchema-instance" xmlns:pc="http://schemas.microsoft.com/office/infopath/2007/PartnerControls">
-  <documentManagement/>
-</p:properties>
-</file>
-
-<file path=customXml/item3.xml><?xml version="1.0" encoding="utf-8"?>
 <ct:contentTypeSchema xmlns:ct="http://schemas.microsoft.com/office/2006/metadata/contentType" xmlns:ma="http://schemas.microsoft.com/office/2006/metadata/properties/metaAttributes" ct:_="" ma:_="" ma:contentTypeName="Document" ma:contentTypeID="0x0101008CEA7F8095A03344ABB714D5F8C794CE" ma:contentTypeVersion="8" ma:contentTypeDescription="Crée un document." ma:contentTypeScope="" ma:versionID="19ad794433a5a6f8f776704d78925295">
   <xsd:schema xmlns:xsd="http://www.w3.org/2001/XMLSchema" xmlns:xs="http://www.w3.org/2001/XMLSchema" xmlns:p="http://schemas.microsoft.com/office/2006/metadata/properties" xmlns:ns3="bb86211b-6858-4a67-bee9-3cc0c565fc01" xmlns:ns4="a4505148-1984-4b71-82bf-8ee338bb755e" targetNamespace="http://schemas.microsoft.com/office/2006/metadata/properties" ma:root="true" ma:fieldsID="0f739ac12f40b9d02b74301e2a60e0ec" ns3:_="" ns4:_="">
     <xsd:import namespace="bb86211b-6858-4a67-bee9-3cc0c565fc01"/>
@@ -23892,32 +27413,22 @@
 </ct:contentTypeSchema>
 </file>
 
-<file path=customXml/itemProps1.xml><?xml version="1.0" encoding="utf-8"?>
-<ds:datastoreItem xmlns:ds="http://schemas.openxmlformats.org/officeDocument/2006/customXml" ds:itemID="{FABF05A6-EFD4-4AFB-BAA9-65A8EB6C8E2D}">
-  <ds:schemaRefs>
-    <ds:schemaRef ds:uri="http://schemas.microsoft.com/sharepoint/v3/contenttype/forms"/>
-  </ds:schemaRefs>
-</ds:datastoreItem>
+<file path=customXml/item2.xml><?xml version="1.0" encoding="utf-8"?>
+<?mso-contentType ?>
+<FormTemplates xmlns="http://schemas.microsoft.com/sharepoint/v3/contenttype/forms">
+  <Display>DocumentLibraryForm</Display>
+  <Edit>DocumentLibraryForm</Edit>
+  <New>DocumentLibraryForm</New>
+</FormTemplates>
 </file>
 
-<file path=customXml/itemProps2.xml><?xml version="1.0" encoding="utf-8"?>
-<ds:datastoreItem xmlns:ds="http://schemas.openxmlformats.org/officeDocument/2006/customXml" ds:itemID="{97B0A5C4-F87A-4071-AE7B-E80DA40CE374}">
-  <ds:schemaRefs>
-    <ds:schemaRef ds:uri="a4505148-1984-4b71-82bf-8ee338bb755e"/>
-    <ds:schemaRef ds:uri="bb86211b-6858-4a67-bee9-3cc0c565fc01"/>
-    <ds:schemaRef ds:uri="http://purl.org/dc/dcmitype/"/>
-    <ds:schemaRef ds:uri="http://purl.org/dc/elements/1.1/"/>
-    <ds:schemaRef ds:uri="http://purl.org/dc/terms/"/>
-    <ds:schemaRef ds:uri="http://schemas.microsoft.com/office/2006/documentManagement/types"/>
-    <ds:schemaRef ds:uri="http://schemas.microsoft.com/office/2006/metadata/properties"/>
-    <ds:schemaRef ds:uri="http://schemas.microsoft.com/office/infopath/2007/PartnerControls"/>
-    <ds:schemaRef ds:uri="http://schemas.openxmlformats.org/package/2006/metadata/core-properties"/>
-    <ds:schemaRef ds:uri="http://www.w3.org/XML/1998/namespace"/>
-  </ds:schemaRefs>
-</ds:datastoreItem>
+<file path=customXml/item3.xml><?xml version="1.0" encoding="utf-8"?>
+<p:properties xmlns:p="http://schemas.microsoft.com/office/2006/metadata/properties" xmlns:xsi="http://www.w3.org/2001/XMLSchema-instance" xmlns:pc="http://schemas.microsoft.com/office/infopath/2007/PartnerControls">
+  <documentManagement/>
+</p:properties>
 </file>
 
-<file path=customXml/itemProps3.xml><?xml version="1.0" encoding="utf-8"?>
+<file path=customXml/itemProps1.xml><?xml version="1.0" encoding="utf-8"?>
 <ds:datastoreItem xmlns:ds="http://schemas.openxmlformats.org/officeDocument/2006/customXml" ds:itemID="{4046F691-00C8-47A5-8C80-2E9093E8930C}">
   <ds:schemaRefs>
     <ds:schemaRef ds:uri="a4505148-1984-4b71-82bf-8ee338bb755e"/>
@@ -23934,4 +27445,29 @@
     <ds:schemaRef ds:uri="http://www.w3.org/2001/XMLSchema"/>
   </ds:schemaRefs>
 </ds:datastoreItem>
+</file>
+
+<file path=customXml/itemProps2.xml><?xml version="1.0" encoding="utf-8"?>
+<ds:datastoreItem xmlns:ds="http://schemas.openxmlformats.org/officeDocument/2006/customXml" ds:itemID="{FABF05A6-EFD4-4AFB-BAA9-65A8EB6C8E2D}">
+  <ds:schemaRefs>
+    <ds:schemaRef ds:uri="http://schemas.microsoft.com/sharepoint/v3/contenttype/forms"/>
+  </ds:schemaRefs>
+</ds:datastoreItem>
+</file>
+
+<file path=customXml/itemProps3.xml><?xml version="1.0" encoding="utf-8"?>
+<ds:datastoreItem xmlns:ds="http://schemas.openxmlformats.org/officeDocument/2006/customXml" ds:itemID="{97B0A5C4-F87A-4071-AE7B-E80DA40CE374}">
+  <ds:schemaRefs>
+    <ds:schemaRef ds:uri="a4505148-1984-4b71-82bf-8ee338bb755e"/>
+    <ds:schemaRef ds:uri="bb86211b-6858-4a67-bee9-3cc0c565fc01"/>
+    <ds:schemaRef ds:uri="http://purl.org/dc/dcmitype/"/>
+    <ds:schemaRef ds:uri="http://purl.org/dc/elements/1.1/"/>
+    <ds:schemaRef ds:uri="http://purl.org/dc/terms/"/>
+    <ds:schemaRef ds:uri="http://schemas.microsoft.com/office/2006/documentManagement/types"/>
+    <ds:schemaRef ds:uri="http://schemas.microsoft.com/office/2006/metadata/properties"/>
+    <ds:schemaRef ds:uri="http://schemas.microsoft.com/office/infopath/2007/PartnerControls"/>
+    <ds:schemaRef ds:uri="http://schemas.openxmlformats.org/package/2006/metadata/core-properties"/>
+    <ds:schemaRef ds:uri="http://www.w3.org/XML/1998/namespace"/>
+  </ds:schemaRefs>
+</ds:datastoreItem>
 </file>
</xml_diff>

<commit_message>
Quasi finalisation du diapo
</commit_message>
<xml_diff>
--- a/Revue de projet/Diapo revue de projet.pptx
+++ b/Revue de projet/Diapo revue de projet.pptx
@@ -360,6 +360,11 @@
               </a:ln>
               <a:effectLst/>
             </c:spPr>
+            <c:extLst>
+              <c:ext xmlns:c16="http://schemas.microsoft.com/office/drawing/2014/chart" uri="{C3380CC4-5D6E-409C-BE32-E72D297353CC}">
+                <c16:uniqueId val="{00000001-93DA-4ED3-B2A4-A216ADE9A357}"/>
+              </c:ext>
+            </c:extLst>
           </c:dPt>
           <c:dPt>
             <c:idx val="1"/>
@@ -375,6 +380,11 @@
               </a:ln>
               <a:effectLst/>
             </c:spPr>
+            <c:extLst>
+              <c:ext xmlns:c16="http://schemas.microsoft.com/office/drawing/2014/chart" uri="{C3380CC4-5D6E-409C-BE32-E72D297353CC}">
+                <c16:uniqueId val="{00000003-93DA-4ED3-B2A4-A216ADE9A357}"/>
+              </c:ext>
+            </c:extLst>
           </c:dPt>
           <c:dPt>
             <c:idx val="2"/>
@@ -410,6 +420,11 @@
               </a:ln>
               <a:effectLst/>
             </c:spPr>
+            <c:extLst>
+              <c:ext xmlns:c16="http://schemas.microsoft.com/office/drawing/2014/chart" uri="{C3380CC4-5D6E-409C-BE32-E72D297353CC}">
+                <c16:uniqueId val="{00000007-93DA-4ED3-B2A4-A216ADE9A357}"/>
+              </c:ext>
+            </c:extLst>
           </c:dPt>
           <c:dPt>
             <c:idx val="4"/>
@@ -445,6 +460,11 @@
               </a:ln>
               <a:effectLst/>
             </c:spPr>
+            <c:extLst>
+              <c:ext xmlns:c16="http://schemas.microsoft.com/office/drawing/2014/chart" uri="{C3380CC4-5D6E-409C-BE32-E72D297353CC}">
+                <c16:uniqueId val="{0000000B-93DA-4ED3-B2A4-A216ADE9A357}"/>
+              </c:ext>
+            </c:extLst>
           </c:dPt>
           <c:dPt>
             <c:idx val="6"/>
@@ -462,6 +482,11 @@
               </a:ln>
               <a:effectLst/>
             </c:spPr>
+            <c:extLst>
+              <c:ext xmlns:c16="http://schemas.microsoft.com/office/drawing/2014/chart" uri="{C3380CC4-5D6E-409C-BE32-E72D297353CC}">
+                <c16:uniqueId val="{0000000D-93DA-4ED3-B2A4-A216ADE9A357}"/>
+              </c:ext>
+            </c:extLst>
           </c:dPt>
           <c:dPt>
             <c:idx val="7"/>
@@ -479,6 +504,11 @@
               </a:ln>
               <a:effectLst/>
             </c:spPr>
+            <c:extLst>
+              <c:ext xmlns:c16="http://schemas.microsoft.com/office/drawing/2014/chart" uri="{C3380CC4-5D6E-409C-BE32-E72D297353CC}">
+                <c16:uniqueId val="{0000000F-93DA-4ED3-B2A4-A216ADE9A357}"/>
+              </c:ext>
+            </c:extLst>
           </c:dPt>
           <c:dLbls>
             <c:dLbl>
@@ -1391,7 +1421,7 @@
           <a:p>
             <a:fld id="{1177AD86-A677-4E33-B4C2-8C9F15FBF2CD}" type="datetimeFigureOut">
               <a:rPr lang="fr-FR" smtClean="0"/>
-              <a:t>12/02/2024</a:t>
+              <a:t>13/02/2024</a:t>
             </a:fld>
             <a:endParaRPr lang="fr-FR"/>
           </a:p>
@@ -15773,16 +15803,15 @@
           </p:cNvPicPr>
           <p:nvPr/>
         </p:nvPicPr>
-        <p:blipFill>
+        <p:blipFill rotWithShape="1">
           <a:blip r:embed="rId2"/>
-          <a:stretch>
-            <a:fillRect/>
-          </a:stretch>
+          <a:srcRect l="400" t="914"/>
+          <a:stretch/>
         </p:blipFill>
         <p:spPr>
           <a:xfrm>
-            <a:off x="1991001" y="1354959"/>
-            <a:ext cx="5161997" cy="3249041"/>
+            <a:off x="2011680" y="1384663"/>
+            <a:ext cx="5141318" cy="3219337"/>
           </a:xfrm>
           <a:prstGeom prst="rect">
             <a:avLst/>
@@ -16056,7 +16085,7 @@
                   <a:cs typeface="Share Tech"/>
                   <a:sym typeface="Share Tech"/>
                 </a:rPr>
-                <a:t>ORGANISATION</a:t>
+                <a:t>L’ORGANISATION</a:t>
               </a:r>
               <a:endParaRPr sz="2000" dirty="0">
                 <a:solidFill>
@@ -16466,7 +16495,7 @@
                   <a:cs typeface="Maven Pro"/>
                   <a:sym typeface="Maven Pro"/>
                 </a:rPr>
-                <a:t>de travail est fortement améliorer</a:t>
+                <a:t>de travail est fortement amélioré</a:t>
               </a:r>
             </a:p>
             <a:p>
@@ -18358,7 +18387,7 @@
               <a:buNone/>
             </a:pPr>
             <a:r>
-              <a:rPr lang="en">
+              <a:rPr lang="en" dirty="0">
                 <a:solidFill>
                   <a:schemeClr val="tx1"/>
                 </a:solidFill>
@@ -18366,14 +18395,14 @@
               <a:t>MERCI D’AVOIR </a:t>
             </a:r>
             <a:r>
-              <a:rPr lang="en">
+              <a:rPr lang="en" dirty="0">
                 <a:solidFill>
                   <a:schemeClr val="accent2"/>
                 </a:solidFill>
               </a:rPr>
               <a:t>ÉCOUTER</a:t>
             </a:r>
-            <a:endParaRPr/>
+            <a:endParaRPr dirty="0"/>
           </a:p>
         </p:txBody>
       </p:sp>
@@ -22445,7 +22474,7 @@
                   <a:cs typeface="Maven Pro"/>
                   <a:sym typeface="Maven Pro"/>
                 </a:rPr>
-                <a:t>pour obtenir le nombre d’heure pour chaque partie ou tache de la réalisation</a:t>
+                <a:t>pour obtenir le nombre d’heures pour chaque partie ou tache de la réalisation</a:t>
               </a:r>
               <a:endParaRPr dirty="0">
                 <a:solidFill>
@@ -23877,7 +23906,7 @@
           <p:nvPr>
             <p:extLst>
               <p:ext uri="{D42A27DB-BD31-4B8C-83A1-F6EECF244321}">
-                <p14:modId xmlns:p14="http://schemas.microsoft.com/office/powerpoint/2010/main" val="2868310207"/>
+                <p14:modId xmlns:p14="http://schemas.microsoft.com/office/powerpoint/2010/main" val="3780511778"/>
               </p:ext>
             </p:extLst>
           </p:nvPr>
@@ -23910,7 +23939,7 @@
                       <a:pPr algn="ctr"/>
                       <a:r>
                         <a:rPr lang="fr-FR" dirty="0"/>
-                        <a:t>zones</a:t>
+                        <a:t>Zones</a:t>
                       </a:r>
                     </a:p>
                   </a:txBody>
@@ -24003,7 +24032,7 @@
           <p:nvPr>
             <p:extLst>
               <p:ext uri="{D42A27DB-BD31-4B8C-83A1-F6EECF244321}">
-                <p14:modId xmlns:p14="http://schemas.microsoft.com/office/powerpoint/2010/main" val="2282798606"/>
+                <p14:modId xmlns:p14="http://schemas.microsoft.com/office/powerpoint/2010/main" val="6768954"/>
               </p:ext>
             </p:extLst>
           </p:nvPr>
@@ -24035,9 +24064,10 @@
                     <a:p>
                       <a:pPr algn="ctr"/>
                       <a:r>
-                        <a:rPr lang="fr-FR" dirty="0"/>
+                        <a:rPr lang="fr-FR" dirty="0" err="1"/>
                         <a:t>Users</a:t>
                       </a:r>
+                      <a:endParaRPr lang="fr-FR" dirty="0"/>
                     </a:p>
                   </a:txBody>
                   <a:tcPr/>
@@ -24105,14 +24135,14 @@
           <p:nvPr>
             <p:extLst>
               <p:ext uri="{D42A27DB-BD31-4B8C-83A1-F6EECF244321}">
-                <p14:modId xmlns:p14="http://schemas.microsoft.com/office/powerpoint/2010/main" val="918017450"/>
+                <p14:modId xmlns:p14="http://schemas.microsoft.com/office/powerpoint/2010/main" val="2613604048"/>
               </p:ext>
             </p:extLst>
           </p:nvPr>
         </p:nvGraphicFramePr>
         <p:xfrm>
           <a:off x="7112726" y="2489563"/>
-          <a:ext cx="1583871" cy="862848"/>
+          <a:ext cx="1606729" cy="862848"/>
         </p:xfrm>
         <a:graphic>
           <a:graphicData uri="http://schemas.openxmlformats.org/drawingml/2006/table">
@@ -24121,7 +24151,7 @@
                 <a:tableStyleId>{8FD4443E-F989-4FC4-A0C8-D5A2AF1F390B}</a:tableStyleId>
               </a:tblPr>
               <a:tblGrid>
-                <a:gridCol w="1583871">
+                <a:gridCol w="1606729">
                   <a:extLst>
                     <a:ext uri="{9D8B030D-6E8A-4147-A177-3AD203B41FA5}">
                       <a16:colId xmlns:a16="http://schemas.microsoft.com/office/drawing/2014/main" val="1632321074"/>
@@ -24137,9 +24167,10 @@
                     <a:p>
                       <a:pPr algn="ctr"/>
                       <a:r>
-                        <a:rPr lang="fr-FR" dirty="0"/>
-                        <a:t>revoked_tokens</a:t>
+                        <a:rPr lang="fr-FR" dirty="0" err="1"/>
+                        <a:t>Revoked_tokens</a:t>
                       </a:r>
+                      <a:endParaRPr lang="fr-FR" dirty="0"/>
                     </a:p>
                   </a:txBody>
                   <a:tcPr/>
@@ -24195,7 +24226,7 @@
           <p:nvPr>
             <p:extLst>
               <p:ext uri="{D42A27DB-BD31-4B8C-83A1-F6EECF244321}">
-                <p14:modId xmlns:p14="http://schemas.microsoft.com/office/powerpoint/2010/main" val="1004054048"/>
+                <p14:modId xmlns:p14="http://schemas.microsoft.com/office/powerpoint/2010/main" val="3866460509"/>
               </p:ext>
             </p:extLst>
           </p:nvPr>
@@ -24227,9 +24258,10 @@
                     <a:p>
                       <a:pPr algn="ctr"/>
                       <a:r>
-                        <a:rPr lang="fr-FR" dirty="0"/>
-                        <a:t>roles</a:t>
+                        <a:rPr lang="fr-FR" dirty="0" err="1"/>
+                        <a:t>Roles</a:t>
                       </a:r>
+                      <a:endParaRPr lang="fr-FR" dirty="0"/>
                     </a:p>
                   </a:txBody>
                   <a:tcPr/>

</xml_diff>

<commit_message>
Mise à jour du nombre d'heures
</commit_message>
<xml_diff>
--- a/Revue de projet/Diapo revue de projet.pptx
+++ b/Revue de projet/Diapo revue de projet.pptx
@@ -663,7 +663,7 @@
                   <c:v>7</c:v>
                 </c:pt>
                 <c:pt idx="7">
-                  <c:v>20.5</c:v>
+                  <c:v>23.75</c:v>
                 </c:pt>
               </c:numCache>
             </c:numRef>
@@ -16084,35 +16084,6 @@
           </a:p>
         </p:txBody>
       </p:sp>
-      <p:pic>
-        <p:nvPicPr>
-          <p:cNvPr id="4" name="Image 3">
-            <a:extLst>
-              <a:ext uri="{FF2B5EF4-FFF2-40B4-BE49-F238E27FC236}">
-                <a16:creationId xmlns:a16="http://schemas.microsoft.com/office/drawing/2014/main" id="{319A860F-97EA-30A1-7BC0-2F69A800F01A}"/>
-              </a:ext>
-            </a:extLst>
-          </p:cNvPr>
-          <p:cNvPicPr>
-            <a:picLocks noChangeAspect="1"/>
-          </p:cNvPicPr>
-          <p:nvPr/>
-        </p:nvPicPr>
-        <p:blipFill rotWithShape="1">
-          <a:blip r:embed="rId2"/>
-          <a:srcRect l="400" t="914"/>
-          <a:stretch/>
-        </p:blipFill>
-        <p:spPr>
-          <a:xfrm>
-            <a:off x="2011680" y="1384663"/>
-            <a:ext cx="5141318" cy="3219337"/>
-          </a:xfrm>
-          <a:prstGeom prst="rect">
-            <a:avLst/>
-          </a:prstGeom>
-        </p:spPr>
-      </p:pic>
       <p:sp>
         <p:nvSpPr>
           <p:cNvPr id="3" name="ZoneTexte 2">
@@ -16153,6 +16124,36 @@
           </a:p>
         </p:txBody>
       </p:sp>
+      <p:pic>
+        <p:nvPicPr>
+          <p:cNvPr id="7" name="Image 6">
+            <a:extLst>
+              <a:ext uri="{FF2B5EF4-FFF2-40B4-BE49-F238E27FC236}">
+                <a16:creationId xmlns:a16="http://schemas.microsoft.com/office/drawing/2014/main" id="{4B6C5673-E05E-D5B4-E199-BC0788ACDEA5}"/>
+              </a:ext>
+            </a:extLst>
+          </p:cNvPr>
+          <p:cNvPicPr>
+            <a:picLocks noChangeAspect="1"/>
+          </p:cNvPicPr>
+          <p:nvPr/>
+        </p:nvPicPr>
+        <p:blipFill>
+          <a:blip r:embed="rId2"/>
+          <a:stretch>
+            <a:fillRect/>
+          </a:stretch>
+        </p:blipFill>
+        <p:spPr>
+          <a:xfrm>
+            <a:off x="1833495" y="1408756"/>
+            <a:ext cx="5477010" cy="3472096"/>
+          </a:xfrm>
+          <a:prstGeom prst="rect">
+            <a:avLst/>
+          </a:prstGeom>
+        </p:spPr>
+      </p:pic>
     </p:spTree>
     <p:extLst>
       <p:ext uri="{BB962C8B-B14F-4D97-AF65-F5344CB8AC3E}">
@@ -16235,7 +16236,7 @@
           <p:nvPr>
             <p:extLst>
               <p:ext uri="{D42A27DB-BD31-4B8C-83A1-F6EECF244321}">
-                <p14:modId xmlns:p14="http://schemas.microsoft.com/office/powerpoint/2010/main" val="3673706830"/>
+                <p14:modId xmlns:p14="http://schemas.microsoft.com/office/powerpoint/2010/main" val="3382394153"/>
               </p:ext>
             </p:extLst>
           </p:nvPr>
@@ -16286,6 +16287,45 @@
                 <a:latin typeface="Maven Pro" panose="020B0604020202020204" charset="0"/>
               </a:rPr>
               <a:t>16</a:t>
+            </a:r>
+          </a:p>
+        </p:txBody>
+      </p:sp>
+      <p:sp>
+        <p:nvSpPr>
+          <p:cNvPr id="4" name="ZoneTexte 3">
+            <a:extLst>
+              <a:ext uri="{FF2B5EF4-FFF2-40B4-BE49-F238E27FC236}">
+                <a16:creationId xmlns:a16="http://schemas.microsoft.com/office/drawing/2014/main" id="{2E189AB9-2CC2-2AAF-A567-0A4E451A0964}"/>
+              </a:ext>
+            </a:extLst>
+          </p:cNvPr>
+          <p:cNvSpPr txBox="1"/>
+          <p:nvPr/>
+        </p:nvSpPr>
+        <p:spPr>
+          <a:xfrm>
+            <a:off x="2912571" y="2706615"/>
+            <a:ext cx="1659429" cy="369332"/>
+          </a:xfrm>
+          <a:prstGeom prst="rect">
+            <a:avLst/>
+          </a:prstGeom>
+          <a:noFill/>
+        </p:spPr>
+        <p:txBody>
+          <a:bodyPr wrap="none" rtlCol="0">
+            <a:spAutoFit/>
+          </a:bodyPr>
+          <a:lstStyle/>
+          <a:p>
+            <a:r>
+              <a:rPr lang="fr-FR" sz="1800" dirty="0">
+                <a:solidFill>
+                  <a:schemeClr val="tx1"/>
+                </a:solidFill>
+              </a:rPr>
+              <a:t>158,25 heures</a:t>
             </a:r>
           </a:p>
         </p:txBody>
@@ -28694,18 +28734,18 @@
 </file>
 
 <file path=customXml/item2.xml><?xml version="1.0" encoding="utf-8"?>
-<p:properties xmlns:p="http://schemas.microsoft.com/office/2006/metadata/properties" xmlns:xsi="http://www.w3.org/2001/XMLSchema-instance" xmlns:pc="http://schemas.microsoft.com/office/infopath/2007/PartnerControls">
-  <documentManagement/>
-</p:properties>
-</file>
-
-<file path=customXml/item3.xml><?xml version="1.0" encoding="utf-8"?>
 <?mso-contentType ?>
 <FormTemplates xmlns="http://schemas.microsoft.com/sharepoint/v3/contenttype/forms">
   <Display>DocumentLibraryForm</Display>
   <Edit>DocumentLibraryForm</Edit>
   <New>DocumentLibraryForm</New>
 </FormTemplates>
+</file>
+
+<file path=customXml/item3.xml><?xml version="1.0" encoding="utf-8"?>
+<p:properties xmlns:p="http://schemas.microsoft.com/office/2006/metadata/properties" xmlns:xsi="http://www.w3.org/2001/XMLSchema-instance" xmlns:pc="http://schemas.microsoft.com/office/infopath/2007/PartnerControls">
+  <documentManagement/>
+</p:properties>
 </file>
 
 <file path=customXml/itemProps1.xml><?xml version="1.0" encoding="utf-8"?>
@@ -28728,26 +28768,26 @@
 </file>
 
 <file path=customXml/itemProps2.xml><?xml version="1.0" encoding="utf-8"?>
-<ds:datastoreItem xmlns:ds="http://schemas.openxmlformats.org/officeDocument/2006/customXml" ds:itemID="{97B0A5C4-F87A-4071-AE7B-E80DA40CE374}">
+<ds:datastoreItem xmlns:ds="http://schemas.openxmlformats.org/officeDocument/2006/customXml" ds:itemID="{FABF05A6-EFD4-4AFB-BAA9-65A8EB6C8E2D}">
   <ds:schemaRefs>
-    <ds:schemaRef ds:uri="a4505148-1984-4b71-82bf-8ee338bb755e"/>
-    <ds:schemaRef ds:uri="bb86211b-6858-4a67-bee9-3cc0c565fc01"/>
-    <ds:schemaRef ds:uri="http://purl.org/dc/dcmitype/"/>
-    <ds:schemaRef ds:uri="http://purl.org/dc/elements/1.1/"/>
-    <ds:schemaRef ds:uri="http://purl.org/dc/terms/"/>
-    <ds:schemaRef ds:uri="http://schemas.microsoft.com/office/2006/documentManagement/types"/>
-    <ds:schemaRef ds:uri="http://schemas.microsoft.com/office/2006/metadata/properties"/>
-    <ds:schemaRef ds:uri="http://schemas.microsoft.com/office/infopath/2007/PartnerControls"/>
-    <ds:schemaRef ds:uri="http://schemas.openxmlformats.org/package/2006/metadata/core-properties"/>
-    <ds:schemaRef ds:uri="http://www.w3.org/XML/1998/namespace"/>
+    <ds:schemaRef ds:uri="http://schemas.microsoft.com/sharepoint/v3/contenttype/forms"/>
   </ds:schemaRefs>
 </ds:datastoreItem>
 </file>
 
 <file path=customXml/itemProps3.xml><?xml version="1.0" encoding="utf-8"?>
-<ds:datastoreItem xmlns:ds="http://schemas.openxmlformats.org/officeDocument/2006/customXml" ds:itemID="{FABF05A6-EFD4-4AFB-BAA9-65A8EB6C8E2D}">
+<ds:datastoreItem xmlns:ds="http://schemas.openxmlformats.org/officeDocument/2006/customXml" ds:itemID="{97B0A5C4-F87A-4071-AE7B-E80DA40CE374}">
   <ds:schemaRefs>
-    <ds:schemaRef ds:uri="http://schemas.microsoft.com/sharepoint/v3/contenttype/forms"/>
+    <ds:schemaRef ds:uri="http://schemas.microsoft.com/office/infopath/2007/PartnerControls"/>
+    <ds:schemaRef ds:uri="http://purl.org/dc/elements/1.1/"/>
+    <ds:schemaRef ds:uri="http://schemas.openxmlformats.org/package/2006/metadata/core-properties"/>
+    <ds:schemaRef ds:uri="http://schemas.microsoft.com/office/2006/documentManagement/types"/>
+    <ds:schemaRef ds:uri="bb86211b-6858-4a67-bee9-3cc0c565fc01"/>
+    <ds:schemaRef ds:uri="http://purl.org/dc/dcmitype/"/>
+    <ds:schemaRef ds:uri="http://schemas.microsoft.com/office/2006/metadata/properties"/>
+    <ds:schemaRef ds:uri="http://purl.org/dc/terms/"/>
+    <ds:schemaRef ds:uri="a4505148-1984-4b71-82bf-8ee338bb755e"/>
+    <ds:schemaRef ds:uri="http://www.w3.org/XML/1998/namespace"/>
   </ds:schemaRefs>
 </ds:datastoreItem>
 </file>
</xml_diff>